<commit_message>
kleine Änderungen an Präsi; Aktivitätsdiagramm
</commit_message>
<xml_diff>
--- a/Doku/Praesi2.pptx
+++ b/Doku/Praesi2.pptx
@@ -4,16 +4,17 @@
   <p:sldMasterIdLst>
     <p:sldMasterId id="2147483648" r:id="rId1"/>
   </p:sldMasterIdLst>
+  <p:notesMasterIdLst>
+    <p:notesMasterId r:id="rId9"/>
+  </p:notesMasterIdLst>
   <p:sldIdLst>
     <p:sldId id="262" r:id="rId2"/>
     <p:sldId id="261" r:id="rId3"/>
     <p:sldId id="263" r:id="rId4"/>
     <p:sldId id="264" r:id="rId5"/>
-    <p:sldId id="265" r:id="rId6"/>
-    <p:sldId id="266" r:id="rId7"/>
-    <p:sldId id="268" r:id="rId8"/>
-    <p:sldId id="267" r:id="rId9"/>
-    <p:sldId id="269" r:id="rId10"/>
+    <p:sldId id="268" r:id="rId6"/>
+    <p:sldId id="267" r:id="rId7"/>
+    <p:sldId id="269" r:id="rId8"/>
   </p:sldIdLst>
   <p:sldSz cx="9144000" cy="6858000" type="screen4x3"/>
   <p:notesSz cx="6858000" cy="9144000"/>
@@ -1626,6 +1627,753 @@
 </file>
 
 <file path=ppt/diagrams/colors3.xml><?xml version="1.0" encoding="utf-8"?>
+<dgm:colorsDef xmlns:dgm="http://schemas.openxmlformats.org/drawingml/2006/diagram" xmlns:a="http://schemas.openxmlformats.org/drawingml/2006/main" uniqueId="urn:microsoft.com/office/officeart/2005/8/colors/accent1_2">
+  <dgm:title val=""/>
+  <dgm:desc val=""/>
+  <dgm:catLst>
+    <dgm:cat type="accent1" pri="11200"/>
+  </dgm:catLst>
+  <dgm:styleLbl name="node0">
+    <dgm:fillClrLst meth="repeat">
+      <a:schemeClr val="accent1"/>
+    </dgm:fillClrLst>
+    <dgm:linClrLst meth="repeat">
+      <a:schemeClr val="lt1"/>
+    </dgm:linClrLst>
+    <dgm:effectClrLst/>
+    <dgm:txLinClrLst/>
+    <dgm:txFillClrLst/>
+    <dgm:txEffectClrLst/>
+  </dgm:styleLbl>
+  <dgm:styleLbl name="alignNode1">
+    <dgm:fillClrLst meth="repeat">
+      <a:schemeClr val="accent1"/>
+    </dgm:fillClrLst>
+    <dgm:linClrLst meth="repeat">
+      <a:schemeClr val="accent1"/>
+    </dgm:linClrLst>
+    <dgm:effectClrLst/>
+    <dgm:txLinClrLst/>
+    <dgm:txFillClrLst/>
+    <dgm:txEffectClrLst/>
+  </dgm:styleLbl>
+  <dgm:styleLbl name="node1">
+    <dgm:fillClrLst meth="repeat">
+      <a:schemeClr val="accent1"/>
+    </dgm:fillClrLst>
+    <dgm:linClrLst meth="repeat">
+      <a:schemeClr val="lt1"/>
+    </dgm:linClrLst>
+    <dgm:effectClrLst/>
+    <dgm:txLinClrLst/>
+    <dgm:txFillClrLst/>
+    <dgm:txEffectClrLst/>
+  </dgm:styleLbl>
+  <dgm:styleLbl name="lnNode1">
+    <dgm:fillClrLst meth="repeat">
+      <a:schemeClr val="accent1"/>
+    </dgm:fillClrLst>
+    <dgm:linClrLst meth="repeat">
+      <a:schemeClr val="lt1"/>
+    </dgm:linClrLst>
+    <dgm:effectClrLst/>
+    <dgm:txLinClrLst/>
+    <dgm:txFillClrLst/>
+    <dgm:txEffectClrLst/>
+  </dgm:styleLbl>
+  <dgm:styleLbl name="vennNode1">
+    <dgm:fillClrLst meth="repeat">
+      <a:schemeClr val="accent1">
+        <a:alpha val="50000"/>
+      </a:schemeClr>
+    </dgm:fillClrLst>
+    <dgm:linClrLst meth="repeat">
+      <a:schemeClr val="lt1"/>
+    </dgm:linClrLst>
+    <dgm:effectClrLst/>
+    <dgm:txLinClrLst/>
+    <dgm:txFillClrLst/>
+    <dgm:txEffectClrLst/>
+  </dgm:styleLbl>
+  <dgm:styleLbl name="node2">
+    <dgm:fillClrLst meth="repeat">
+      <a:schemeClr val="accent1"/>
+    </dgm:fillClrLst>
+    <dgm:linClrLst meth="repeat">
+      <a:schemeClr val="lt1"/>
+    </dgm:linClrLst>
+    <dgm:effectClrLst/>
+    <dgm:txLinClrLst/>
+    <dgm:txFillClrLst/>
+    <dgm:txEffectClrLst/>
+  </dgm:styleLbl>
+  <dgm:styleLbl name="node3">
+    <dgm:fillClrLst meth="repeat">
+      <a:schemeClr val="accent1"/>
+    </dgm:fillClrLst>
+    <dgm:linClrLst meth="repeat">
+      <a:schemeClr val="lt1"/>
+    </dgm:linClrLst>
+    <dgm:effectClrLst/>
+    <dgm:txLinClrLst/>
+    <dgm:txFillClrLst/>
+    <dgm:txEffectClrLst/>
+  </dgm:styleLbl>
+  <dgm:styleLbl name="node4">
+    <dgm:fillClrLst meth="repeat">
+      <a:schemeClr val="accent1"/>
+    </dgm:fillClrLst>
+    <dgm:linClrLst meth="repeat">
+      <a:schemeClr val="lt1"/>
+    </dgm:linClrLst>
+    <dgm:effectClrLst/>
+    <dgm:txLinClrLst/>
+    <dgm:txFillClrLst/>
+    <dgm:txEffectClrLst/>
+  </dgm:styleLbl>
+  <dgm:styleLbl name="fgImgPlace1">
+    <dgm:fillClrLst meth="repeat">
+      <a:schemeClr val="accent1">
+        <a:tint val="50000"/>
+      </a:schemeClr>
+    </dgm:fillClrLst>
+    <dgm:linClrLst meth="repeat">
+      <a:schemeClr val="lt1"/>
+    </dgm:linClrLst>
+    <dgm:effectClrLst/>
+    <dgm:txLinClrLst/>
+    <dgm:txFillClrLst meth="repeat">
+      <a:schemeClr val="lt1"/>
+    </dgm:txFillClrLst>
+    <dgm:txEffectClrLst/>
+  </dgm:styleLbl>
+  <dgm:styleLbl name="alignImgPlace1">
+    <dgm:fillClrLst meth="repeat">
+      <a:schemeClr val="accent1">
+        <a:tint val="50000"/>
+      </a:schemeClr>
+    </dgm:fillClrLst>
+    <dgm:linClrLst meth="repeat">
+      <a:schemeClr val="lt1"/>
+    </dgm:linClrLst>
+    <dgm:effectClrLst/>
+    <dgm:txLinClrLst/>
+    <dgm:txFillClrLst meth="repeat">
+      <a:schemeClr val="lt1"/>
+    </dgm:txFillClrLst>
+    <dgm:txEffectClrLst/>
+  </dgm:styleLbl>
+  <dgm:styleLbl name="bgImgPlace1">
+    <dgm:fillClrLst meth="repeat">
+      <a:schemeClr val="accent1">
+        <a:tint val="50000"/>
+      </a:schemeClr>
+    </dgm:fillClrLst>
+    <dgm:linClrLst meth="repeat">
+      <a:schemeClr val="lt1"/>
+    </dgm:linClrLst>
+    <dgm:effectClrLst/>
+    <dgm:txLinClrLst/>
+    <dgm:txFillClrLst meth="repeat">
+      <a:schemeClr val="lt1"/>
+    </dgm:txFillClrLst>
+    <dgm:txEffectClrLst/>
+  </dgm:styleLbl>
+  <dgm:styleLbl name="sibTrans2D1">
+    <dgm:fillClrLst meth="repeat">
+      <a:schemeClr val="accent1">
+        <a:tint val="60000"/>
+      </a:schemeClr>
+    </dgm:fillClrLst>
+    <dgm:linClrLst meth="repeat">
+      <a:schemeClr val="accent1">
+        <a:tint val="60000"/>
+      </a:schemeClr>
+    </dgm:linClrLst>
+    <dgm:effectClrLst/>
+    <dgm:txLinClrLst/>
+    <dgm:txFillClrLst/>
+    <dgm:txEffectClrLst/>
+  </dgm:styleLbl>
+  <dgm:styleLbl name="fgSibTrans2D1">
+    <dgm:fillClrLst meth="repeat">
+      <a:schemeClr val="accent1">
+        <a:tint val="60000"/>
+      </a:schemeClr>
+    </dgm:fillClrLst>
+    <dgm:linClrLst meth="repeat">
+      <a:schemeClr val="accent1">
+        <a:tint val="60000"/>
+      </a:schemeClr>
+    </dgm:linClrLst>
+    <dgm:effectClrLst/>
+    <dgm:txLinClrLst/>
+    <dgm:txFillClrLst/>
+    <dgm:txEffectClrLst/>
+  </dgm:styleLbl>
+  <dgm:styleLbl name="bgSibTrans2D1">
+    <dgm:fillClrLst meth="repeat">
+      <a:schemeClr val="accent1">
+        <a:tint val="60000"/>
+      </a:schemeClr>
+    </dgm:fillClrLst>
+    <dgm:linClrLst meth="repeat">
+      <a:schemeClr val="accent1">
+        <a:tint val="60000"/>
+      </a:schemeClr>
+    </dgm:linClrLst>
+    <dgm:effectClrLst/>
+    <dgm:txLinClrLst/>
+    <dgm:txFillClrLst/>
+    <dgm:txEffectClrLst/>
+  </dgm:styleLbl>
+  <dgm:styleLbl name="sibTrans1D1">
+    <dgm:fillClrLst meth="repeat">
+      <a:schemeClr val="accent1"/>
+    </dgm:fillClrLst>
+    <dgm:linClrLst meth="repeat">
+      <a:schemeClr val="accent1"/>
+    </dgm:linClrLst>
+    <dgm:effectClrLst/>
+    <dgm:txLinClrLst/>
+    <dgm:txFillClrLst meth="repeat">
+      <a:schemeClr val="tx1"/>
+    </dgm:txFillClrLst>
+    <dgm:txEffectClrLst/>
+  </dgm:styleLbl>
+  <dgm:styleLbl name="callout">
+    <dgm:fillClrLst meth="repeat">
+      <a:schemeClr val="accent1"/>
+    </dgm:fillClrLst>
+    <dgm:linClrLst meth="repeat">
+      <a:schemeClr val="accent1">
+        <a:tint val="50000"/>
+      </a:schemeClr>
+    </dgm:linClrLst>
+    <dgm:effectClrLst/>
+    <dgm:txLinClrLst/>
+    <dgm:txFillClrLst meth="repeat">
+      <a:schemeClr val="tx1"/>
+    </dgm:txFillClrLst>
+    <dgm:txEffectClrLst/>
+  </dgm:styleLbl>
+  <dgm:styleLbl name="asst0">
+    <dgm:fillClrLst meth="repeat">
+      <a:schemeClr val="accent1"/>
+    </dgm:fillClrLst>
+    <dgm:linClrLst meth="repeat">
+      <a:schemeClr val="lt1"/>
+    </dgm:linClrLst>
+    <dgm:effectClrLst/>
+    <dgm:txLinClrLst/>
+    <dgm:txFillClrLst/>
+    <dgm:txEffectClrLst/>
+  </dgm:styleLbl>
+  <dgm:styleLbl name="asst1">
+    <dgm:fillClrLst meth="repeat">
+      <a:schemeClr val="accent1"/>
+    </dgm:fillClrLst>
+    <dgm:linClrLst meth="repeat">
+      <a:schemeClr val="lt1"/>
+    </dgm:linClrLst>
+    <dgm:effectClrLst/>
+    <dgm:txLinClrLst/>
+    <dgm:txFillClrLst/>
+    <dgm:txEffectClrLst/>
+  </dgm:styleLbl>
+  <dgm:styleLbl name="asst2">
+    <dgm:fillClrLst meth="repeat">
+      <a:schemeClr val="accent1"/>
+    </dgm:fillClrLst>
+    <dgm:linClrLst meth="repeat">
+      <a:schemeClr val="lt1"/>
+    </dgm:linClrLst>
+    <dgm:effectClrLst/>
+    <dgm:txLinClrLst/>
+    <dgm:txFillClrLst/>
+    <dgm:txEffectClrLst/>
+  </dgm:styleLbl>
+  <dgm:styleLbl name="asst3">
+    <dgm:fillClrLst meth="repeat">
+      <a:schemeClr val="accent1"/>
+    </dgm:fillClrLst>
+    <dgm:linClrLst meth="repeat">
+      <a:schemeClr val="lt1"/>
+    </dgm:linClrLst>
+    <dgm:effectClrLst/>
+    <dgm:txLinClrLst/>
+    <dgm:txFillClrLst/>
+    <dgm:txEffectClrLst/>
+  </dgm:styleLbl>
+  <dgm:styleLbl name="asst4">
+    <dgm:fillClrLst meth="repeat">
+      <a:schemeClr val="accent1"/>
+    </dgm:fillClrLst>
+    <dgm:linClrLst meth="repeat">
+      <a:schemeClr val="lt1"/>
+    </dgm:linClrLst>
+    <dgm:effectClrLst/>
+    <dgm:txLinClrLst/>
+    <dgm:txFillClrLst/>
+    <dgm:txEffectClrLst/>
+  </dgm:styleLbl>
+  <dgm:styleLbl name="parChTrans2D1">
+    <dgm:fillClrLst meth="repeat">
+      <a:schemeClr val="accent1">
+        <a:tint val="60000"/>
+      </a:schemeClr>
+    </dgm:fillClrLst>
+    <dgm:linClrLst meth="repeat">
+      <a:schemeClr val="accent1">
+        <a:tint val="60000"/>
+      </a:schemeClr>
+    </dgm:linClrLst>
+    <dgm:effectClrLst/>
+    <dgm:txLinClrLst/>
+    <dgm:txFillClrLst meth="repeat">
+      <a:schemeClr val="lt1"/>
+    </dgm:txFillClrLst>
+    <dgm:txEffectClrLst/>
+  </dgm:styleLbl>
+  <dgm:styleLbl name="parChTrans2D2">
+    <dgm:fillClrLst meth="repeat">
+      <a:schemeClr val="accent1"/>
+    </dgm:fillClrLst>
+    <dgm:linClrLst meth="repeat">
+      <a:schemeClr val="accent1"/>
+    </dgm:linClrLst>
+    <dgm:effectClrLst/>
+    <dgm:txLinClrLst/>
+    <dgm:txFillClrLst meth="repeat">
+      <a:schemeClr val="lt1"/>
+    </dgm:txFillClrLst>
+    <dgm:txEffectClrLst/>
+  </dgm:styleLbl>
+  <dgm:styleLbl name="parChTrans2D3">
+    <dgm:fillClrLst meth="repeat">
+      <a:schemeClr val="accent1"/>
+    </dgm:fillClrLst>
+    <dgm:linClrLst meth="repeat">
+      <a:schemeClr val="accent1"/>
+    </dgm:linClrLst>
+    <dgm:effectClrLst/>
+    <dgm:txLinClrLst/>
+    <dgm:txFillClrLst meth="repeat">
+      <a:schemeClr val="lt1"/>
+    </dgm:txFillClrLst>
+    <dgm:txEffectClrLst/>
+  </dgm:styleLbl>
+  <dgm:styleLbl name="parChTrans2D4">
+    <dgm:fillClrLst meth="repeat">
+      <a:schemeClr val="accent1"/>
+    </dgm:fillClrLst>
+    <dgm:linClrLst meth="repeat">
+      <a:schemeClr val="accent1"/>
+    </dgm:linClrLst>
+    <dgm:effectClrLst/>
+    <dgm:txLinClrLst/>
+    <dgm:txFillClrLst meth="repeat">
+      <a:schemeClr val="lt1"/>
+    </dgm:txFillClrLst>
+    <dgm:txEffectClrLst/>
+  </dgm:styleLbl>
+  <dgm:styleLbl name="parChTrans1D1">
+    <dgm:fillClrLst meth="repeat">
+      <a:schemeClr val="accent1"/>
+    </dgm:fillClrLst>
+    <dgm:linClrLst meth="repeat">
+      <a:schemeClr val="accent1">
+        <a:shade val="60000"/>
+      </a:schemeClr>
+    </dgm:linClrLst>
+    <dgm:effectClrLst/>
+    <dgm:txLinClrLst/>
+    <dgm:txFillClrLst meth="repeat">
+      <a:schemeClr val="tx1"/>
+    </dgm:txFillClrLst>
+    <dgm:txEffectClrLst/>
+  </dgm:styleLbl>
+  <dgm:styleLbl name="parChTrans1D2">
+    <dgm:fillClrLst meth="repeat">
+      <a:schemeClr val="accent1"/>
+    </dgm:fillClrLst>
+    <dgm:linClrLst meth="repeat">
+      <a:schemeClr val="accent1">
+        <a:shade val="60000"/>
+      </a:schemeClr>
+    </dgm:linClrLst>
+    <dgm:effectClrLst/>
+    <dgm:txLinClrLst/>
+    <dgm:txFillClrLst meth="repeat">
+      <a:schemeClr val="tx1"/>
+    </dgm:txFillClrLst>
+    <dgm:txEffectClrLst/>
+  </dgm:styleLbl>
+  <dgm:styleLbl name="parChTrans1D3">
+    <dgm:fillClrLst meth="repeat">
+      <a:schemeClr val="accent1"/>
+    </dgm:fillClrLst>
+    <dgm:linClrLst meth="repeat">
+      <a:schemeClr val="accent1">
+        <a:shade val="80000"/>
+      </a:schemeClr>
+    </dgm:linClrLst>
+    <dgm:effectClrLst/>
+    <dgm:txLinClrLst/>
+    <dgm:txFillClrLst meth="repeat">
+      <a:schemeClr val="tx1"/>
+    </dgm:txFillClrLst>
+    <dgm:txEffectClrLst/>
+  </dgm:styleLbl>
+  <dgm:styleLbl name="parChTrans1D4">
+    <dgm:fillClrLst meth="repeat">
+      <a:schemeClr val="accent1"/>
+    </dgm:fillClrLst>
+    <dgm:linClrLst meth="repeat">
+      <a:schemeClr val="accent1">
+        <a:shade val="80000"/>
+      </a:schemeClr>
+    </dgm:linClrLst>
+    <dgm:effectClrLst/>
+    <dgm:txLinClrLst/>
+    <dgm:txFillClrLst meth="repeat">
+      <a:schemeClr val="tx1"/>
+    </dgm:txFillClrLst>
+    <dgm:txEffectClrLst/>
+  </dgm:styleLbl>
+  <dgm:styleLbl name="fgAcc1">
+    <dgm:fillClrLst meth="repeat">
+      <a:schemeClr val="lt1">
+        <a:alpha val="90000"/>
+      </a:schemeClr>
+    </dgm:fillClrLst>
+    <dgm:linClrLst meth="repeat">
+      <a:schemeClr val="accent1"/>
+    </dgm:linClrLst>
+    <dgm:effectClrLst/>
+    <dgm:txLinClrLst/>
+    <dgm:txFillClrLst meth="repeat">
+      <a:schemeClr val="dk1"/>
+    </dgm:txFillClrLst>
+    <dgm:txEffectClrLst/>
+  </dgm:styleLbl>
+  <dgm:styleLbl name="conFgAcc1">
+    <dgm:fillClrLst meth="repeat">
+      <a:schemeClr val="lt1">
+        <a:alpha val="90000"/>
+      </a:schemeClr>
+    </dgm:fillClrLst>
+    <dgm:linClrLst meth="repeat">
+      <a:schemeClr val="accent1"/>
+    </dgm:linClrLst>
+    <dgm:effectClrLst/>
+    <dgm:txLinClrLst/>
+    <dgm:txFillClrLst meth="repeat">
+      <a:schemeClr val="dk1"/>
+    </dgm:txFillClrLst>
+    <dgm:txEffectClrLst/>
+  </dgm:styleLbl>
+  <dgm:styleLbl name="alignAcc1">
+    <dgm:fillClrLst meth="repeat">
+      <a:schemeClr val="lt1">
+        <a:alpha val="90000"/>
+      </a:schemeClr>
+    </dgm:fillClrLst>
+    <dgm:linClrLst meth="repeat">
+      <a:schemeClr val="accent1"/>
+    </dgm:linClrLst>
+    <dgm:effectClrLst/>
+    <dgm:txLinClrLst/>
+    <dgm:txFillClrLst meth="repeat">
+      <a:schemeClr val="dk1"/>
+    </dgm:txFillClrLst>
+    <dgm:txEffectClrLst/>
+  </dgm:styleLbl>
+  <dgm:styleLbl name="trAlignAcc1">
+    <dgm:fillClrLst meth="repeat">
+      <a:schemeClr val="lt1">
+        <a:alpha val="40000"/>
+      </a:schemeClr>
+    </dgm:fillClrLst>
+    <dgm:linClrLst meth="repeat">
+      <a:schemeClr val="accent1"/>
+    </dgm:linClrLst>
+    <dgm:effectClrLst/>
+    <dgm:txLinClrLst/>
+    <dgm:txFillClrLst meth="repeat">
+      <a:schemeClr val="dk1"/>
+    </dgm:txFillClrLst>
+    <dgm:txEffectClrLst/>
+  </dgm:styleLbl>
+  <dgm:styleLbl name="bgAcc1">
+    <dgm:fillClrLst meth="repeat">
+      <a:schemeClr val="lt1">
+        <a:alpha val="90000"/>
+      </a:schemeClr>
+    </dgm:fillClrLst>
+    <dgm:linClrLst meth="repeat">
+      <a:schemeClr val="accent1"/>
+    </dgm:linClrLst>
+    <dgm:effectClrLst/>
+    <dgm:txLinClrLst/>
+    <dgm:txFillClrLst meth="repeat">
+      <a:schemeClr val="dk1"/>
+    </dgm:txFillClrLst>
+    <dgm:txEffectClrLst/>
+  </dgm:styleLbl>
+  <dgm:styleLbl name="solidFgAcc1">
+    <dgm:fillClrLst meth="repeat">
+      <a:schemeClr val="lt1"/>
+    </dgm:fillClrLst>
+    <dgm:linClrLst meth="repeat">
+      <a:schemeClr val="accent1"/>
+    </dgm:linClrLst>
+    <dgm:effectClrLst/>
+    <dgm:txLinClrLst/>
+    <dgm:txFillClrLst meth="repeat">
+      <a:schemeClr val="dk1"/>
+    </dgm:txFillClrLst>
+    <dgm:txEffectClrLst/>
+  </dgm:styleLbl>
+  <dgm:styleLbl name="solidAlignAcc1">
+    <dgm:fillClrLst meth="repeat">
+      <a:schemeClr val="lt1"/>
+    </dgm:fillClrLst>
+    <dgm:linClrLst meth="repeat">
+      <a:schemeClr val="accent1"/>
+    </dgm:linClrLst>
+    <dgm:effectClrLst/>
+    <dgm:txLinClrLst/>
+    <dgm:txFillClrLst meth="repeat">
+      <a:schemeClr val="dk1"/>
+    </dgm:txFillClrLst>
+    <dgm:txEffectClrLst/>
+  </dgm:styleLbl>
+  <dgm:styleLbl name="solidBgAcc1">
+    <dgm:fillClrLst meth="repeat">
+      <a:schemeClr val="lt1"/>
+    </dgm:fillClrLst>
+    <dgm:linClrLst meth="repeat">
+      <a:schemeClr val="accent1"/>
+    </dgm:linClrLst>
+    <dgm:effectClrLst/>
+    <dgm:txLinClrLst/>
+    <dgm:txFillClrLst meth="repeat">
+      <a:schemeClr val="dk1"/>
+    </dgm:txFillClrLst>
+    <dgm:txEffectClrLst/>
+  </dgm:styleLbl>
+  <dgm:styleLbl name="fgAccFollowNode1">
+    <dgm:fillClrLst meth="repeat">
+      <a:schemeClr val="accent1">
+        <a:alpha val="90000"/>
+        <a:tint val="40000"/>
+      </a:schemeClr>
+    </dgm:fillClrLst>
+    <dgm:linClrLst meth="repeat">
+      <a:schemeClr val="accent1">
+        <a:alpha val="90000"/>
+        <a:tint val="40000"/>
+      </a:schemeClr>
+    </dgm:linClrLst>
+    <dgm:effectClrLst/>
+    <dgm:txLinClrLst/>
+    <dgm:txFillClrLst meth="repeat">
+      <a:schemeClr val="dk1"/>
+    </dgm:txFillClrLst>
+    <dgm:txEffectClrLst/>
+  </dgm:styleLbl>
+  <dgm:styleLbl name="alignAccFollowNode1">
+    <dgm:fillClrLst meth="repeat">
+      <a:schemeClr val="accent1">
+        <a:alpha val="90000"/>
+        <a:tint val="40000"/>
+      </a:schemeClr>
+    </dgm:fillClrLst>
+    <dgm:linClrLst meth="repeat">
+      <a:schemeClr val="accent1">
+        <a:alpha val="90000"/>
+        <a:tint val="40000"/>
+      </a:schemeClr>
+    </dgm:linClrLst>
+    <dgm:effectClrLst/>
+    <dgm:txLinClrLst/>
+    <dgm:txFillClrLst meth="repeat">
+      <a:schemeClr val="dk1"/>
+    </dgm:txFillClrLst>
+    <dgm:txEffectClrLst/>
+  </dgm:styleLbl>
+  <dgm:styleLbl name="bgAccFollowNode1">
+    <dgm:fillClrLst meth="repeat">
+      <a:schemeClr val="accent1">
+        <a:alpha val="90000"/>
+        <a:tint val="40000"/>
+      </a:schemeClr>
+    </dgm:fillClrLst>
+    <dgm:linClrLst meth="repeat">
+      <a:schemeClr val="accent1">
+        <a:alpha val="90000"/>
+        <a:tint val="40000"/>
+      </a:schemeClr>
+    </dgm:linClrLst>
+    <dgm:effectClrLst/>
+    <dgm:txLinClrLst/>
+    <dgm:txFillClrLst meth="repeat">
+      <a:schemeClr val="dk1"/>
+    </dgm:txFillClrLst>
+    <dgm:txEffectClrLst/>
+  </dgm:styleLbl>
+  <dgm:styleLbl name="fgAcc0">
+    <dgm:fillClrLst meth="repeat">
+      <a:schemeClr val="lt1">
+        <a:alpha val="90000"/>
+      </a:schemeClr>
+    </dgm:fillClrLst>
+    <dgm:linClrLst meth="repeat">
+      <a:schemeClr val="accent1"/>
+    </dgm:linClrLst>
+    <dgm:effectClrLst/>
+    <dgm:txLinClrLst/>
+    <dgm:txFillClrLst meth="repeat">
+      <a:schemeClr val="dk1"/>
+    </dgm:txFillClrLst>
+    <dgm:txEffectClrLst/>
+  </dgm:styleLbl>
+  <dgm:styleLbl name="fgAcc2">
+    <dgm:fillClrLst meth="repeat">
+      <a:schemeClr val="lt1">
+        <a:alpha val="90000"/>
+      </a:schemeClr>
+    </dgm:fillClrLst>
+    <dgm:linClrLst meth="repeat">
+      <a:schemeClr val="accent1"/>
+    </dgm:linClrLst>
+    <dgm:effectClrLst/>
+    <dgm:txLinClrLst/>
+    <dgm:txFillClrLst meth="repeat">
+      <a:schemeClr val="dk1"/>
+    </dgm:txFillClrLst>
+    <dgm:txEffectClrLst/>
+  </dgm:styleLbl>
+  <dgm:styleLbl name="fgAcc3">
+    <dgm:fillClrLst meth="repeat">
+      <a:schemeClr val="lt1">
+        <a:alpha val="90000"/>
+      </a:schemeClr>
+    </dgm:fillClrLst>
+    <dgm:linClrLst meth="repeat">
+      <a:schemeClr val="accent1"/>
+    </dgm:linClrLst>
+    <dgm:effectClrLst/>
+    <dgm:txLinClrLst/>
+    <dgm:txFillClrLst meth="repeat">
+      <a:schemeClr val="dk1"/>
+    </dgm:txFillClrLst>
+    <dgm:txEffectClrLst/>
+  </dgm:styleLbl>
+  <dgm:styleLbl name="fgAcc4">
+    <dgm:fillClrLst meth="repeat">
+      <a:schemeClr val="lt1">
+        <a:alpha val="90000"/>
+      </a:schemeClr>
+    </dgm:fillClrLst>
+    <dgm:linClrLst meth="repeat">
+      <a:schemeClr val="accent1"/>
+    </dgm:linClrLst>
+    <dgm:effectClrLst/>
+    <dgm:txLinClrLst/>
+    <dgm:txFillClrLst meth="repeat">
+      <a:schemeClr val="dk1"/>
+    </dgm:txFillClrLst>
+    <dgm:txEffectClrLst/>
+  </dgm:styleLbl>
+  <dgm:styleLbl name="bgShp">
+    <dgm:fillClrLst meth="repeat">
+      <a:schemeClr val="accent1">
+        <a:tint val="40000"/>
+      </a:schemeClr>
+    </dgm:fillClrLst>
+    <dgm:linClrLst meth="repeat">
+      <a:schemeClr val="accent1"/>
+    </dgm:linClrLst>
+    <dgm:effectClrLst/>
+    <dgm:txLinClrLst/>
+    <dgm:txFillClrLst meth="repeat">
+      <a:schemeClr val="dk1"/>
+    </dgm:txFillClrLst>
+    <dgm:txEffectClrLst/>
+  </dgm:styleLbl>
+  <dgm:styleLbl name="dkBgShp">
+    <dgm:fillClrLst meth="repeat">
+      <a:schemeClr val="accent1">
+        <a:shade val="80000"/>
+      </a:schemeClr>
+    </dgm:fillClrLst>
+    <dgm:linClrLst meth="repeat">
+      <a:schemeClr val="accent1"/>
+    </dgm:linClrLst>
+    <dgm:effectClrLst/>
+    <dgm:txLinClrLst/>
+    <dgm:txFillClrLst meth="repeat">
+      <a:schemeClr val="lt1"/>
+    </dgm:txFillClrLst>
+    <dgm:txEffectClrLst/>
+  </dgm:styleLbl>
+  <dgm:styleLbl name="trBgShp">
+    <dgm:fillClrLst meth="repeat">
+      <a:schemeClr val="accent1">
+        <a:tint val="50000"/>
+        <a:alpha val="40000"/>
+      </a:schemeClr>
+    </dgm:fillClrLst>
+    <dgm:linClrLst meth="repeat">
+      <a:schemeClr val="accent1"/>
+    </dgm:linClrLst>
+    <dgm:effectClrLst/>
+    <dgm:txLinClrLst/>
+    <dgm:txFillClrLst meth="repeat">
+      <a:schemeClr val="lt1"/>
+    </dgm:txFillClrLst>
+    <dgm:txEffectClrLst/>
+  </dgm:styleLbl>
+  <dgm:styleLbl name="fgShp">
+    <dgm:fillClrLst meth="repeat">
+      <a:schemeClr val="accent1">
+        <a:tint val="60000"/>
+      </a:schemeClr>
+    </dgm:fillClrLst>
+    <dgm:linClrLst meth="repeat">
+      <a:schemeClr val="lt1"/>
+    </dgm:linClrLst>
+    <dgm:effectClrLst/>
+    <dgm:txLinClrLst/>
+    <dgm:txFillClrLst meth="repeat">
+      <a:schemeClr val="dk1"/>
+    </dgm:txFillClrLst>
+    <dgm:txEffectClrLst/>
+  </dgm:styleLbl>
+  <dgm:styleLbl name="revTx">
+    <dgm:fillClrLst meth="repeat">
+      <a:schemeClr val="lt1">
+        <a:alpha val="0"/>
+      </a:schemeClr>
+    </dgm:fillClrLst>
+    <dgm:linClrLst meth="repeat">
+      <a:schemeClr val="dk1">
+        <a:alpha val="0"/>
+      </a:schemeClr>
+    </dgm:linClrLst>
+    <dgm:effectClrLst/>
+    <dgm:txLinClrLst/>
+    <dgm:txFillClrLst meth="repeat">
+      <a:schemeClr val="tx1"/>
+    </dgm:txFillClrLst>
+    <dgm:txEffectClrLst/>
+  </dgm:styleLbl>
+</dgm:colorsDef>
+</file>
+
+<file path=ppt/diagrams/colors4.xml><?xml version="1.0" encoding="utf-8"?>
 <dgm:colorsDef xmlns:dgm="http://schemas.openxmlformats.org/drawingml/2006/diagram" xmlns:a="http://schemas.openxmlformats.org/drawingml/2006/main" uniqueId="urn:microsoft.com/office/officeart/2005/8/colors/accent1_2">
   <dgm:title val=""/>
   <dgm:desc val=""/>
@@ -4262,6 +5010,391 @@
     <dgm:cxn modelId="{44EA6807-2361-4981-90DD-637342461FD9}" type="presParOf" srcId="{0956845D-FDF9-4059-AC1E-29D199204DF7}" destId="{1BD23E74-EEE2-4738-8BC2-BDC7DBDF34B1}" srcOrd="2" destOrd="0" presId="urn:microsoft.com/office/officeart/2008/layout/NameandTitleOrganizationalChart"/>
     <dgm:cxn modelId="{E9EF8969-1669-4453-83E6-186F9B8C02FD}" type="presParOf" srcId="{83C379DA-92F4-4C6E-928E-C63B33A715F9}" destId="{1994923D-3C4A-4BA0-B70D-02529C1657FD}" srcOrd="2" destOrd="0" presId="urn:microsoft.com/office/officeart/2008/layout/NameandTitleOrganizationalChart"/>
     <dgm:cxn modelId="{E6DF749A-6809-45B1-85C0-7A7D3CC46AAF}" type="presParOf" srcId="{69F68106-797E-4B57-B768-1A5331996344}" destId="{45CFDCB7-C312-476E-BEEF-2E21591910E5}" srcOrd="2" destOrd="0" presId="urn:microsoft.com/office/officeart/2008/layout/NameandTitleOrganizationalChart"/>
+  </dgm:cxnLst>
+  <dgm:bg/>
+  <dgm:whole/>
+  <dgm:extLst>
+    <a:ext uri="http://schemas.microsoft.com/office/drawing/2008/diagram">
+      <dsp:dataModelExt xmlns:dsp="http://schemas.microsoft.com/office/drawing/2008/diagram" relId="rId8" minVer="http://schemas.openxmlformats.org/drawingml/2006/diagram"/>
+    </a:ext>
+  </dgm:extLst>
+</dgm:dataModel>
+</file>
+
+<file path=ppt/diagrams/data4.xml><?xml version="1.0" encoding="utf-8"?>
+<dgm:dataModel xmlns:dgm="http://schemas.openxmlformats.org/drawingml/2006/diagram" xmlns:a="http://schemas.openxmlformats.org/drawingml/2006/main">
+  <dgm:ptLst>
+    <dgm:pt modelId="{62844738-F319-4889-B5C3-643A2448C185}" type="doc">
+      <dgm:prSet loTypeId="urn:microsoft.com/office/officeart/2005/8/layout/hierarchy2" loCatId="hierarchy" qsTypeId="urn:microsoft.com/office/officeart/2005/8/quickstyle/simple1" qsCatId="simple" csTypeId="urn:microsoft.com/office/officeart/2005/8/colors/accent1_2" csCatId="accent1" phldr="1"/>
+      <dgm:spPr/>
+      <dgm:t>
+        <a:bodyPr/>
+        <a:lstStyle/>
+        <a:p>
+          <a:endParaRPr lang="de-DE"/>
+        </a:p>
+      </dgm:t>
+    </dgm:pt>
+    <dgm:pt modelId="{0698FB64-983D-48D5-BC69-027C0B2D7677}">
+      <dgm:prSet phldrT="[Text]"/>
+      <dgm:spPr/>
+      <dgm:t>
+        <a:bodyPr/>
+        <a:lstStyle/>
+        <a:p>
+          <a:r>
+            <a:rPr lang="de-DE" dirty="0" smtClean="0"/>
+            <a:t>Berechnung des Stundenplan</a:t>
+          </a:r>
+          <a:endParaRPr lang="de-DE" dirty="0"/>
+        </a:p>
+      </dgm:t>
+    </dgm:pt>
+    <dgm:pt modelId="{5A531609-FAC6-4FC4-8FEC-AEEADCEAC22B}" type="parTrans" cxnId="{97849E33-46EC-40B8-A936-F036461BD312}">
+      <dgm:prSet/>
+      <dgm:spPr/>
+      <dgm:t>
+        <a:bodyPr/>
+        <a:lstStyle/>
+        <a:p>
+          <a:endParaRPr lang="de-DE"/>
+        </a:p>
+      </dgm:t>
+    </dgm:pt>
+    <dgm:pt modelId="{34AF801F-90CB-430C-8234-BD1F30A3BBC6}" type="sibTrans" cxnId="{97849E33-46EC-40B8-A936-F036461BD312}">
+      <dgm:prSet/>
+      <dgm:spPr/>
+      <dgm:t>
+        <a:bodyPr/>
+        <a:lstStyle/>
+        <a:p>
+          <a:endParaRPr lang="de-DE"/>
+        </a:p>
+      </dgm:t>
+    </dgm:pt>
+    <dgm:pt modelId="{EF7628DA-CF13-4FFA-8405-E4515B1A48B6}">
+      <dgm:prSet phldrT="[Text]"/>
+      <dgm:spPr/>
+      <dgm:t>
+        <a:bodyPr/>
+        <a:lstStyle/>
+        <a:p>
+          <a:r>
+            <a:rPr lang="de-DE" dirty="0" err="1" smtClean="0"/>
+            <a:t>Urplan</a:t>
+          </a:r>
+          <a:endParaRPr lang="de-DE" dirty="0"/>
+        </a:p>
+      </dgm:t>
+    </dgm:pt>
+    <dgm:pt modelId="{B8269F78-00C3-4504-8A4D-B75B7C39C29D}" type="parTrans" cxnId="{96AEF4F6-A02A-4888-A21A-86FE31225DA6}">
+      <dgm:prSet/>
+      <dgm:spPr/>
+      <dgm:t>
+        <a:bodyPr/>
+        <a:lstStyle/>
+        <a:p>
+          <a:endParaRPr lang="de-DE"/>
+        </a:p>
+      </dgm:t>
+    </dgm:pt>
+    <dgm:pt modelId="{ED9A143B-A343-495A-80E9-54CF61500F5A}" type="sibTrans" cxnId="{96AEF4F6-A02A-4888-A21A-86FE31225DA6}">
+      <dgm:prSet/>
+      <dgm:spPr/>
+      <dgm:t>
+        <a:bodyPr/>
+        <a:lstStyle/>
+        <a:p>
+          <a:endParaRPr lang="de-DE"/>
+        </a:p>
+      </dgm:t>
+    </dgm:pt>
+    <dgm:pt modelId="{970A1FA6-6CC3-4FBD-B3D1-7136DA21E978}">
+      <dgm:prSet phldrT="[Text]"/>
+      <dgm:spPr/>
+      <dgm:t>
+        <a:bodyPr/>
+        <a:lstStyle/>
+        <a:p>
+          <a:r>
+            <a:rPr lang="de-DE" dirty="0" smtClean="0"/>
+            <a:t>Optimierung</a:t>
+          </a:r>
+          <a:endParaRPr lang="de-DE" dirty="0"/>
+        </a:p>
+      </dgm:t>
+    </dgm:pt>
+    <dgm:pt modelId="{B5E42850-3929-4F7B-9D02-2F1FFBFD7E30}" type="parTrans" cxnId="{06B35F83-D32F-43A6-8F05-236654BED0FC}">
+      <dgm:prSet/>
+      <dgm:spPr/>
+      <dgm:t>
+        <a:bodyPr/>
+        <a:lstStyle/>
+        <a:p>
+          <a:endParaRPr lang="de-DE"/>
+        </a:p>
+      </dgm:t>
+    </dgm:pt>
+    <dgm:pt modelId="{257E841D-505A-4BD9-A8D4-6A8614C32919}" type="sibTrans" cxnId="{06B35F83-D32F-43A6-8F05-236654BED0FC}">
+      <dgm:prSet/>
+      <dgm:spPr/>
+      <dgm:t>
+        <a:bodyPr/>
+        <a:lstStyle/>
+        <a:p>
+          <a:endParaRPr lang="de-DE"/>
+        </a:p>
+      </dgm:t>
+    </dgm:pt>
+    <dgm:pt modelId="{764DD4B6-E833-4D1F-A3A3-74C1A046B6B0}">
+      <dgm:prSet phldrT="[Text]"/>
+      <dgm:spPr/>
+      <dgm:t>
+        <a:bodyPr/>
+        <a:lstStyle/>
+        <a:p>
+          <a:r>
+            <a:rPr lang="de-DE" dirty="0" smtClean="0"/>
+            <a:t>Neue Applikations-funktionen</a:t>
+          </a:r>
+          <a:endParaRPr lang="de-DE" dirty="0"/>
+        </a:p>
+      </dgm:t>
+    </dgm:pt>
+    <dgm:pt modelId="{092DD31F-5554-4CB9-BDAB-0442C264130D}" type="parTrans" cxnId="{48D46637-F14D-42F4-ABA7-C60D3DCF10A0}">
+      <dgm:prSet/>
+      <dgm:spPr/>
+      <dgm:t>
+        <a:bodyPr/>
+        <a:lstStyle/>
+        <a:p>
+          <a:endParaRPr lang="de-DE"/>
+        </a:p>
+      </dgm:t>
+    </dgm:pt>
+    <dgm:pt modelId="{07FADA52-E5DC-431D-A861-7A180120FA2F}" type="sibTrans" cxnId="{48D46637-F14D-42F4-ABA7-C60D3DCF10A0}">
+      <dgm:prSet/>
+      <dgm:spPr/>
+      <dgm:t>
+        <a:bodyPr/>
+        <a:lstStyle/>
+        <a:p>
+          <a:endParaRPr lang="de-DE"/>
+        </a:p>
+      </dgm:t>
+    </dgm:pt>
+    <dgm:pt modelId="{847577CC-E286-4265-AD20-33D861DCCCEB}" type="pres">
+      <dgm:prSet presAssocID="{62844738-F319-4889-B5C3-643A2448C185}" presName="diagram" presStyleCnt="0">
+        <dgm:presLayoutVars>
+          <dgm:chPref val="1"/>
+          <dgm:dir/>
+          <dgm:animOne val="branch"/>
+          <dgm:animLvl val="lvl"/>
+          <dgm:resizeHandles val="exact"/>
+        </dgm:presLayoutVars>
+      </dgm:prSet>
+      <dgm:spPr/>
+      <dgm:t>
+        <a:bodyPr/>
+        <a:lstStyle/>
+        <a:p>
+          <a:endParaRPr lang="de-DE"/>
+        </a:p>
+      </dgm:t>
+    </dgm:pt>
+    <dgm:pt modelId="{E112F2FD-21D7-48F7-8D50-A1205FDEE7C0}" type="pres">
+      <dgm:prSet presAssocID="{0698FB64-983D-48D5-BC69-027C0B2D7677}" presName="root1" presStyleCnt="0"/>
+      <dgm:spPr/>
+    </dgm:pt>
+    <dgm:pt modelId="{25F847DC-1964-4965-B71B-B2A16DF0F4F7}" type="pres">
+      <dgm:prSet presAssocID="{0698FB64-983D-48D5-BC69-027C0B2D7677}" presName="LevelOneTextNode" presStyleLbl="node0" presStyleIdx="0" presStyleCnt="1">
+        <dgm:presLayoutVars>
+          <dgm:chPref val="3"/>
+        </dgm:presLayoutVars>
+      </dgm:prSet>
+      <dgm:spPr/>
+      <dgm:t>
+        <a:bodyPr/>
+        <a:lstStyle/>
+        <a:p>
+          <a:endParaRPr lang="de-DE"/>
+        </a:p>
+      </dgm:t>
+    </dgm:pt>
+    <dgm:pt modelId="{07501E0B-205C-416C-8CA0-B823E0EEBC0E}" type="pres">
+      <dgm:prSet presAssocID="{0698FB64-983D-48D5-BC69-027C0B2D7677}" presName="level2hierChild" presStyleCnt="0"/>
+      <dgm:spPr/>
+    </dgm:pt>
+    <dgm:pt modelId="{7AF697F1-ECEC-46D8-8C0F-77003A6EE70E}" type="pres">
+      <dgm:prSet presAssocID="{B8269F78-00C3-4504-8A4D-B75B7C39C29D}" presName="conn2-1" presStyleLbl="parChTrans1D2" presStyleIdx="0" presStyleCnt="2"/>
+      <dgm:spPr/>
+      <dgm:t>
+        <a:bodyPr/>
+        <a:lstStyle/>
+        <a:p>
+          <a:endParaRPr lang="de-DE"/>
+        </a:p>
+      </dgm:t>
+    </dgm:pt>
+    <dgm:pt modelId="{7ED8256E-4FD9-4F02-B031-AB4FEF4ECF0B}" type="pres">
+      <dgm:prSet presAssocID="{B8269F78-00C3-4504-8A4D-B75B7C39C29D}" presName="connTx" presStyleLbl="parChTrans1D2" presStyleIdx="0" presStyleCnt="2"/>
+      <dgm:spPr/>
+      <dgm:t>
+        <a:bodyPr/>
+        <a:lstStyle/>
+        <a:p>
+          <a:endParaRPr lang="de-DE"/>
+        </a:p>
+      </dgm:t>
+    </dgm:pt>
+    <dgm:pt modelId="{85B5925D-6584-4BA1-AD3A-DF1C8AC99287}" type="pres">
+      <dgm:prSet presAssocID="{EF7628DA-CF13-4FFA-8405-E4515B1A48B6}" presName="root2" presStyleCnt="0"/>
+      <dgm:spPr/>
+    </dgm:pt>
+    <dgm:pt modelId="{56CAB2B3-2A2D-49DD-B1FF-90910D92DF8C}" type="pres">
+      <dgm:prSet presAssocID="{EF7628DA-CF13-4FFA-8405-E4515B1A48B6}" presName="LevelTwoTextNode" presStyleLbl="node2" presStyleIdx="0" presStyleCnt="2">
+        <dgm:presLayoutVars>
+          <dgm:chPref val="3"/>
+        </dgm:presLayoutVars>
+      </dgm:prSet>
+      <dgm:spPr/>
+      <dgm:t>
+        <a:bodyPr/>
+        <a:lstStyle/>
+        <a:p>
+          <a:endParaRPr lang="de-DE"/>
+        </a:p>
+      </dgm:t>
+    </dgm:pt>
+    <dgm:pt modelId="{93010DBD-A786-4057-A6C1-F80400C215DE}" type="pres">
+      <dgm:prSet presAssocID="{EF7628DA-CF13-4FFA-8405-E4515B1A48B6}" presName="level3hierChild" presStyleCnt="0"/>
+      <dgm:spPr/>
+    </dgm:pt>
+    <dgm:pt modelId="{D57D5784-8271-44EE-9255-F3A40DACF594}" type="pres">
+      <dgm:prSet presAssocID="{092DD31F-5554-4CB9-BDAB-0442C264130D}" presName="conn2-1" presStyleLbl="parChTrans1D3" presStyleIdx="0" presStyleCnt="1"/>
+      <dgm:spPr/>
+      <dgm:t>
+        <a:bodyPr/>
+        <a:lstStyle/>
+        <a:p>
+          <a:endParaRPr lang="de-DE"/>
+        </a:p>
+      </dgm:t>
+    </dgm:pt>
+    <dgm:pt modelId="{05DA0A9D-99DD-4448-917C-6E4950877E4B}" type="pres">
+      <dgm:prSet presAssocID="{092DD31F-5554-4CB9-BDAB-0442C264130D}" presName="connTx" presStyleLbl="parChTrans1D3" presStyleIdx="0" presStyleCnt="1"/>
+      <dgm:spPr/>
+      <dgm:t>
+        <a:bodyPr/>
+        <a:lstStyle/>
+        <a:p>
+          <a:endParaRPr lang="de-DE"/>
+        </a:p>
+      </dgm:t>
+    </dgm:pt>
+    <dgm:pt modelId="{62181DCD-D050-4E8B-B397-D76EDF51F437}" type="pres">
+      <dgm:prSet presAssocID="{764DD4B6-E833-4D1F-A3A3-74C1A046B6B0}" presName="root2" presStyleCnt="0"/>
+      <dgm:spPr/>
+    </dgm:pt>
+    <dgm:pt modelId="{162ABDF3-A5CF-45B1-957D-CA85B04394E5}" type="pres">
+      <dgm:prSet presAssocID="{764DD4B6-E833-4D1F-A3A3-74C1A046B6B0}" presName="LevelTwoTextNode" presStyleLbl="node3" presStyleIdx="0" presStyleCnt="1">
+        <dgm:presLayoutVars>
+          <dgm:chPref val="3"/>
+        </dgm:presLayoutVars>
+      </dgm:prSet>
+      <dgm:spPr/>
+      <dgm:t>
+        <a:bodyPr/>
+        <a:lstStyle/>
+        <a:p>
+          <a:endParaRPr lang="de-DE"/>
+        </a:p>
+      </dgm:t>
+    </dgm:pt>
+    <dgm:pt modelId="{E1E437D6-3893-4FDD-837D-29159E987B65}" type="pres">
+      <dgm:prSet presAssocID="{764DD4B6-E833-4D1F-A3A3-74C1A046B6B0}" presName="level3hierChild" presStyleCnt="0"/>
+      <dgm:spPr/>
+    </dgm:pt>
+    <dgm:pt modelId="{51E5A669-165A-406F-8A48-2DEF0BD84EAA}" type="pres">
+      <dgm:prSet presAssocID="{B5E42850-3929-4F7B-9D02-2F1FFBFD7E30}" presName="conn2-1" presStyleLbl="parChTrans1D2" presStyleIdx="1" presStyleCnt="2"/>
+      <dgm:spPr/>
+      <dgm:t>
+        <a:bodyPr/>
+        <a:lstStyle/>
+        <a:p>
+          <a:endParaRPr lang="de-DE"/>
+        </a:p>
+      </dgm:t>
+    </dgm:pt>
+    <dgm:pt modelId="{C6F2E4EB-5A22-4750-B921-8C7E11C15D85}" type="pres">
+      <dgm:prSet presAssocID="{B5E42850-3929-4F7B-9D02-2F1FFBFD7E30}" presName="connTx" presStyleLbl="parChTrans1D2" presStyleIdx="1" presStyleCnt="2"/>
+      <dgm:spPr/>
+      <dgm:t>
+        <a:bodyPr/>
+        <a:lstStyle/>
+        <a:p>
+          <a:endParaRPr lang="de-DE"/>
+        </a:p>
+      </dgm:t>
+    </dgm:pt>
+    <dgm:pt modelId="{785972B5-A8DB-4A28-BFDB-97FC00BE94D2}" type="pres">
+      <dgm:prSet presAssocID="{970A1FA6-6CC3-4FBD-B3D1-7136DA21E978}" presName="root2" presStyleCnt="0"/>
+      <dgm:spPr/>
+    </dgm:pt>
+    <dgm:pt modelId="{E5883944-5992-4187-A1EE-4E4B5E1C4BA7}" type="pres">
+      <dgm:prSet presAssocID="{970A1FA6-6CC3-4FBD-B3D1-7136DA21E978}" presName="LevelTwoTextNode" presStyleLbl="node2" presStyleIdx="1" presStyleCnt="2">
+        <dgm:presLayoutVars>
+          <dgm:chPref val="3"/>
+        </dgm:presLayoutVars>
+      </dgm:prSet>
+      <dgm:spPr/>
+      <dgm:t>
+        <a:bodyPr/>
+        <a:lstStyle/>
+        <a:p>
+          <a:endParaRPr lang="de-DE"/>
+        </a:p>
+      </dgm:t>
+    </dgm:pt>
+    <dgm:pt modelId="{064164AA-69B9-411F-8001-29939D974917}" type="pres">
+      <dgm:prSet presAssocID="{970A1FA6-6CC3-4FBD-B3D1-7136DA21E978}" presName="level3hierChild" presStyleCnt="0"/>
+      <dgm:spPr/>
+    </dgm:pt>
+  </dgm:ptLst>
+  <dgm:cxnLst>
+    <dgm:cxn modelId="{EFA9BFF2-5203-42E5-810F-B1B2FFF4CE56}" type="presOf" srcId="{B5E42850-3929-4F7B-9D02-2F1FFBFD7E30}" destId="{C6F2E4EB-5A22-4750-B921-8C7E11C15D85}" srcOrd="1" destOrd="0" presId="urn:microsoft.com/office/officeart/2005/8/layout/hierarchy2"/>
+    <dgm:cxn modelId="{75266947-2196-4BCB-91D8-5F583FE07662}" type="presOf" srcId="{EF7628DA-CF13-4FFA-8405-E4515B1A48B6}" destId="{56CAB2B3-2A2D-49DD-B1FF-90910D92DF8C}" srcOrd="0" destOrd="0" presId="urn:microsoft.com/office/officeart/2005/8/layout/hierarchy2"/>
+    <dgm:cxn modelId="{256104F7-D835-4435-B91F-4CAE5B7EDBB2}" type="presOf" srcId="{0698FB64-983D-48D5-BC69-027C0B2D7677}" destId="{25F847DC-1964-4965-B71B-B2A16DF0F4F7}" srcOrd="0" destOrd="0" presId="urn:microsoft.com/office/officeart/2005/8/layout/hierarchy2"/>
+    <dgm:cxn modelId="{F86AA309-363D-418F-8CC2-C81ADC7FED28}" type="presOf" srcId="{B8269F78-00C3-4504-8A4D-B75B7C39C29D}" destId="{7AF697F1-ECEC-46D8-8C0F-77003A6EE70E}" srcOrd="0" destOrd="0" presId="urn:microsoft.com/office/officeart/2005/8/layout/hierarchy2"/>
+    <dgm:cxn modelId="{932493E0-483F-4E3F-B5E7-D09F3B39EFC2}" type="presOf" srcId="{764DD4B6-E833-4D1F-A3A3-74C1A046B6B0}" destId="{162ABDF3-A5CF-45B1-957D-CA85B04394E5}" srcOrd="0" destOrd="0" presId="urn:microsoft.com/office/officeart/2005/8/layout/hierarchy2"/>
+    <dgm:cxn modelId="{B364A5F6-A71E-4DD8-AA3B-DE20E0E230A0}" type="presOf" srcId="{B8269F78-00C3-4504-8A4D-B75B7C39C29D}" destId="{7ED8256E-4FD9-4F02-B031-AB4FEF4ECF0B}" srcOrd="1" destOrd="0" presId="urn:microsoft.com/office/officeart/2005/8/layout/hierarchy2"/>
+    <dgm:cxn modelId="{06B35F83-D32F-43A6-8F05-236654BED0FC}" srcId="{0698FB64-983D-48D5-BC69-027C0B2D7677}" destId="{970A1FA6-6CC3-4FBD-B3D1-7136DA21E978}" srcOrd="1" destOrd="0" parTransId="{B5E42850-3929-4F7B-9D02-2F1FFBFD7E30}" sibTransId="{257E841D-505A-4BD9-A8D4-6A8614C32919}"/>
+    <dgm:cxn modelId="{48D46637-F14D-42F4-ABA7-C60D3DCF10A0}" srcId="{EF7628DA-CF13-4FFA-8405-E4515B1A48B6}" destId="{764DD4B6-E833-4D1F-A3A3-74C1A046B6B0}" srcOrd="0" destOrd="0" parTransId="{092DD31F-5554-4CB9-BDAB-0442C264130D}" sibTransId="{07FADA52-E5DC-431D-A861-7A180120FA2F}"/>
+    <dgm:cxn modelId="{306C8F3F-5A1F-43C7-9F64-05C4E8D052D7}" type="presOf" srcId="{62844738-F319-4889-B5C3-643A2448C185}" destId="{847577CC-E286-4265-AD20-33D861DCCCEB}" srcOrd="0" destOrd="0" presId="urn:microsoft.com/office/officeart/2005/8/layout/hierarchy2"/>
+    <dgm:cxn modelId="{10390F78-9711-439B-90F9-26D339BB64B2}" type="presOf" srcId="{970A1FA6-6CC3-4FBD-B3D1-7136DA21E978}" destId="{E5883944-5992-4187-A1EE-4E4B5E1C4BA7}" srcOrd="0" destOrd="0" presId="urn:microsoft.com/office/officeart/2005/8/layout/hierarchy2"/>
+    <dgm:cxn modelId="{F48F1144-6F81-4063-BA81-15D8789E3CE5}" type="presOf" srcId="{092DD31F-5554-4CB9-BDAB-0442C264130D}" destId="{05DA0A9D-99DD-4448-917C-6E4950877E4B}" srcOrd="1" destOrd="0" presId="urn:microsoft.com/office/officeart/2005/8/layout/hierarchy2"/>
+    <dgm:cxn modelId="{49071845-0D44-4256-A430-8F46F9BF8F4A}" type="presOf" srcId="{B5E42850-3929-4F7B-9D02-2F1FFBFD7E30}" destId="{51E5A669-165A-406F-8A48-2DEF0BD84EAA}" srcOrd="0" destOrd="0" presId="urn:microsoft.com/office/officeart/2005/8/layout/hierarchy2"/>
+    <dgm:cxn modelId="{97849E33-46EC-40B8-A936-F036461BD312}" srcId="{62844738-F319-4889-B5C3-643A2448C185}" destId="{0698FB64-983D-48D5-BC69-027C0B2D7677}" srcOrd="0" destOrd="0" parTransId="{5A531609-FAC6-4FC4-8FEC-AEEADCEAC22B}" sibTransId="{34AF801F-90CB-430C-8234-BD1F30A3BBC6}"/>
+    <dgm:cxn modelId="{96AEF4F6-A02A-4888-A21A-86FE31225DA6}" srcId="{0698FB64-983D-48D5-BC69-027C0B2D7677}" destId="{EF7628DA-CF13-4FFA-8405-E4515B1A48B6}" srcOrd="0" destOrd="0" parTransId="{B8269F78-00C3-4504-8A4D-B75B7C39C29D}" sibTransId="{ED9A143B-A343-495A-80E9-54CF61500F5A}"/>
+    <dgm:cxn modelId="{97376DE9-1651-46B6-BC87-9252D29A7BCC}" type="presOf" srcId="{092DD31F-5554-4CB9-BDAB-0442C264130D}" destId="{D57D5784-8271-44EE-9255-F3A40DACF594}" srcOrd="0" destOrd="0" presId="urn:microsoft.com/office/officeart/2005/8/layout/hierarchy2"/>
+    <dgm:cxn modelId="{D0055517-86D3-47EB-8ABB-BD95CFDF26FA}" type="presParOf" srcId="{847577CC-E286-4265-AD20-33D861DCCCEB}" destId="{E112F2FD-21D7-48F7-8D50-A1205FDEE7C0}" srcOrd="0" destOrd="0" presId="urn:microsoft.com/office/officeart/2005/8/layout/hierarchy2"/>
+    <dgm:cxn modelId="{C2E2277B-5A8E-49B3-8888-889FBF19BA6C}" type="presParOf" srcId="{E112F2FD-21D7-48F7-8D50-A1205FDEE7C0}" destId="{25F847DC-1964-4965-B71B-B2A16DF0F4F7}" srcOrd="0" destOrd="0" presId="urn:microsoft.com/office/officeart/2005/8/layout/hierarchy2"/>
+    <dgm:cxn modelId="{E90ED1C8-DEBA-433B-9895-6F734A047C59}" type="presParOf" srcId="{E112F2FD-21D7-48F7-8D50-A1205FDEE7C0}" destId="{07501E0B-205C-416C-8CA0-B823E0EEBC0E}" srcOrd="1" destOrd="0" presId="urn:microsoft.com/office/officeart/2005/8/layout/hierarchy2"/>
+    <dgm:cxn modelId="{7F225924-137E-48CC-92CE-9D295C0CAF1E}" type="presParOf" srcId="{07501E0B-205C-416C-8CA0-B823E0EEBC0E}" destId="{7AF697F1-ECEC-46D8-8C0F-77003A6EE70E}" srcOrd="0" destOrd="0" presId="urn:microsoft.com/office/officeart/2005/8/layout/hierarchy2"/>
+    <dgm:cxn modelId="{72EC43E7-73BD-4E07-8AE0-110C1D01F8B9}" type="presParOf" srcId="{7AF697F1-ECEC-46D8-8C0F-77003A6EE70E}" destId="{7ED8256E-4FD9-4F02-B031-AB4FEF4ECF0B}" srcOrd="0" destOrd="0" presId="urn:microsoft.com/office/officeart/2005/8/layout/hierarchy2"/>
+    <dgm:cxn modelId="{DCBEDE50-37D4-418A-B83F-2CD08CD52C9C}" type="presParOf" srcId="{07501E0B-205C-416C-8CA0-B823E0EEBC0E}" destId="{85B5925D-6584-4BA1-AD3A-DF1C8AC99287}" srcOrd="1" destOrd="0" presId="urn:microsoft.com/office/officeart/2005/8/layout/hierarchy2"/>
+    <dgm:cxn modelId="{0BED94CE-DB6A-473B-9781-A0997C8838C1}" type="presParOf" srcId="{85B5925D-6584-4BA1-AD3A-DF1C8AC99287}" destId="{56CAB2B3-2A2D-49DD-B1FF-90910D92DF8C}" srcOrd="0" destOrd="0" presId="urn:microsoft.com/office/officeart/2005/8/layout/hierarchy2"/>
+    <dgm:cxn modelId="{EB7EA3B8-FC90-4871-8816-3021894F4F46}" type="presParOf" srcId="{85B5925D-6584-4BA1-AD3A-DF1C8AC99287}" destId="{93010DBD-A786-4057-A6C1-F80400C215DE}" srcOrd="1" destOrd="0" presId="urn:microsoft.com/office/officeart/2005/8/layout/hierarchy2"/>
+    <dgm:cxn modelId="{9E94E4CA-E505-4D42-A032-074861DF649F}" type="presParOf" srcId="{93010DBD-A786-4057-A6C1-F80400C215DE}" destId="{D57D5784-8271-44EE-9255-F3A40DACF594}" srcOrd="0" destOrd="0" presId="urn:microsoft.com/office/officeart/2005/8/layout/hierarchy2"/>
+    <dgm:cxn modelId="{5CD93C33-9559-4C46-BE5B-02F4ADE4B3B0}" type="presParOf" srcId="{D57D5784-8271-44EE-9255-F3A40DACF594}" destId="{05DA0A9D-99DD-4448-917C-6E4950877E4B}" srcOrd="0" destOrd="0" presId="urn:microsoft.com/office/officeart/2005/8/layout/hierarchy2"/>
+    <dgm:cxn modelId="{252A9B1D-D60C-400A-9675-D1329E4825F8}" type="presParOf" srcId="{93010DBD-A786-4057-A6C1-F80400C215DE}" destId="{62181DCD-D050-4E8B-B397-D76EDF51F437}" srcOrd="1" destOrd="0" presId="urn:microsoft.com/office/officeart/2005/8/layout/hierarchy2"/>
+    <dgm:cxn modelId="{60B78886-2650-49F6-8152-DD5C3CE314B7}" type="presParOf" srcId="{62181DCD-D050-4E8B-B397-D76EDF51F437}" destId="{162ABDF3-A5CF-45B1-957D-CA85B04394E5}" srcOrd="0" destOrd="0" presId="urn:microsoft.com/office/officeart/2005/8/layout/hierarchy2"/>
+    <dgm:cxn modelId="{6DCF70FC-9772-4179-A21A-AB33AB767AC6}" type="presParOf" srcId="{62181DCD-D050-4E8B-B397-D76EDF51F437}" destId="{E1E437D6-3893-4FDD-837D-29159E987B65}" srcOrd="1" destOrd="0" presId="urn:microsoft.com/office/officeart/2005/8/layout/hierarchy2"/>
+    <dgm:cxn modelId="{31B6F74C-EF38-4300-87AC-4C846824B82A}" type="presParOf" srcId="{07501E0B-205C-416C-8CA0-B823E0EEBC0E}" destId="{51E5A669-165A-406F-8A48-2DEF0BD84EAA}" srcOrd="2" destOrd="0" presId="urn:microsoft.com/office/officeart/2005/8/layout/hierarchy2"/>
+    <dgm:cxn modelId="{BE34BDA9-2CCD-473F-B543-D506A7F95F9F}" type="presParOf" srcId="{51E5A669-165A-406F-8A48-2DEF0BD84EAA}" destId="{C6F2E4EB-5A22-4750-B921-8C7E11C15D85}" srcOrd="0" destOrd="0" presId="urn:microsoft.com/office/officeart/2005/8/layout/hierarchy2"/>
+    <dgm:cxn modelId="{EE440634-0234-4A58-8DDC-3F5231977C30}" type="presParOf" srcId="{07501E0B-205C-416C-8CA0-B823E0EEBC0E}" destId="{785972B5-A8DB-4A28-BFDB-97FC00BE94D2}" srcOrd="3" destOrd="0" presId="urn:microsoft.com/office/officeart/2005/8/layout/hierarchy2"/>
+    <dgm:cxn modelId="{3C1A7586-1542-481B-BA28-DDF20D907394}" type="presParOf" srcId="{785972B5-A8DB-4A28-BFDB-97FC00BE94D2}" destId="{E5883944-5992-4187-A1EE-4E4B5E1C4BA7}" srcOrd="0" destOrd="0" presId="urn:microsoft.com/office/officeart/2005/8/layout/hierarchy2"/>
+    <dgm:cxn modelId="{FF54CA25-BEFE-478A-A682-E1C2D4C55C8C}" type="presParOf" srcId="{785972B5-A8DB-4A28-BFDB-97FC00BE94D2}" destId="{064164AA-69B9-411F-8001-29939D974917}" srcOrd="1" destOrd="0" presId="urn:microsoft.com/office/officeart/2005/8/layout/hierarchy2"/>
   </dgm:cxnLst>
   <dgm:bg/>
   <dgm:whole/>
@@ -7013,6 +8146,571 @@
 </dsp:drawing>
 </file>
 
+<file path=ppt/diagrams/drawing4.xml><?xml version="1.0" encoding="utf-8"?>
+<dsp:drawing xmlns:dgm="http://schemas.openxmlformats.org/drawingml/2006/diagram" xmlns:dsp="http://schemas.microsoft.com/office/drawing/2008/diagram" xmlns:a="http://schemas.openxmlformats.org/drawingml/2006/main">
+  <dsp:spTree>
+    <dsp:nvGrpSpPr>
+      <dsp:cNvPr id="0" name=""/>
+      <dsp:cNvGrpSpPr/>
+    </dsp:nvGrpSpPr>
+    <dsp:grpSpPr/>
+    <dsp:sp modelId="{25F847DC-1964-4965-B71B-B2A16DF0F4F7}">
+      <dsp:nvSpPr>
+        <dsp:cNvPr id="0" name=""/>
+        <dsp:cNvSpPr/>
+      </dsp:nvSpPr>
+      <dsp:spPr>
+        <a:xfrm>
+          <a:off x="1587" y="1631156"/>
+          <a:ext cx="1603374" cy="801687"/>
+        </a:xfrm>
+        <a:prstGeom prst="roundRect">
+          <a:avLst>
+            <a:gd name="adj" fmla="val 10000"/>
+          </a:avLst>
+        </a:prstGeom>
+        <a:solidFill>
+          <a:schemeClr val="accent1">
+            <a:hueOff val="0"/>
+            <a:satOff val="0"/>
+            <a:lumOff val="0"/>
+            <a:alphaOff val="0"/>
+          </a:schemeClr>
+        </a:solidFill>
+        <a:ln w="25400" cap="flat" cmpd="sng" algn="ctr">
+          <a:solidFill>
+            <a:schemeClr val="lt1">
+              <a:hueOff val="0"/>
+              <a:satOff val="0"/>
+              <a:lumOff val="0"/>
+              <a:alphaOff val="0"/>
+            </a:schemeClr>
+          </a:solidFill>
+          <a:prstDash val="solid"/>
+        </a:ln>
+        <a:effectLst/>
+      </dsp:spPr>
+      <dsp:style>
+        <a:lnRef idx="2">
+          <a:scrgbClr r="0" g="0" b="0"/>
+        </a:lnRef>
+        <a:fillRef idx="1">
+          <a:scrgbClr r="0" g="0" b="0"/>
+        </a:fillRef>
+        <a:effectRef idx="0">
+          <a:scrgbClr r="0" g="0" b="0"/>
+        </a:effectRef>
+        <a:fontRef idx="minor">
+          <a:schemeClr val="lt1"/>
+        </a:fontRef>
+      </dsp:style>
+      <dsp:txBody>
+        <a:bodyPr spcFirstLastPara="0" vert="horz" wrap="square" lIns="10795" tIns="10795" rIns="10795" bIns="10795" numCol="1" spcCol="1270" anchor="ctr" anchorCtr="0">
+          <a:noAutofit/>
+        </a:bodyPr>
+        <a:lstStyle/>
+        <a:p>
+          <a:pPr lvl="0" algn="ctr" defTabSz="755650">
+            <a:lnSpc>
+              <a:spcPct val="90000"/>
+            </a:lnSpc>
+            <a:spcBef>
+              <a:spcPct val="0"/>
+            </a:spcBef>
+            <a:spcAft>
+              <a:spcPct val="35000"/>
+            </a:spcAft>
+          </a:pPr>
+          <a:r>
+            <a:rPr lang="de-DE" sz="1700" kern="1200" dirty="0" smtClean="0"/>
+            <a:t>Berechnung des Stundenplan</a:t>
+          </a:r>
+          <a:endParaRPr lang="de-DE" sz="1700" kern="1200" dirty="0"/>
+        </a:p>
+      </dsp:txBody>
+      <dsp:txXfrm>
+        <a:off x="25068" y="1654637"/>
+        <a:ext cx="1556412" cy="754725"/>
+      </dsp:txXfrm>
+    </dsp:sp>
+    <dsp:sp modelId="{7AF697F1-ECEC-46D8-8C0F-77003A6EE70E}">
+      <dsp:nvSpPr>
+        <dsp:cNvPr id="0" name=""/>
+        <dsp:cNvSpPr/>
+      </dsp:nvSpPr>
+      <dsp:spPr>
+        <a:xfrm rot="19457599">
+          <a:off x="1530725" y="1783760"/>
+          <a:ext cx="789824" cy="35507"/>
+        </a:xfrm>
+        <a:custGeom>
+          <a:avLst/>
+          <a:gdLst/>
+          <a:ahLst/>
+          <a:cxnLst/>
+          <a:rect l="0" t="0" r="0" b="0"/>
+          <a:pathLst>
+            <a:path>
+              <a:moveTo>
+                <a:pt x="0" y="17753"/>
+              </a:moveTo>
+              <a:lnTo>
+                <a:pt x="789824" y="17753"/>
+              </a:lnTo>
+            </a:path>
+          </a:pathLst>
+        </a:custGeom>
+        <a:noFill/>
+        <a:ln w="25400" cap="flat" cmpd="sng" algn="ctr">
+          <a:solidFill>
+            <a:schemeClr val="accent1">
+              <a:shade val="60000"/>
+              <a:hueOff val="0"/>
+              <a:satOff val="0"/>
+              <a:lumOff val="0"/>
+              <a:alphaOff val="0"/>
+            </a:schemeClr>
+          </a:solidFill>
+          <a:prstDash val="solid"/>
+        </a:ln>
+        <a:effectLst/>
+      </dsp:spPr>
+      <dsp:style>
+        <a:lnRef idx="2">
+          <a:scrgbClr r="0" g="0" b="0"/>
+        </a:lnRef>
+        <a:fillRef idx="0">
+          <a:scrgbClr r="0" g="0" b="0"/>
+        </a:fillRef>
+        <a:effectRef idx="0">
+          <a:scrgbClr r="0" g="0" b="0"/>
+        </a:effectRef>
+        <a:fontRef idx="minor"/>
+      </dsp:style>
+      <dsp:txBody>
+        <a:bodyPr spcFirstLastPara="0" vert="horz" wrap="square" lIns="12700" tIns="0" rIns="12700" bIns="0" numCol="1" spcCol="1270" anchor="ctr" anchorCtr="0">
+          <a:noAutofit/>
+        </a:bodyPr>
+        <a:lstStyle/>
+        <a:p>
+          <a:pPr lvl="0" algn="ctr" defTabSz="222250">
+            <a:lnSpc>
+              <a:spcPct val="90000"/>
+            </a:lnSpc>
+            <a:spcBef>
+              <a:spcPct val="0"/>
+            </a:spcBef>
+            <a:spcAft>
+              <a:spcPct val="35000"/>
+            </a:spcAft>
+          </a:pPr>
+          <a:endParaRPr lang="de-DE" sz="500" kern="1200"/>
+        </a:p>
+      </dsp:txBody>
+      <dsp:txXfrm>
+        <a:off x="1905891" y="1781769"/>
+        <a:ext cx="39491" cy="39491"/>
+      </dsp:txXfrm>
+    </dsp:sp>
+    <dsp:sp modelId="{56CAB2B3-2A2D-49DD-B1FF-90910D92DF8C}">
+      <dsp:nvSpPr>
+        <dsp:cNvPr id="0" name=""/>
+        <dsp:cNvSpPr/>
+      </dsp:nvSpPr>
+      <dsp:spPr>
+        <a:xfrm>
+          <a:off x="2246312" y="1170185"/>
+          <a:ext cx="1603374" cy="801687"/>
+        </a:xfrm>
+        <a:prstGeom prst="roundRect">
+          <a:avLst>
+            <a:gd name="adj" fmla="val 10000"/>
+          </a:avLst>
+        </a:prstGeom>
+        <a:solidFill>
+          <a:schemeClr val="accent1">
+            <a:hueOff val="0"/>
+            <a:satOff val="0"/>
+            <a:lumOff val="0"/>
+            <a:alphaOff val="0"/>
+          </a:schemeClr>
+        </a:solidFill>
+        <a:ln w="25400" cap="flat" cmpd="sng" algn="ctr">
+          <a:solidFill>
+            <a:schemeClr val="lt1">
+              <a:hueOff val="0"/>
+              <a:satOff val="0"/>
+              <a:lumOff val="0"/>
+              <a:alphaOff val="0"/>
+            </a:schemeClr>
+          </a:solidFill>
+          <a:prstDash val="solid"/>
+        </a:ln>
+        <a:effectLst/>
+      </dsp:spPr>
+      <dsp:style>
+        <a:lnRef idx="2">
+          <a:scrgbClr r="0" g="0" b="0"/>
+        </a:lnRef>
+        <a:fillRef idx="1">
+          <a:scrgbClr r="0" g="0" b="0"/>
+        </a:fillRef>
+        <a:effectRef idx="0">
+          <a:scrgbClr r="0" g="0" b="0"/>
+        </a:effectRef>
+        <a:fontRef idx="minor">
+          <a:schemeClr val="lt1"/>
+        </a:fontRef>
+      </dsp:style>
+      <dsp:txBody>
+        <a:bodyPr spcFirstLastPara="0" vert="horz" wrap="square" lIns="10795" tIns="10795" rIns="10795" bIns="10795" numCol="1" spcCol="1270" anchor="ctr" anchorCtr="0">
+          <a:noAutofit/>
+        </a:bodyPr>
+        <a:lstStyle/>
+        <a:p>
+          <a:pPr lvl="0" algn="ctr" defTabSz="755650">
+            <a:lnSpc>
+              <a:spcPct val="90000"/>
+            </a:lnSpc>
+            <a:spcBef>
+              <a:spcPct val="0"/>
+            </a:spcBef>
+            <a:spcAft>
+              <a:spcPct val="35000"/>
+            </a:spcAft>
+          </a:pPr>
+          <a:r>
+            <a:rPr lang="de-DE" sz="1700" kern="1200" dirty="0" err="1" smtClean="0"/>
+            <a:t>Urplan</a:t>
+          </a:r>
+          <a:endParaRPr lang="de-DE" sz="1700" kern="1200" dirty="0"/>
+        </a:p>
+      </dsp:txBody>
+      <dsp:txXfrm>
+        <a:off x="2269793" y="1193666"/>
+        <a:ext cx="1556412" cy="754725"/>
+      </dsp:txXfrm>
+    </dsp:sp>
+    <dsp:sp modelId="{D57D5784-8271-44EE-9255-F3A40DACF594}">
+      <dsp:nvSpPr>
+        <dsp:cNvPr id="0" name=""/>
+        <dsp:cNvSpPr/>
+      </dsp:nvSpPr>
+      <dsp:spPr>
+        <a:xfrm>
+          <a:off x="3849687" y="1553275"/>
+          <a:ext cx="641350" cy="35507"/>
+        </a:xfrm>
+        <a:custGeom>
+          <a:avLst/>
+          <a:gdLst/>
+          <a:ahLst/>
+          <a:cxnLst/>
+          <a:rect l="0" t="0" r="0" b="0"/>
+          <a:pathLst>
+            <a:path>
+              <a:moveTo>
+                <a:pt x="0" y="17753"/>
+              </a:moveTo>
+              <a:lnTo>
+                <a:pt x="641350" y="17753"/>
+              </a:lnTo>
+            </a:path>
+          </a:pathLst>
+        </a:custGeom>
+        <a:noFill/>
+        <a:ln w="25400" cap="flat" cmpd="sng" algn="ctr">
+          <a:solidFill>
+            <a:schemeClr val="accent1">
+              <a:shade val="80000"/>
+              <a:hueOff val="0"/>
+              <a:satOff val="0"/>
+              <a:lumOff val="0"/>
+              <a:alphaOff val="0"/>
+            </a:schemeClr>
+          </a:solidFill>
+          <a:prstDash val="solid"/>
+        </a:ln>
+        <a:effectLst/>
+      </dsp:spPr>
+      <dsp:style>
+        <a:lnRef idx="2">
+          <a:scrgbClr r="0" g="0" b="0"/>
+        </a:lnRef>
+        <a:fillRef idx="0">
+          <a:scrgbClr r="0" g="0" b="0"/>
+        </a:fillRef>
+        <a:effectRef idx="0">
+          <a:scrgbClr r="0" g="0" b="0"/>
+        </a:effectRef>
+        <a:fontRef idx="minor"/>
+      </dsp:style>
+      <dsp:txBody>
+        <a:bodyPr spcFirstLastPara="0" vert="horz" wrap="square" lIns="12700" tIns="0" rIns="12700" bIns="0" numCol="1" spcCol="1270" anchor="ctr" anchorCtr="0">
+          <a:noAutofit/>
+        </a:bodyPr>
+        <a:lstStyle/>
+        <a:p>
+          <a:pPr lvl="0" algn="ctr" defTabSz="222250">
+            <a:lnSpc>
+              <a:spcPct val="90000"/>
+            </a:lnSpc>
+            <a:spcBef>
+              <a:spcPct val="0"/>
+            </a:spcBef>
+            <a:spcAft>
+              <a:spcPct val="35000"/>
+            </a:spcAft>
+          </a:pPr>
+          <a:endParaRPr lang="de-DE" sz="500" kern="1200"/>
+        </a:p>
+      </dsp:txBody>
+      <dsp:txXfrm>
+        <a:off x="4154328" y="1554995"/>
+        <a:ext cx="32067" cy="32067"/>
+      </dsp:txXfrm>
+    </dsp:sp>
+    <dsp:sp modelId="{162ABDF3-A5CF-45B1-957D-CA85B04394E5}">
+      <dsp:nvSpPr>
+        <dsp:cNvPr id="0" name=""/>
+        <dsp:cNvSpPr/>
+      </dsp:nvSpPr>
+      <dsp:spPr>
+        <a:xfrm>
+          <a:off x="4491037" y="1170185"/>
+          <a:ext cx="1603374" cy="801687"/>
+        </a:xfrm>
+        <a:prstGeom prst="roundRect">
+          <a:avLst>
+            <a:gd name="adj" fmla="val 10000"/>
+          </a:avLst>
+        </a:prstGeom>
+        <a:solidFill>
+          <a:schemeClr val="accent1">
+            <a:hueOff val="0"/>
+            <a:satOff val="0"/>
+            <a:lumOff val="0"/>
+            <a:alphaOff val="0"/>
+          </a:schemeClr>
+        </a:solidFill>
+        <a:ln w="25400" cap="flat" cmpd="sng" algn="ctr">
+          <a:solidFill>
+            <a:schemeClr val="lt1">
+              <a:hueOff val="0"/>
+              <a:satOff val="0"/>
+              <a:lumOff val="0"/>
+              <a:alphaOff val="0"/>
+            </a:schemeClr>
+          </a:solidFill>
+          <a:prstDash val="solid"/>
+        </a:ln>
+        <a:effectLst/>
+      </dsp:spPr>
+      <dsp:style>
+        <a:lnRef idx="2">
+          <a:scrgbClr r="0" g="0" b="0"/>
+        </a:lnRef>
+        <a:fillRef idx="1">
+          <a:scrgbClr r="0" g="0" b="0"/>
+        </a:fillRef>
+        <a:effectRef idx="0">
+          <a:scrgbClr r="0" g="0" b="0"/>
+        </a:effectRef>
+        <a:fontRef idx="minor">
+          <a:schemeClr val="lt1"/>
+        </a:fontRef>
+      </dsp:style>
+      <dsp:txBody>
+        <a:bodyPr spcFirstLastPara="0" vert="horz" wrap="square" lIns="10795" tIns="10795" rIns="10795" bIns="10795" numCol="1" spcCol="1270" anchor="ctr" anchorCtr="0">
+          <a:noAutofit/>
+        </a:bodyPr>
+        <a:lstStyle/>
+        <a:p>
+          <a:pPr lvl="0" algn="ctr" defTabSz="755650">
+            <a:lnSpc>
+              <a:spcPct val="90000"/>
+            </a:lnSpc>
+            <a:spcBef>
+              <a:spcPct val="0"/>
+            </a:spcBef>
+            <a:spcAft>
+              <a:spcPct val="35000"/>
+            </a:spcAft>
+          </a:pPr>
+          <a:r>
+            <a:rPr lang="de-DE" sz="1700" kern="1200" dirty="0" smtClean="0"/>
+            <a:t>Neue Applikations-funktionen</a:t>
+          </a:r>
+          <a:endParaRPr lang="de-DE" sz="1700" kern="1200" dirty="0"/>
+        </a:p>
+      </dsp:txBody>
+      <dsp:txXfrm>
+        <a:off x="4514518" y="1193666"/>
+        <a:ext cx="1556412" cy="754725"/>
+      </dsp:txXfrm>
+    </dsp:sp>
+    <dsp:sp modelId="{51E5A669-165A-406F-8A48-2DEF0BD84EAA}">
+      <dsp:nvSpPr>
+        <dsp:cNvPr id="0" name=""/>
+        <dsp:cNvSpPr/>
+      </dsp:nvSpPr>
+      <dsp:spPr>
+        <a:xfrm rot="2142401">
+          <a:off x="1530725" y="2244731"/>
+          <a:ext cx="789824" cy="35507"/>
+        </a:xfrm>
+        <a:custGeom>
+          <a:avLst/>
+          <a:gdLst/>
+          <a:ahLst/>
+          <a:cxnLst/>
+          <a:rect l="0" t="0" r="0" b="0"/>
+          <a:pathLst>
+            <a:path>
+              <a:moveTo>
+                <a:pt x="0" y="17753"/>
+              </a:moveTo>
+              <a:lnTo>
+                <a:pt x="789824" y="17753"/>
+              </a:lnTo>
+            </a:path>
+          </a:pathLst>
+        </a:custGeom>
+        <a:noFill/>
+        <a:ln w="25400" cap="flat" cmpd="sng" algn="ctr">
+          <a:solidFill>
+            <a:schemeClr val="accent1">
+              <a:shade val="60000"/>
+              <a:hueOff val="0"/>
+              <a:satOff val="0"/>
+              <a:lumOff val="0"/>
+              <a:alphaOff val="0"/>
+            </a:schemeClr>
+          </a:solidFill>
+          <a:prstDash val="solid"/>
+        </a:ln>
+        <a:effectLst/>
+      </dsp:spPr>
+      <dsp:style>
+        <a:lnRef idx="2">
+          <a:scrgbClr r="0" g="0" b="0"/>
+        </a:lnRef>
+        <a:fillRef idx="0">
+          <a:scrgbClr r="0" g="0" b="0"/>
+        </a:fillRef>
+        <a:effectRef idx="0">
+          <a:scrgbClr r="0" g="0" b="0"/>
+        </a:effectRef>
+        <a:fontRef idx="minor"/>
+      </dsp:style>
+      <dsp:txBody>
+        <a:bodyPr spcFirstLastPara="0" vert="horz" wrap="square" lIns="12700" tIns="0" rIns="12700" bIns="0" numCol="1" spcCol="1270" anchor="ctr" anchorCtr="0">
+          <a:noAutofit/>
+        </a:bodyPr>
+        <a:lstStyle/>
+        <a:p>
+          <a:pPr lvl="0" algn="ctr" defTabSz="222250">
+            <a:lnSpc>
+              <a:spcPct val="90000"/>
+            </a:lnSpc>
+            <a:spcBef>
+              <a:spcPct val="0"/>
+            </a:spcBef>
+            <a:spcAft>
+              <a:spcPct val="35000"/>
+            </a:spcAft>
+          </a:pPr>
+          <a:endParaRPr lang="de-DE" sz="500" kern="1200"/>
+        </a:p>
+      </dsp:txBody>
+      <dsp:txXfrm>
+        <a:off x="1905891" y="2242739"/>
+        <a:ext cx="39491" cy="39491"/>
+      </dsp:txXfrm>
+    </dsp:sp>
+    <dsp:sp modelId="{E5883944-5992-4187-A1EE-4E4B5E1C4BA7}">
+      <dsp:nvSpPr>
+        <dsp:cNvPr id="0" name=""/>
+        <dsp:cNvSpPr/>
+      </dsp:nvSpPr>
+      <dsp:spPr>
+        <a:xfrm>
+          <a:off x="2246312" y="2092126"/>
+          <a:ext cx="1603374" cy="801687"/>
+        </a:xfrm>
+        <a:prstGeom prst="roundRect">
+          <a:avLst>
+            <a:gd name="adj" fmla="val 10000"/>
+          </a:avLst>
+        </a:prstGeom>
+        <a:solidFill>
+          <a:schemeClr val="accent1">
+            <a:hueOff val="0"/>
+            <a:satOff val="0"/>
+            <a:lumOff val="0"/>
+            <a:alphaOff val="0"/>
+          </a:schemeClr>
+        </a:solidFill>
+        <a:ln w="25400" cap="flat" cmpd="sng" algn="ctr">
+          <a:solidFill>
+            <a:schemeClr val="lt1">
+              <a:hueOff val="0"/>
+              <a:satOff val="0"/>
+              <a:lumOff val="0"/>
+              <a:alphaOff val="0"/>
+            </a:schemeClr>
+          </a:solidFill>
+          <a:prstDash val="solid"/>
+        </a:ln>
+        <a:effectLst/>
+      </dsp:spPr>
+      <dsp:style>
+        <a:lnRef idx="2">
+          <a:scrgbClr r="0" g="0" b="0"/>
+        </a:lnRef>
+        <a:fillRef idx="1">
+          <a:scrgbClr r="0" g="0" b="0"/>
+        </a:fillRef>
+        <a:effectRef idx="0">
+          <a:scrgbClr r="0" g="0" b="0"/>
+        </a:effectRef>
+        <a:fontRef idx="minor">
+          <a:schemeClr val="lt1"/>
+        </a:fontRef>
+      </dsp:style>
+      <dsp:txBody>
+        <a:bodyPr spcFirstLastPara="0" vert="horz" wrap="square" lIns="10795" tIns="10795" rIns="10795" bIns="10795" numCol="1" spcCol="1270" anchor="ctr" anchorCtr="0">
+          <a:noAutofit/>
+        </a:bodyPr>
+        <a:lstStyle/>
+        <a:p>
+          <a:pPr lvl="0" algn="ctr" defTabSz="755650">
+            <a:lnSpc>
+              <a:spcPct val="90000"/>
+            </a:lnSpc>
+            <a:spcBef>
+              <a:spcPct val="0"/>
+            </a:spcBef>
+            <a:spcAft>
+              <a:spcPct val="35000"/>
+            </a:spcAft>
+          </a:pPr>
+          <a:r>
+            <a:rPr lang="de-DE" sz="1700" kern="1200" dirty="0" smtClean="0"/>
+            <a:t>Optimierung</a:t>
+          </a:r>
+          <a:endParaRPr lang="de-DE" sz="1700" kern="1200" dirty="0"/>
+        </a:p>
+      </dsp:txBody>
+      <dsp:txXfrm>
+        <a:off x="2269793" y="2115607"/>
+        <a:ext cx="1556412" cy="754725"/>
+      </dsp:txXfrm>
+    </dsp:sp>
+  </dsp:spTree>
+</dsp:drawing>
+</file>
+
 <file path=ppt/diagrams/layout1.xml><?xml version="1.0" encoding="utf-8"?>
 <dgm:layoutDef xmlns:dgm="http://schemas.openxmlformats.org/drawingml/2006/diagram" xmlns:a="http://schemas.openxmlformats.org/drawingml/2006/main" uniqueId="urn:microsoft.com/office/officeart/2005/8/layout/vList2">
   <dgm:title val=""/>
@@ -8490,6 +10188,326 @@
 </dgm:layoutDef>
 </file>
 
+<file path=ppt/diagrams/layout4.xml><?xml version="1.0" encoding="utf-8"?>
+<dgm:layoutDef xmlns:dgm="http://schemas.openxmlformats.org/drawingml/2006/diagram" xmlns:a="http://schemas.openxmlformats.org/drawingml/2006/main" uniqueId="urn:microsoft.com/office/officeart/2005/8/layout/hierarchy2">
+  <dgm:title val=""/>
+  <dgm:desc val=""/>
+  <dgm:catLst>
+    <dgm:cat type="hierarchy" pri="5000"/>
+  </dgm:catLst>
+  <dgm:sampData>
+    <dgm:dataModel>
+      <dgm:ptLst>
+        <dgm:pt modelId="0" type="doc"/>
+        <dgm:pt modelId="1">
+          <dgm:prSet phldr="1"/>
+        </dgm:pt>
+        <dgm:pt modelId="2">
+          <dgm:prSet phldr="1"/>
+        </dgm:pt>
+        <dgm:pt modelId="21">
+          <dgm:prSet phldr="1"/>
+        </dgm:pt>
+        <dgm:pt modelId="22">
+          <dgm:prSet phldr="1"/>
+        </dgm:pt>
+        <dgm:pt modelId="3">
+          <dgm:prSet phldr="1"/>
+        </dgm:pt>
+        <dgm:pt modelId="31">
+          <dgm:prSet phldr="1"/>
+        </dgm:pt>
+      </dgm:ptLst>
+      <dgm:cxnLst>
+        <dgm:cxn modelId="4" srcId="0" destId="1" srcOrd="0" destOrd="0"/>
+        <dgm:cxn modelId="5" srcId="1" destId="2" srcOrd="0" destOrd="0"/>
+        <dgm:cxn modelId="6" srcId="1" destId="3" srcOrd="1" destOrd="0"/>
+        <dgm:cxn modelId="23" srcId="2" destId="21" srcOrd="0" destOrd="0"/>
+        <dgm:cxn modelId="24" srcId="2" destId="22" srcOrd="1" destOrd="0"/>
+        <dgm:cxn modelId="33" srcId="3" destId="31" srcOrd="0" destOrd="0"/>
+      </dgm:cxnLst>
+      <dgm:bg/>
+      <dgm:whole/>
+    </dgm:dataModel>
+  </dgm:sampData>
+  <dgm:styleData>
+    <dgm:dataModel>
+      <dgm:ptLst>
+        <dgm:pt modelId="0" type="doc"/>
+        <dgm:pt modelId="1"/>
+        <dgm:pt modelId="11"/>
+        <dgm:pt modelId="12"/>
+      </dgm:ptLst>
+      <dgm:cxnLst>
+        <dgm:cxn modelId="2" srcId="0" destId="1" srcOrd="0" destOrd="0"/>
+        <dgm:cxn modelId="13" srcId="1" destId="11" srcOrd="0" destOrd="0"/>
+        <dgm:cxn modelId="14" srcId="1" destId="12" srcOrd="1" destOrd="0"/>
+      </dgm:cxnLst>
+      <dgm:bg/>
+      <dgm:whole/>
+    </dgm:dataModel>
+  </dgm:styleData>
+  <dgm:clrData>
+    <dgm:dataModel>
+      <dgm:ptLst>
+        <dgm:pt modelId="0" type="doc"/>
+        <dgm:pt modelId="1"/>
+        <dgm:pt modelId="2"/>
+        <dgm:pt modelId="21"/>
+        <dgm:pt modelId="211"/>
+        <dgm:pt modelId="3"/>
+        <dgm:pt modelId="31"/>
+        <dgm:pt modelId="311"/>
+      </dgm:ptLst>
+      <dgm:cxnLst>
+        <dgm:cxn modelId="4" srcId="0" destId="1" srcOrd="0" destOrd="0"/>
+        <dgm:cxn modelId="5" srcId="1" destId="2" srcOrd="0" destOrd="0"/>
+        <dgm:cxn modelId="6" srcId="1" destId="3" srcOrd="1" destOrd="0"/>
+        <dgm:cxn modelId="23" srcId="2" destId="21" srcOrd="0" destOrd="0"/>
+        <dgm:cxn modelId="24" srcId="21" destId="211" srcOrd="0" destOrd="0"/>
+        <dgm:cxn modelId="33" srcId="3" destId="31" srcOrd="0" destOrd="0"/>
+        <dgm:cxn modelId="34" srcId="31" destId="311" srcOrd="0" destOrd="0"/>
+      </dgm:cxnLst>
+      <dgm:bg/>
+      <dgm:whole/>
+    </dgm:dataModel>
+  </dgm:clrData>
+  <dgm:layoutNode name="diagram">
+    <dgm:varLst>
+      <dgm:chPref val="1"/>
+      <dgm:dir/>
+      <dgm:animOne val="branch"/>
+      <dgm:animLvl val="lvl"/>
+      <dgm:resizeHandles val="exact"/>
+    </dgm:varLst>
+    <dgm:choose name="Name0">
+      <dgm:if name="Name1" func="var" arg="dir" op="equ" val="norm">
+        <dgm:alg type="hierChild">
+          <dgm:param type="linDir" val="fromT"/>
+          <dgm:param type="chAlign" val="l"/>
+        </dgm:alg>
+      </dgm:if>
+      <dgm:else name="Name2">
+        <dgm:alg type="hierChild">
+          <dgm:param type="linDir" val="fromT"/>
+          <dgm:param type="chAlign" val="r"/>
+        </dgm:alg>
+      </dgm:else>
+    </dgm:choose>
+    <dgm:shape xmlns:r="http://schemas.openxmlformats.org/officeDocument/2006/relationships" r:blip="">
+      <dgm:adjLst/>
+    </dgm:shape>
+    <dgm:presOf/>
+    <dgm:constrLst>
+      <dgm:constr type="h" for="des" ptType="node" refType="h"/>
+      <dgm:constr type="w" for="des" ptType="node" refType="h" refFor="des" refPtType="node" fact="2"/>
+      <dgm:constr type="sibSp" refType="h" refFor="des" refPtType="node" op="equ" fact="0.15"/>
+      <dgm:constr type="sibSp" for="des" forName="level2hierChild" refType="h" refFor="des" refPtType="node" op="equ" fact="0.15"/>
+      <dgm:constr type="sibSp" for="des" forName="level3hierChild" refType="h" refFor="des" refPtType="node" op="equ" fact="0.15"/>
+      <dgm:constr type="sp" for="des" forName="root1" refType="w" refFor="des" refPtType="node" fact="0.4"/>
+      <dgm:constr type="sp" for="des" forName="root2" refType="sp" refFor="des" refForName="root1" op="equ"/>
+      <dgm:constr type="primFontSz" for="des" ptType="node" op="equ" val="65"/>
+      <dgm:constr type="primFontSz" for="des" forName="connTx" op="equ" val="55"/>
+      <dgm:constr type="primFontSz" for="des" forName="connTx" refType="primFontSz" refFor="des" refPtType="node" op="lte" fact="0.8"/>
+    </dgm:constrLst>
+    <dgm:ruleLst/>
+    <dgm:forEach name="Name3" axis="ch">
+      <dgm:forEach name="Name4" axis="self" ptType="node">
+        <dgm:layoutNode name="root1">
+          <dgm:choose name="Name5">
+            <dgm:if name="Name6" func="var" arg="dir" op="equ" val="norm">
+              <dgm:alg type="hierRoot">
+                <dgm:param type="hierAlign" val="lCtrCh"/>
+              </dgm:alg>
+            </dgm:if>
+            <dgm:else name="Name7">
+              <dgm:alg type="hierRoot">
+                <dgm:param type="hierAlign" val="rCtrCh"/>
+              </dgm:alg>
+            </dgm:else>
+          </dgm:choose>
+          <dgm:shape xmlns:r="http://schemas.openxmlformats.org/officeDocument/2006/relationships" r:blip="">
+            <dgm:adjLst/>
+          </dgm:shape>
+          <dgm:presOf/>
+          <dgm:constrLst/>
+          <dgm:ruleLst/>
+          <dgm:layoutNode name="LevelOneTextNode" styleLbl="node0">
+            <dgm:varLst>
+              <dgm:chPref val="3"/>
+            </dgm:varLst>
+            <dgm:alg type="tx"/>
+            <dgm:shape xmlns:r="http://schemas.openxmlformats.org/officeDocument/2006/relationships" type="roundRect" r:blip="">
+              <dgm:adjLst>
+                <dgm:adj idx="1" val="0.1"/>
+              </dgm:adjLst>
+            </dgm:shape>
+            <dgm:presOf axis="self"/>
+            <dgm:constrLst>
+              <dgm:constr type="tMarg" refType="primFontSz" fact="0.05"/>
+              <dgm:constr type="bMarg" refType="primFontSz" fact="0.05"/>
+              <dgm:constr type="lMarg" refType="primFontSz" fact="0.05"/>
+              <dgm:constr type="rMarg" refType="primFontSz" fact="0.05"/>
+            </dgm:constrLst>
+            <dgm:ruleLst>
+              <dgm:rule type="primFontSz" val="5" fact="NaN" max="NaN"/>
+            </dgm:ruleLst>
+          </dgm:layoutNode>
+          <dgm:layoutNode name="level2hierChild">
+            <dgm:choose name="Name8">
+              <dgm:if name="Name9" func="var" arg="dir" op="equ" val="norm">
+                <dgm:alg type="hierChild">
+                  <dgm:param type="linDir" val="fromT"/>
+                  <dgm:param type="chAlign" val="l"/>
+                </dgm:alg>
+              </dgm:if>
+              <dgm:else name="Name10">
+                <dgm:alg type="hierChild">
+                  <dgm:param type="linDir" val="fromT"/>
+                  <dgm:param type="chAlign" val="r"/>
+                </dgm:alg>
+              </dgm:else>
+            </dgm:choose>
+            <dgm:shape xmlns:r="http://schemas.openxmlformats.org/officeDocument/2006/relationships" r:blip="">
+              <dgm:adjLst/>
+            </dgm:shape>
+            <dgm:presOf/>
+            <dgm:constrLst/>
+            <dgm:ruleLst/>
+            <dgm:forEach name="repeat" axis="ch">
+              <dgm:forEach name="Name11" axis="self" ptType="parTrans" cnt="1">
+                <dgm:layoutNode name="conn2-1">
+                  <dgm:choose name="Name12">
+                    <dgm:if name="Name13" func="var" arg="dir" op="equ" val="norm">
+                      <dgm:alg type="conn">
+                        <dgm:param type="dim" val="1D"/>
+                        <dgm:param type="begPts" val="midR"/>
+                        <dgm:param type="endPts" val="midL"/>
+                        <dgm:param type="endSty" val="noArr"/>
+                      </dgm:alg>
+                    </dgm:if>
+                    <dgm:else name="Name14">
+                      <dgm:alg type="conn">
+                        <dgm:param type="dim" val="1D"/>
+                        <dgm:param type="begPts" val="midL"/>
+                        <dgm:param type="endPts" val="midR"/>
+                        <dgm:param type="endSty" val="noArr"/>
+                      </dgm:alg>
+                    </dgm:else>
+                  </dgm:choose>
+                  <dgm:shape xmlns:r="http://schemas.openxmlformats.org/officeDocument/2006/relationships" type="conn" r:blip="">
+                    <dgm:adjLst/>
+                  </dgm:shape>
+                  <dgm:presOf axis="self"/>
+                  <dgm:constrLst>
+                    <dgm:constr type="w" val="1"/>
+                    <dgm:constr type="h" val="5"/>
+                    <dgm:constr type="connDist"/>
+                    <dgm:constr type="begPad"/>
+                    <dgm:constr type="endPad"/>
+                    <dgm:constr type="userA" for="ch" refType="connDist"/>
+                  </dgm:constrLst>
+                  <dgm:ruleLst/>
+                  <dgm:layoutNode name="connTx">
+                    <dgm:alg type="tx">
+                      <dgm:param type="autoTxRot" val="grav"/>
+                    </dgm:alg>
+                    <dgm:shape xmlns:r="http://schemas.openxmlformats.org/officeDocument/2006/relationships" type="rect" r:blip="" hideGeom="1">
+                      <dgm:adjLst/>
+                    </dgm:shape>
+                    <dgm:presOf axis="self"/>
+                    <dgm:constrLst>
+                      <dgm:constr type="userA"/>
+                      <dgm:constr type="w" refType="userA" fact="0.05"/>
+                      <dgm:constr type="h" refType="userA" fact="0.05"/>
+                      <dgm:constr type="lMarg" val="1"/>
+                      <dgm:constr type="rMarg" val="1"/>
+                      <dgm:constr type="tMarg"/>
+                      <dgm:constr type="bMarg"/>
+                    </dgm:constrLst>
+                    <dgm:ruleLst>
+                      <dgm:rule type="h" val="NaN" fact="0.25" max="NaN"/>
+                      <dgm:rule type="w" val="NaN" fact="0.8" max="NaN"/>
+                      <dgm:rule type="primFontSz" val="5" fact="NaN" max="NaN"/>
+                    </dgm:ruleLst>
+                  </dgm:layoutNode>
+                </dgm:layoutNode>
+              </dgm:forEach>
+              <dgm:forEach name="Name15" axis="self" ptType="node">
+                <dgm:layoutNode name="root2">
+                  <dgm:choose name="Name16">
+                    <dgm:if name="Name17" func="var" arg="dir" op="equ" val="norm">
+                      <dgm:alg type="hierRoot">
+                        <dgm:param type="hierAlign" val="lCtrCh"/>
+                      </dgm:alg>
+                    </dgm:if>
+                    <dgm:else name="Name18">
+                      <dgm:alg type="hierRoot">
+                        <dgm:param type="hierAlign" val="rCtrCh"/>
+                      </dgm:alg>
+                    </dgm:else>
+                  </dgm:choose>
+                  <dgm:shape xmlns:r="http://schemas.openxmlformats.org/officeDocument/2006/relationships" r:blip="">
+                    <dgm:adjLst/>
+                  </dgm:shape>
+                  <dgm:presOf/>
+                  <dgm:constrLst/>
+                  <dgm:ruleLst/>
+                  <dgm:layoutNode name="LevelTwoTextNode">
+                    <dgm:varLst>
+                      <dgm:chPref val="3"/>
+                    </dgm:varLst>
+                    <dgm:alg type="tx"/>
+                    <dgm:shape xmlns:r="http://schemas.openxmlformats.org/officeDocument/2006/relationships" type="roundRect" r:blip="">
+                      <dgm:adjLst>
+                        <dgm:adj idx="1" val="0.1"/>
+                      </dgm:adjLst>
+                    </dgm:shape>
+                    <dgm:presOf axis="self"/>
+                    <dgm:constrLst>
+                      <dgm:constr type="tMarg" refType="primFontSz" fact="0.05"/>
+                      <dgm:constr type="bMarg" refType="primFontSz" fact="0.05"/>
+                      <dgm:constr type="lMarg" refType="primFontSz" fact="0.05"/>
+                      <dgm:constr type="rMarg" refType="primFontSz" fact="0.05"/>
+                    </dgm:constrLst>
+                    <dgm:ruleLst>
+                      <dgm:rule type="primFontSz" val="5" fact="NaN" max="NaN"/>
+                    </dgm:ruleLst>
+                  </dgm:layoutNode>
+                  <dgm:layoutNode name="level3hierChild">
+                    <dgm:choose name="Name19">
+                      <dgm:if name="Name20" func="var" arg="dir" op="equ" val="norm">
+                        <dgm:alg type="hierChild">
+                          <dgm:param type="linDir" val="fromT"/>
+                          <dgm:param type="chAlign" val="l"/>
+                        </dgm:alg>
+                      </dgm:if>
+                      <dgm:else name="Name21">
+                        <dgm:alg type="hierChild">
+                          <dgm:param type="linDir" val="fromT"/>
+                          <dgm:param type="chAlign" val="r"/>
+                        </dgm:alg>
+                      </dgm:else>
+                    </dgm:choose>
+                    <dgm:shape xmlns:r="http://schemas.openxmlformats.org/officeDocument/2006/relationships" r:blip="">
+                      <dgm:adjLst/>
+                    </dgm:shape>
+                    <dgm:presOf/>
+                    <dgm:constrLst/>
+                    <dgm:ruleLst/>
+                    <dgm:forEach name="Name22" ref="repeat"/>
+                  </dgm:layoutNode>
+                </dgm:layoutNode>
+              </dgm:forEach>
+            </dgm:forEach>
+          </dgm:layoutNode>
+        </dgm:layoutNode>
+      </dgm:forEach>
+    </dgm:forEach>
+  </dgm:layoutNode>
+</dgm:layoutDef>
+</file>
+
 <file path=ppt/diagrams/quickStyle1.xml><?xml version="1.0" encoding="utf-8"?>
 <dgm:styleDef xmlns:dgm="http://schemas.openxmlformats.org/drawingml/2006/diagram" xmlns:a="http://schemas.openxmlformats.org/drawingml/2006/main" uniqueId="urn:microsoft.com/office/officeart/2005/8/quickstyle/simple1">
   <dgm:title val=""/>
@@ -11590,6 +13608,1474 @@
     </dgm:style>
   </dgm:styleLbl>
 </dgm:styleDef>
+</file>
+
+<file path=ppt/diagrams/quickStyle4.xml><?xml version="1.0" encoding="utf-8"?>
+<dgm:styleDef xmlns:dgm="http://schemas.openxmlformats.org/drawingml/2006/diagram" xmlns:a="http://schemas.openxmlformats.org/drawingml/2006/main" uniqueId="urn:microsoft.com/office/officeart/2005/8/quickstyle/simple1">
+  <dgm:title val=""/>
+  <dgm:desc val=""/>
+  <dgm:catLst>
+    <dgm:cat type="simple" pri="10100"/>
+  </dgm:catLst>
+  <dgm:scene3d>
+    <a:camera prst="orthographicFront"/>
+    <a:lightRig rig="threePt" dir="t"/>
+  </dgm:scene3d>
+  <dgm:styleLbl name="node0">
+    <dgm:scene3d>
+      <a:camera prst="orthographicFront"/>
+      <a:lightRig rig="threePt" dir="t"/>
+    </dgm:scene3d>
+    <dgm:sp3d/>
+    <dgm:txPr/>
+    <dgm:style>
+      <a:lnRef idx="2">
+        <a:scrgbClr r="0" g="0" b="0"/>
+      </a:lnRef>
+      <a:fillRef idx="1">
+        <a:scrgbClr r="0" g="0" b="0"/>
+      </a:fillRef>
+      <a:effectRef idx="0">
+        <a:scrgbClr r="0" g="0" b="0"/>
+      </a:effectRef>
+      <a:fontRef idx="minor">
+        <a:schemeClr val="lt1"/>
+      </a:fontRef>
+    </dgm:style>
+  </dgm:styleLbl>
+  <dgm:styleLbl name="lnNode1">
+    <dgm:scene3d>
+      <a:camera prst="orthographicFront"/>
+      <a:lightRig rig="threePt" dir="t"/>
+    </dgm:scene3d>
+    <dgm:sp3d/>
+    <dgm:txPr/>
+    <dgm:style>
+      <a:lnRef idx="2">
+        <a:scrgbClr r="0" g="0" b="0"/>
+      </a:lnRef>
+      <a:fillRef idx="1">
+        <a:scrgbClr r="0" g="0" b="0"/>
+      </a:fillRef>
+      <a:effectRef idx="0">
+        <a:scrgbClr r="0" g="0" b="0"/>
+      </a:effectRef>
+      <a:fontRef idx="minor">
+        <a:schemeClr val="lt1"/>
+      </a:fontRef>
+    </dgm:style>
+  </dgm:styleLbl>
+  <dgm:styleLbl name="vennNode1">
+    <dgm:scene3d>
+      <a:camera prst="orthographicFront"/>
+      <a:lightRig rig="threePt" dir="t"/>
+    </dgm:scene3d>
+    <dgm:sp3d/>
+    <dgm:txPr/>
+    <dgm:style>
+      <a:lnRef idx="2">
+        <a:scrgbClr r="0" g="0" b="0"/>
+      </a:lnRef>
+      <a:fillRef idx="1">
+        <a:scrgbClr r="0" g="0" b="0"/>
+      </a:fillRef>
+      <a:effectRef idx="0">
+        <a:scrgbClr r="0" g="0" b="0"/>
+      </a:effectRef>
+      <a:fontRef idx="minor">
+        <a:schemeClr val="tx1"/>
+      </a:fontRef>
+    </dgm:style>
+  </dgm:styleLbl>
+  <dgm:styleLbl name="alignNode1">
+    <dgm:scene3d>
+      <a:camera prst="orthographicFront"/>
+      <a:lightRig rig="threePt" dir="t"/>
+    </dgm:scene3d>
+    <dgm:sp3d/>
+    <dgm:txPr/>
+    <dgm:style>
+      <a:lnRef idx="2">
+        <a:scrgbClr r="0" g="0" b="0"/>
+      </a:lnRef>
+      <a:fillRef idx="1">
+        <a:scrgbClr r="0" g="0" b="0"/>
+      </a:fillRef>
+      <a:effectRef idx="0">
+        <a:scrgbClr r="0" g="0" b="0"/>
+      </a:effectRef>
+      <a:fontRef idx="minor">
+        <a:schemeClr val="lt1"/>
+      </a:fontRef>
+    </dgm:style>
+  </dgm:styleLbl>
+  <dgm:styleLbl name="node1">
+    <dgm:scene3d>
+      <a:camera prst="orthographicFront"/>
+      <a:lightRig rig="threePt" dir="t"/>
+    </dgm:scene3d>
+    <dgm:sp3d/>
+    <dgm:txPr/>
+    <dgm:style>
+      <a:lnRef idx="2">
+        <a:scrgbClr r="0" g="0" b="0"/>
+      </a:lnRef>
+      <a:fillRef idx="1">
+        <a:scrgbClr r="0" g="0" b="0"/>
+      </a:fillRef>
+      <a:effectRef idx="0">
+        <a:scrgbClr r="0" g="0" b="0"/>
+      </a:effectRef>
+      <a:fontRef idx="minor">
+        <a:schemeClr val="lt1"/>
+      </a:fontRef>
+    </dgm:style>
+  </dgm:styleLbl>
+  <dgm:styleLbl name="node2">
+    <dgm:scene3d>
+      <a:camera prst="orthographicFront"/>
+      <a:lightRig rig="threePt" dir="t"/>
+    </dgm:scene3d>
+    <dgm:sp3d/>
+    <dgm:txPr/>
+    <dgm:style>
+      <a:lnRef idx="2">
+        <a:scrgbClr r="0" g="0" b="0"/>
+      </a:lnRef>
+      <a:fillRef idx="1">
+        <a:scrgbClr r="0" g="0" b="0"/>
+      </a:fillRef>
+      <a:effectRef idx="0">
+        <a:scrgbClr r="0" g="0" b="0"/>
+      </a:effectRef>
+      <a:fontRef idx="minor">
+        <a:schemeClr val="lt1"/>
+      </a:fontRef>
+    </dgm:style>
+  </dgm:styleLbl>
+  <dgm:styleLbl name="node3">
+    <dgm:scene3d>
+      <a:camera prst="orthographicFront"/>
+      <a:lightRig rig="threePt" dir="t"/>
+    </dgm:scene3d>
+    <dgm:sp3d/>
+    <dgm:txPr/>
+    <dgm:style>
+      <a:lnRef idx="2">
+        <a:scrgbClr r="0" g="0" b="0"/>
+      </a:lnRef>
+      <a:fillRef idx="1">
+        <a:scrgbClr r="0" g="0" b="0"/>
+      </a:fillRef>
+      <a:effectRef idx="0">
+        <a:scrgbClr r="0" g="0" b="0"/>
+      </a:effectRef>
+      <a:fontRef idx="minor">
+        <a:schemeClr val="lt1"/>
+      </a:fontRef>
+    </dgm:style>
+  </dgm:styleLbl>
+  <dgm:styleLbl name="node4">
+    <dgm:scene3d>
+      <a:camera prst="orthographicFront"/>
+      <a:lightRig rig="threePt" dir="t"/>
+    </dgm:scene3d>
+    <dgm:sp3d/>
+    <dgm:txPr/>
+    <dgm:style>
+      <a:lnRef idx="2">
+        <a:scrgbClr r="0" g="0" b="0"/>
+      </a:lnRef>
+      <a:fillRef idx="1">
+        <a:scrgbClr r="0" g="0" b="0"/>
+      </a:fillRef>
+      <a:effectRef idx="0">
+        <a:scrgbClr r="0" g="0" b="0"/>
+      </a:effectRef>
+      <a:fontRef idx="minor">
+        <a:schemeClr val="lt1"/>
+      </a:fontRef>
+    </dgm:style>
+  </dgm:styleLbl>
+  <dgm:styleLbl name="fgImgPlace1">
+    <dgm:scene3d>
+      <a:camera prst="orthographicFront"/>
+      <a:lightRig rig="threePt" dir="t"/>
+    </dgm:scene3d>
+    <dgm:sp3d/>
+    <dgm:txPr/>
+    <dgm:style>
+      <a:lnRef idx="2">
+        <a:scrgbClr r="0" g="0" b="0"/>
+      </a:lnRef>
+      <a:fillRef idx="1">
+        <a:scrgbClr r="0" g="0" b="0"/>
+      </a:fillRef>
+      <a:effectRef idx="0">
+        <a:scrgbClr r="0" g="0" b="0"/>
+      </a:effectRef>
+      <a:fontRef idx="minor"/>
+    </dgm:style>
+  </dgm:styleLbl>
+  <dgm:styleLbl name="alignImgPlace1">
+    <dgm:scene3d>
+      <a:camera prst="orthographicFront"/>
+      <a:lightRig rig="threePt" dir="t"/>
+    </dgm:scene3d>
+    <dgm:sp3d/>
+    <dgm:txPr/>
+    <dgm:style>
+      <a:lnRef idx="2">
+        <a:scrgbClr r="0" g="0" b="0"/>
+      </a:lnRef>
+      <a:fillRef idx="1">
+        <a:scrgbClr r="0" g="0" b="0"/>
+      </a:fillRef>
+      <a:effectRef idx="0">
+        <a:scrgbClr r="0" g="0" b="0"/>
+      </a:effectRef>
+      <a:fontRef idx="minor"/>
+    </dgm:style>
+  </dgm:styleLbl>
+  <dgm:styleLbl name="bgImgPlace1">
+    <dgm:scene3d>
+      <a:camera prst="orthographicFront"/>
+      <a:lightRig rig="threePt" dir="t"/>
+    </dgm:scene3d>
+    <dgm:sp3d/>
+    <dgm:txPr/>
+    <dgm:style>
+      <a:lnRef idx="2">
+        <a:scrgbClr r="0" g="0" b="0"/>
+      </a:lnRef>
+      <a:fillRef idx="1">
+        <a:scrgbClr r="0" g="0" b="0"/>
+      </a:fillRef>
+      <a:effectRef idx="0">
+        <a:scrgbClr r="0" g="0" b="0"/>
+      </a:effectRef>
+      <a:fontRef idx="minor"/>
+    </dgm:style>
+  </dgm:styleLbl>
+  <dgm:styleLbl name="sibTrans2D1">
+    <dgm:scene3d>
+      <a:camera prst="orthographicFront"/>
+      <a:lightRig rig="threePt" dir="t"/>
+    </dgm:scene3d>
+    <dgm:sp3d/>
+    <dgm:txPr/>
+    <dgm:style>
+      <a:lnRef idx="0">
+        <a:scrgbClr r="0" g="0" b="0"/>
+      </a:lnRef>
+      <a:fillRef idx="1">
+        <a:scrgbClr r="0" g="0" b="0"/>
+      </a:fillRef>
+      <a:effectRef idx="0">
+        <a:scrgbClr r="0" g="0" b="0"/>
+      </a:effectRef>
+      <a:fontRef idx="minor">
+        <a:schemeClr val="lt1"/>
+      </a:fontRef>
+    </dgm:style>
+  </dgm:styleLbl>
+  <dgm:styleLbl name="fgSibTrans2D1">
+    <dgm:scene3d>
+      <a:camera prst="orthographicFront"/>
+      <a:lightRig rig="threePt" dir="t"/>
+    </dgm:scene3d>
+    <dgm:sp3d/>
+    <dgm:txPr/>
+    <dgm:style>
+      <a:lnRef idx="0">
+        <a:scrgbClr r="0" g="0" b="0"/>
+      </a:lnRef>
+      <a:fillRef idx="1">
+        <a:scrgbClr r="0" g="0" b="0"/>
+      </a:fillRef>
+      <a:effectRef idx="0">
+        <a:scrgbClr r="0" g="0" b="0"/>
+      </a:effectRef>
+      <a:fontRef idx="minor">
+        <a:schemeClr val="lt1"/>
+      </a:fontRef>
+    </dgm:style>
+  </dgm:styleLbl>
+  <dgm:styleLbl name="bgSibTrans2D1">
+    <dgm:scene3d>
+      <a:camera prst="orthographicFront"/>
+      <a:lightRig rig="threePt" dir="t"/>
+    </dgm:scene3d>
+    <dgm:sp3d/>
+    <dgm:txPr/>
+    <dgm:style>
+      <a:lnRef idx="0">
+        <a:scrgbClr r="0" g="0" b="0"/>
+      </a:lnRef>
+      <a:fillRef idx="1">
+        <a:scrgbClr r="0" g="0" b="0"/>
+      </a:fillRef>
+      <a:effectRef idx="0">
+        <a:scrgbClr r="0" g="0" b="0"/>
+      </a:effectRef>
+      <a:fontRef idx="minor">
+        <a:schemeClr val="lt1"/>
+      </a:fontRef>
+    </dgm:style>
+  </dgm:styleLbl>
+  <dgm:styleLbl name="sibTrans1D1">
+    <dgm:scene3d>
+      <a:camera prst="orthographicFront"/>
+      <a:lightRig rig="threePt" dir="t"/>
+    </dgm:scene3d>
+    <dgm:sp3d/>
+    <dgm:txPr/>
+    <dgm:style>
+      <a:lnRef idx="1">
+        <a:scrgbClr r="0" g="0" b="0"/>
+      </a:lnRef>
+      <a:fillRef idx="0">
+        <a:scrgbClr r="0" g="0" b="0"/>
+      </a:fillRef>
+      <a:effectRef idx="0">
+        <a:scrgbClr r="0" g="0" b="0"/>
+      </a:effectRef>
+      <a:fontRef idx="minor"/>
+    </dgm:style>
+  </dgm:styleLbl>
+  <dgm:styleLbl name="callout">
+    <dgm:scene3d>
+      <a:camera prst="orthographicFront"/>
+      <a:lightRig rig="threePt" dir="t"/>
+    </dgm:scene3d>
+    <dgm:sp3d/>
+    <dgm:txPr/>
+    <dgm:style>
+      <a:lnRef idx="2">
+        <a:scrgbClr r="0" g="0" b="0"/>
+      </a:lnRef>
+      <a:fillRef idx="1">
+        <a:scrgbClr r="0" g="0" b="0"/>
+      </a:fillRef>
+      <a:effectRef idx="0">
+        <a:scrgbClr r="0" g="0" b="0"/>
+      </a:effectRef>
+      <a:fontRef idx="minor"/>
+    </dgm:style>
+  </dgm:styleLbl>
+  <dgm:styleLbl name="asst0">
+    <dgm:scene3d>
+      <a:camera prst="orthographicFront"/>
+      <a:lightRig rig="threePt" dir="t"/>
+    </dgm:scene3d>
+    <dgm:sp3d/>
+    <dgm:txPr/>
+    <dgm:style>
+      <a:lnRef idx="2">
+        <a:scrgbClr r="0" g="0" b="0"/>
+      </a:lnRef>
+      <a:fillRef idx="1">
+        <a:scrgbClr r="0" g="0" b="0"/>
+      </a:fillRef>
+      <a:effectRef idx="0">
+        <a:scrgbClr r="0" g="0" b="0"/>
+      </a:effectRef>
+      <a:fontRef idx="minor">
+        <a:schemeClr val="lt1"/>
+      </a:fontRef>
+    </dgm:style>
+  </dgm:styleLbl>
+  <dgm:styleLbl name="asst1">
+    <dgm:scene3d>
+      <a:camera prst="orthographicFront"/>
+      <a:lightRig rig="threePt" dir="t"/>
+    </dgm:scene3d>
+    <dgm:sp3d/>
+    <dgm:txPr/>
+    <dgm:style>
+      <a:lnRef idx="2">
+        <a:scrgbClr r="0" g="0" b="0"/>
+      </a:lnRef>
+      <a:fillRef idx="1">
+        <a:scrgbClr r="0" g="0" b="0"/>
+      </a:fillRef>
+      <a:effectRef idx="0">
+        <a:scrgbClr r="0" g="0" b="0"/>
+      </a:effectRef>
+      <a:fontRef idx="minor">
+        <a:schemeClr val="lt1"/>
+      </a:fontRef>
+    </dgm:style>
+  </dgm:styleLbl>
+  <dgm:styleLbl name="asst2">
+    <dgm:scene3d>
+      <a:camera prst="orthographicFront"/>
+      <a:lightRig rig="threePt" dir="t"/>
+    </dgm:scene3d>
+    <dgm:sp3d/>
+    <dgm:txPr/>
+    <dgm:style>
+      <a:lnRef idx="2">
+        <a:scrgbClr r="0" g="0" b="0"/>
+      </a:lnRef>
+      <a:fillRef idx="1">
+        <a:scrgbClr r="0" g="0" b="0"/>
+      </a:fillRef>
+      <a:effectRef idx="0">
+        <a:scrgbClr r="0" g="0" b="0"/>
+      </a:effectRef>
+      <a:fontRef idx="minor">
+        <a:schemeClr val="lt1"/>
+      </a:fontRef>
+    </dgm:style>
+  </dgm:styleLbl>
+  <dgm:styleLbl name="asst3">
+    <dgm:scene3d>
+      <a:camera prst="orthographicFront"/>
+      <a:lightRig rig="threePt" dir="t"/>
+    </dgm:scene3d>
+    <dgm:sp3d/>
+    <dgm:txPr/>
+    <dgm:style>
+      <a:lnRef idx="2">
+        <a:scrgbClr r="0" g="0" b="0"/>
+      </a:lnRef>
+      <a:fillRef idx="1">
+        <a:scrgbClr r="0" g="0" b="0"/>
+      </a:fillRef>
+      <a:effectRef idx="0">
+        <a:scrgbClr r="0" g="0" b="0"/>
+      </a:effectRef>
+      <a:fontRef idx="minor">
+        <a:schemeClr val="lt1"/>
+      </a:fontRef>
+    </dgm:style>
+  </dgm:styleLbl>
+  <dgm:styleLbl name="asst4">
+    <dgm:scene3d>
+      <a:camera prst="orthographicFront"/>
+      <a:lightRig rig="threePt" dir="t"/>
+    </dgm:scene3d>
+    <dgm:sp3d/>
+    <dgm:txPr/>
+    <dgm:style>
+      <a:lnRef idx="2">
+        <a:scrgbClr r="0" g="0" b="0"/>
+      </a:lnRef>
+      <a:fillRef idx="1">
+        <a:scrgbClr r="0" g="0" b="0"/>
+      </a:fillRef>
+      <a:effectRef idx="0">
+        <a:scrgbClr r="0" g="0" b="0"/>
+      </a:effectRef>
+      <a:fontRef idx="minor">
+        <a:schemeClr val="lt1"/>
+      </a:fontRef>
+    </dgm:style>
+  </dgm:styleLbl>
+  <dgm:styleLbl name="parChTrans2D1">
+    <dgm:scene3d>
+      <a:camera prst="orthographicFront"/>
+      <a:lightRig rig="threePt" dir="t"/>
+    </dgm:scene3d>
+    <dgm:sp3d/>
+    <dgm:txPr/>
+    <dgm:style>
+      <a:lnRef idx="2">
+        <a:scrgbClr r="0" g="0" b="0"/>
+      </a:lnRef>
+      <a:fillRef idx="1">
+        <a:scrgbClr r="0" g="0" b="0"/>
+      </a:fillRef>
+      <a:effectRef idx="0">
+        <a:scrgbClr r="0" g="0" b="0"/>
+      </a:effectRef>
+      <a:fontRef idx="minor">
+        <a:schemeClr val="lt1"/>
+      </a:fontRef>
+    </dgm:style>
+  </dgm:styleLbl>
+  <dgm:styleLbl name="parChTrans2D2">
+    <dgm:scene3d>
+      <a:camera prst="orthographicFront"/>
+      <a:lightRig rig="threePt" dir="t"/>
+    </dgm:scene3d>
+    <dgm:sp3d/>
+    <dgm:txPr/>
+    <dgm:style>
+      <a:lnRef idx="2">
+        <a:scrgbClr r="0" g="0" b="0"/>
+      </a:lnRef>
+      <a:fillRef idx="1">
+        <a:scrgbClr r="0" g="0" b="0"/>
+      </a:fillRef>
+      <a:effectRef idx="0">
+        <a:scrgbClr r="0" g="0" b="0"/>
+      </a:effectRef>
+      <a:fontRef idx="minor">
+        <a:schemeClr val="lt1"/>
+      </a:fontRef>
+    </dgm:style>
+  </dgm:styleLbl>
+  <dgm:styleLbl name="parChTrans2D3">
+    <dgm:scene3d>
+      <a:camera prst="orthographicFront"/>
+      <a:lightRig rig="threePt" dir="t"/>
+    </dgm:scene3d>
+    <dgm:sp3d/>
+    <dgm:txPr/>
+    <dgm:style>
+      <a:lnRef idx="2">
+        <a:scrgbClr r="0" g="0" b="0"/>
+      </a:lnRef>
+      <a:fillRef idx="1">
+        <a:scrgbClr r="0" g="0" b="0"/>
+      </a:fillRef>
+      <a:effectRef idx="0">
+        <a:scrgbClr r="0" g="0" b="0"/>
+      </a:effectRef>
+      <a:fontRef idx="minor">
+        <a:schemeClr val="lt1"/>
+      </a:fontRef>
+    </dgm:style>
+  </dgm:styleLbl>
+  <dgm:styleLbl name="parChTrans2D4">
+    <dgm:scene3d>
+      <a:camera prst="orthographicFront"/>
+      <a:lightRig rig="threePt" dir="t"/>
+    </dgm:scene3d>
+    <dgm:sp3d/>
+    <dgm:txPr/>
+    <dgm:style>
+      <a:lnRef idx="2">
+        <a:scrgbClr r="0" g="0" b="0"/>
+      </a:lnRef>
+      <a:fillRef idx="1">
+        <a:scrgbClr r="0" g="0" b="0"/>
+      </a:fillRef>
+      <a:effectRef idx="0">
+        <a:scrgbClr r="0" g="0" b="0"/>
+      </a:effectRef>
+      <a:fontRef idx="minor">
+        <a:schemeClr val="lt1"/>
+      </a:fontRef>
+    </dgm:style>
+  </dgm:styleLbl>
+  <dgm:styleLbl name="parChTrans1D1">
+    <dgm:scene3d>
+      <a:camera prst="orthographicFront"/>
+      <a:lightRig rig="threePt" dir="t"/>
+    </dgm:scene3d>
+    <dgm:sp3d/>
+    <dgm:txPr/>
+    <dgm:style>
+      <a:lnRef idx="2">
+        <a:scrgbClr r="0" g="0" b="0"/>
+      </a:lnRef>
+      <a:fillRef idx="0">
+        <a:scrgbClr r="0" g="0" b="0"/>
+      </a:fillRef>
+      <a:effectRef idx="0">
+        <a:scrgbClr r="0" g="0" b="0"/>
+      </a:effectRef>
+      <a:fontRef idx="minor"/>
+    </dgm:style>
+  </dgm:styleLbl>
+  <dgm:styleLbl name="parChTrans1D2">
+    <dgm:scene3d>
+      <a:camera prst="orthographicFront"/>
+      <a:lightRig rig="threePt" dir="t"/>
+    </dgm:scene3d>
+    <dgm:sp3d/>
+    <dgm:txPr/>
+    <dgm:style>
+      <a:lnRef idx="2">
+        <a:scrgbClr r="0" g="0" b="0"/>
+      </a:lnRef>
+      <a:fillRef idx="0">
+        <a:scrgbClr r="0" g="0" b="0"/>
+      </a:fillRef>
+      <a:effectRef idx="0">
+        <a:scrgbClr r="0" g="0" b="0"/>
+      </a:effectRef>
+      <a:fontRef idx="minor"/>
+    </dgm:style>
+  </dgm:styleLbl>
+  <dgm:styleLbl name="parChTrans1D3">
+    <dgm:scene3d>
+      <a:camera prst="orthographicFront"/>
+      <a:lightRig rig="threePt" dir="t"/>
+    </dgm:scene3d>
+    <dgm:sp3d/>
+    <dgm:txPr/>
+    <dgm:style>
+      <a:lnRef idx="2">
+        <a:scrgbClr r="0" g="0" b="0"/>
+      </a:lnRef>
+      <a:fillRef idx="0">
+        <a:scrgbClr r="0" g="0" b="0"/>
+      </a:fillRef>
+      <a:effectRef idx="0">
+        <a:scrgbClr r="0" g="0" b="0"/>
+      </a:effectRef>
+      <a:fontRef idx="minor"/>
+    </dgm:style>
+  </dgm:styleLbl>
+  <dgm:styleLbl name="parChTrans1D4">
+    <dgm:scene3d>
+      <a:camera prst="orthographicFront"/>
+      <a:lightRig rig="threePt" dir="t"/>
+    </dgm:scene3d>
+    <dgm:sp3d/>
+    <dgm:txPr/>
+    <dgm:style>
+      <a:lnRef idx="2">
+        <a:scrgbClr r="0" g="0" b="0"/>
+      </a:lnRef>
+      <a:fillRef idx="0">
+        <a:scrgbClr r="0" g="0" b="0"/>
+      </a:fillRef>
+      <a:effectRef idx="0">
+        <a:scrgbClr r="0" g="0" b="0"/>
+      </a:effectRef>
+      <a:fontRef idx="minor"/>
+    </dgm:style>
+  </dgm:styleLbl>
+  <dgm:styleLbl name="fgAcc1">
+    <dgm:scene3d>
+      <a:camera prst="orthographicFront"/>
+      <a:lightRig rig="threePt" dir="t"/>
+    </dgm:scene3d>
+    <dgm:sp3d/>
+    <dgm:txPr/>
+    <dgm:style>
+      <a:lnRef idx="2">
+        <a:scrgbClr r="0" g="0" b="0"/>
+      </a:lnRef>
+      <a:fillRef idx="1">
+        <a:scrgbClr r="0" g="0" b="0"/>
+      </a:fillRef>
+      <a:effectRef idx="0">
+        <a:scrgbClr r="0" g="0" b="0"/>
+      </a:effectRef>
+      <a:fontRef idx="minor"/>
+    </dgm:style>
+  </dgm:styleLbl>
+  <dgm:styleLbl name="conFgAcc1">
+    <dgm:scene3d>
+      <a:camera prst="orthographicFront"/>
+      <a:lightRig rig="threePt" dir="t"/>
+    </dgm:scene3d>
+    <dgm:sp3d/>
+    <dgm:txPr/>
+    <dgm:style>
+      <a:lnRef idx="2">
+        <a:scrgbClr r="0" g="0" b="0"/>
+      </a:lnRef>
+      <a:fillRef idx="1">
+        <a:scrgbClr r="0" g="0" b="0"/>
+      </a:fillRef>
+      <a:effectRef idx="0">
+        <a:scrgbClr r="0" g="0" b="0"/>
+      </a:effectRef>
+      <a:fontRef idx="minor"/>
+    </dgm:style>
+  </dgm:styleLbl>
+  <dgm:styleLbl name="alignAcc1">
+    <dgm:scene3d>
+      <a:camera prst="orthographicFront"/>
+      <a:lightRig rig="threePt" dir="t"/>
+    </dgm:scene3d>
+    <dgm:sp3d/>
+    <dgm:txPr/>
+    <dgm:style>
+      <a:lnRef idx="2">
+        <a:scrgbClr r="0" g="0" b="0"/>
+      </a:lnRef>
+      <a:fillRef idx="1">
+        <a:scrgbClr r="0" g="0" b="0"/>
+      </a:fillRef>
+      <a:effectRef idx="0">
+        <a:scrgbClr r="0" g="0" b="0"/>
+      </a:effectRef>
+      <a:fontRef idx="minor"/>
+    </dgm:style>
+  </dgm:styleLbl>
+  <dgm:styleLbl name="trAlignAcc1">
+    <dgm:scene3d>
+      <a:camera prst="orthographicFront"/>
+      <a:lightRig rig="threePt" dir="t"/>
+    </dgm:scene3d>
+    <dgm:sp3d/>
+    <dgm:txPr/>
+    <dgm:style>
+      <a:lnRef idx="1">
+        <a:scrgbClr r="0" g="0" b="0"/>
+      </a:lnRef>
+      <a:fillRef idx="1">
+        <a:scrgbClr r="0" g="0" b="0"/>
+      </a:fillRef>
+      <a:effectRef idx="0">
+        <a:scrgbClr r="0" g="0" b="0"/>
+      </a:effectRef>
+      <a:fontRef idx="minor"/>
+    </dgm:style>
+  </dgm:styleLbl>
+  <dgm:styleLbl name="bgAcc1">
+    <dgm:scene3d>
+      <a:camera prst="orthographicFront"/>
+      <a:lightRig rig="threePt" dir="t"/>
+    </dgm:scene3d>
+    <dgm:sp3d/>
+    <dgm:txPr/>
+    <dgm:style>
+      <a:lnRef idx="2">
+        <a:scrgbClr r="0" g="0" b="0"/>
+      </a:lnRef>
+      <a:fillRef idx="1">
+        <a:scrgbClr r="0" g="0" b="0"/>
+      </a:fillRef>
+      <a:effectRef idx="0">
+        <a:scrgbClr r="0" g="0" b="0"/>
+      </a:effectRef>
+      <a:fontRef idx="minor"/>
+    </dgm:style>
+  </dgm:styleLbl>
+  <dgm:styleLbl name="solidFgAcc1">
+    <dgm:scene3d>
+      <a:camera prst="orthographicFront"/>
+      <a:lightRig rig="threePt" dir="t"/>
+    </dgm:scene3d>
+    <dgm:sp3d/>
+    <dgm:txPr/>
+    <dgm:style>
+      <a:lnRef idx="2">
+        <a:scrgbClr r="0" g="0" b="0"/>
+      </a:lnRef>
+      <a:fillRef idx="1">
+        <a:scrgbClr r="0" g="0" b="0"/>
+      </a:fillRef>
+      <a:effectRef idx="0">
+        <a:scrgbClr r="0" g="0" b="0"/>
+      </a:effectRef>
+      <a:fontRef idx="minor"/>
+    </dgm:style>
+  </dgm:styleLbl>
+  <dgm:styleLbl name="solidAlignAcc1">
+    <dgm:scene3d>
+      <a:camera prst="orthographicFront"/>
+      <a:lightRig rig="threePt" dir="t"/>
+    </dgm:scene3d>
+    <dgm:sp3d/>
+    <dgm:txPr/>
+    <dgm:style>
+      <a:lnRef idx="2">
+        <a:scrgbClr r="0" g="0" b="0"/>
+      </a:lnRef>
+      <a:fillRef idx="1">
+        <a:scrgbClr r="0" g="0" b="0"/>
+      </a:fillRef>
+      <a:effectRef idx="0">
+        <a:scrgbClr r="0" g="0" b="0"/>
+      </a:effectRef>
+      <a:fontRef idx="minor"/>
+    </dgm:style>
+  </dgm:styleLbl>
+  <dgm:styleLbl name="solidBgAcc1">
+    <dgm:scene3d>
+      <a:camera prst="orthographicFront"/>
+      <a:lightRig rig="threePt" dir="t"/>
+    </dgm:scene3d>
+    <dgm:sp3d/>
+    <dgm:txPr/>
+    <dgm:style>
+      <a:lnRef idx="2">
+        <a:scrgbClr r="0" g="0" b="0"/>
+      </a:lnRef>
+      <a:fillRef idx="1">
+        <a:scrgbClr r="0" g="0" b="0"/>
+      </a:fillRef>
+      <a:effectRef idx="0">
+        <a:scrgbClr r="0" g="0" b="0"/>
+      </a:effectRef>
+      <a:fontRef idx="minor"/>
+    </dgm:style>
+  </dgm:styleLbl>
+  <dgm:styleLbl name="fgAccFollowNode1">
+    <dgm:scene3d>
+      <a:camera prst="orthographicFront"/>
+      <a:lightRig rig="threePt" dir="t"/>
+    </dgm:scene3d>
+    <dgm:sp3d/>
+    <dgm:txPr/>
+    <dgm:style>
+      <a:lnRef idx="2">
+        <a:scrgbClr r="0" g="0" b="0"/>
+      </a:lnRef>
+      <a:fillRef idx="1">
+        <a:scrgbClr r="0" g="0" b="0"/>
+      </a:fillRef>
+      <a:effectRef idx="0">
+        <a:scrgbClr r="0" g="0" b="0"/>
+      </a:effectRef>
+      <a:fontRef idx="minor"/>
+    </dgm:style>
+  </dgm:styleLbl>
+  <dgm:styleLbl name="alignAccFollowNode1">
+    <dgm:scene3d>
+      <a:camera prst="orthographicFront"/>
+      <a:lightRig rig="threePt" dir="t"/>
+    </dgm:scene3d>
+    <dgm:sp3d/>
+    <dgm:txPr/>
+    <dgm:style>
+      <a:lnRef idx="2">
+        <a:scrgbClr r="0" g="0" b="0"/>
+      </a:lnRef>
+      <a:fillRef idx="1">
+        <a:scrgbClr r="0" g="0" b="0"/>
+      </a:fillRef>
+      <a:effectRef idx="0">
+        <a:scrgbClr r="0" g="0" b="0"/>
+      </a:effectRef>
+      <a:fontRef idx="minor"/>
+    </dgm:style>
+  </dgm:styleLbl>
+  <dgm:styleLbl name="bgAccFollowNode1">
+    <dgm:scene3d>
+      <a:camera prst="orthographicFront"/>
+      <a:lightRig rig="threePt" dir="t"/>
+    </dgm:scene3d>
+    <dgm:sp3d/>
+    <dgm:txPr/>
+    <dgm:style>
+      <a:lnRef idx="2">
+        <a:scrgbClr r="0" g="0" b="0"/>
+      </a:lnRef>
+      <a:fillRef idx="1">
+        <a:scrgbClr r="0" g="0" b="0"/>
+      </a:fillRef>
+      <a:effectRef idx="0">
+        <a:scrgbClr r="0" g="0" b="0"/>
+      </a:effectRef>
+      <a:fontRef idx="minor"/>
+    </dgm:style>
+  </dgm:styleLbl>
+  <dgm:styleLbl name="fgAcc0">
+    <dgm:scene3d>
+      <a:camera prst="orthographicFront"/>
+      <a:lightRig rig="threePt" dir="t"/>
+    </dgm:scene3d>
+    <dgm:sp3d/>
+    <dgm:txPr/>
+    <dgm:style>
+      <a:lnRef idx="2">
+        <a:scrgbClr r="0" g="0" b="0"/>
+      </a:lnRef>
+      <a:fillRef idx="1">
+        <a:scrgbClr r="0" g="0" b="0"/>
+      </a:fillRef>
+      <a:effectRef idx="0">
+        <a:scrgbClr r="0" g="0" b="0"/>
+      </a:effectRef>
+      <a:fontRef idx="minor"/>
+    </dgm:style>
+  </dgm:styleLbl>
+  <dgm:styleLbl name="fgAcc2">
+    <dgm:scene3d>
+      <a:camera prst="orthographicFront"/>
+      <a:lightRig rig="threePt" dir="t"/>
+    </dgm:scene3d>
+    <dgm:sp3d/>
+    <dgm:txPr/>
+    <dgm:style>
+      <a:lnRef idx="2">
+        <a:scrgbClr r="0" g="0" b="0"/>
+      </a:lnRef>
+      <a:fillRef idx="1">
+        <a:scrgbClr r="0" g="0" b="0"/>
+      </a:fillRef>
+      <a:effectRef idx="0">
+        <a:scrgbClr r="0" g="0" b="0"/>
+      </a:effectRef>
+      <a:fontRef idx="minor"/>
+    </dgm:style>
+  </dgm:styleLbl>
+  <dgm:styleLbl name="fgAcc3">
+    <dgm:scene3d>
+      <a:camera prst="orthographicFront"/>
+      <a:lightRig rig="threePt" dir="t"/>
+    </dgm:scene3d>
+    <dgm:sp3d/>
+    <dgm:txPr/>
+    <dgm:style>
+      <a:lnRef idx="2">
+        <a:scrgbClr r="0" g="0" b="0"/>
+      </a:lnRef>
+      <a:fillRef idx="1">
+        <a:scrgbClr r="0" g="0" b="0"/>
+      </a:fillRef>
+      <a:effectRef idx="0">
+        <a:scrgbClr r="0" g="0" b="0"/>
+      </a:effectRef>
+      <a:fontRef idx="minor"/>
+    </dgm:style>
+  </dgm:styleLbl>
+  <dgm:styleLbl name="fgAcc4">
+    <dgm:scene3d>
+      <a:camera prst="orthographicFront"/>
+      <a:lightRig rig="threePt" dir="t"/>
+    </dgm:scene3d>
+    <dgm:sp3d/>
+    <dgm:txPr/>
+    <dgm:style>
+      <a:lnRef idx="2">
+        <a:scrgbClr r="0" g="0" b="0"/>
+      </a:lnRef>
+      <a:fillRef idx="1">
+        <a:scrgbClr r="0" g="0" b="0"/>
+      </a:fillRef>
+      <a:effectRef idx="0">
+        <a:scrgbClr r="0" g="0" b="0"/>
+      </a:effectRef>
+      <a:fontRef idx="minor"/>
+    </dgm:style>
+  </dgm:styleLbl>
+  <dgm:styleLbl name="bgShp">
+    <dgm:scene3d>
+      <a:camera prst="orthographicFront"/>
+      <a:lightRig rig="threePt" dir="t"/>
+    </dgm:scene3d>
+    <dgm:sp3d/>
+    <dgm:txPr/>
+    <dgm:style>
+      <a:lnRef idx="0">
+        <a:scrgbClr r="0" g="0" b="0"/>
+      </a:lnRef>
+      <a:fillRef idx="1">
+        <a:scrgbClr r="0" g="0" b="0"/>
+      </a:fillRef>
+      <a:effectRef idx="0">
+        <a:scrgbClr r="0" g="0" b="0"/>
+      </a:effectRef>
+      <a:fontRef idx="minor"/>
+    </dgm:style>
+  </dgm:styleLbl>
+  <dgm:styleLbl name="dkBgShp">
+    <dgm:scene3d>
+      <a:camera prst="orthographicFront"/>
+      <a:lightRig rig="threePt" dir="t"/>
+    </dgm:scene3d>
+    <dgm:sp3d/>
+    <dgm:txPr/>
+    <dgm:style>
+      <a:lnRef idx="0">
+        <a:scrgbClr r="0" g="0" b="0"/>
+      </a:lnRef>
+      <a:fillRef idx="1">
+        <a:scrgbClr r="0" g="0" b="0"/>
+      </a:fillRef>
+      <a:effectRef idx="0">
+        <a:scrgbClr r="0" g="0" b="0"/>
+      </a:effectRef>
+      <a:fontRef idx="minor"/>
+    </dgm:style>
+  </dgm:styleLbl>
+  <dgm:styleLbl name="trBgShp">
+    <dgm:scene3d>
+      <a:camera prst="orthographicFront"/>
+      <a:lightRig rig="threePt" dir="t"/>
+    </dgm:scene3d>
+    <dgm:sp3d/>
+    <dgm:txPr/>
+    <dgm:style>
+      <a:lnRef idx="0">
+        <a:scrgbClr r="0" g="0" b="0"/>
+      </a:lnRef>
+      <a:fillRef idx="1">
+        <a:scrgbClr r="0" g="0" b="0"/>
+      </a:fillRef>
+      <a:effectRef idx="0">
+        <a:scrgbClr r="0" g="0" b="0"/>
+      </a:effectRef>
+      <a:fontRef idx="minor"/>
+    </dgm:style>
+  </dgm:styleLbl>
+  <dgm:styleLbl name="fgShp">
+    <dgm:scene3d>
+      <a:camera prst="orthographicFront"/>
+      <a:lightRig rig="threePt" dir="t"/>
+    </dgm:scene3d>
+    <dgm:sp3d/>
+    <dgm:txPr/>
+    <dgm:style>
+      <a:lnRef idx="2">
+        <a:scrgbClr r="0" g="0" b="0"/>
+      </a:lnRef>
+      <a:fillRef idx="1">
+        <a:scrgbClr r="0" g="0" b="0"/>
+      </a:fillRef>
+      <a:effectRef idx="0">
+        <a:scrgbClr r="0" g="0" b="0"/>
+      </a:effectRef>
+      <a:fontRef idx="minor"/>
+    </dgm:style>
+  </dgm:styleLbl>
+  <dgm:styleLbl name="revTx">
+    <dgm:scene3d>
+      <a:camera prst="orthographicFront"/>
+      <a:lightRig rig="threePt" dir="t"/>
+    </dgm:scene3d>
+    <dgm:sp3d/>
+    <dgm:txPr/>
+    <dgm:style>
+      <a:lnRef idx="0">
+        <a:scrgbClr r="0" g="0" b="0"/>
+      </a:lnRef>
+      <a:fillRef idx="0">
+        <a:scrgbClr r="0" g="0" b="0"/>
+      </a:fillRef>
+      <a:effectRef idx="0">
+        <a:scrgbClr r="0" g="0" b="0"/>
+      </a:effectRef>
+      <a:fontRef idx="minor"/>
+    </dgm:style>
+  </dgm:styleLbl>
+</dgm:styleDef>
+</file>
+
+<file path=ppt/notesMasters/notesMaster1.xml><?xml version="1.0" encoding="utf-8"?>
+<p:notesMaster xmlns:a="http://schemas.openxmlformats.org/drawingml/2006/main" xmlns:r="http://schemas.openxmlformats.org/officeDocument/2006/relationships" xmlns:p="http://schemas.openxmlformats.org/presentationml/2006/main">
+  <p:cSld>
+    <p:bg>
+      <p:bgRef idx="1001">
+        <a:schemeClr val="bg1"/>
+      </p:bgRef>
+    </p:bg>
+    <p:spTree>
+      <p:nvGrpSpPr>
+        <p:cNvPr id="1" name=""/>
+        <p:cNvGrpSpPr/>
+        <p:nvPr/>
+      </p:nvGrpSpPr>
+      <p:grpSpPr>
+        <a:xfrm>
+          <a:off x="0" y="0"/>
+          <a:ext cx="0" cy="0"/>
+          <a:chOff x="0" y="0"/>
+          <a:chExt cx="0" cy="0"/>
+        </a:xfrm>
+      </p:grpSpPr>
+      <p:sp>
+        <p:nvSpPr>
+          <p:cNvPr id="2" name="Kopfzeilenplatzhalter 1"/>
+          <p:cNvSpPr>
+            <a:spLocks noGrp="1"/>
+          </p:cNvSpPr>
+          <p:nvPr>
+            <p:ph type="hdr" sz="quarter"/>
+          </p:nvPr>
+        </p:nvSpPr>
+        <p:spPr>
+          <a:xfrm>
+            <a:off x="0" y="0"/>
+            <a:ext cx="2971800" cy="458788"/>
+          </a:xfrm>
+          <a:prstGeom prst="rect">
+            <a:avLst/>
+          </a:prstGeom>
+        </p:spPr>
+        <p:txBody>
+          <a:bodyPr vert="horz" lIns="91440" tIns="45720" rIns="91440" bIns="45720" rtlCol="0"/>
+          <a:lstStyle>
+            <a:lvl1pPr algn="l">
+              <a:defRPr sz="1200"/>
+            </a:lvl1pPr>
+          </a:lstStyle>
+          <a:p>
+            <a:endParaRPr lang="de-DE"/>
+          </a:p>
+        </p:txBody>
+      </p:sp>
+      <p:sp>
+        <p:nvSpPr>
+          <p:cNvPr id="3" name="Datumsplatzhalter 2"/>
+          <p:cNvSpPr>
+            <a:spLocks noGrp="1"/>
+          </p:cNvSpPr>
+          <p:nvPr>
+            <p:ph type="dt" idx="1"/>
+          </p:nvPr>
+        </p:nvSpPr>
+        <p:spPr>
+          <a:xfrm>
+            <a:off x="3884613" y="0"/>
+            <a:ext cx="2971800" cy="458788"/>
+          </a:xfrm>
+          <a:prstGeom prst="rect">
+            <a:avLst/>
+          </a:prstGeom>
+        </p:spPr>
+        <p:txBody>
+          <a:bodyPr vert="horz" lIns="91440" tIns="45720" rIns="91440" bIns="45720" rtlCol="0"/>
+          <a:lstStyle>
+            <a:lvl1pPr algn="r">
+              <a:defRPr sz="1200"/>
+            </a:lvl1pPr>
+          </a:lstStyle>
+          <a:p>
+            <a:fld id="{38E18590-F0A6-4A1E-B2BC-9733D4EEBF0F}" type="datetimeFigureOut">
+              <a:rPr lang="de-DE" smtClean="0"/>
+              <a:t>17.12.14</a:t>
+            </a:fld>
+            <a:endParaRPr lang="de-DE"/>
+          </a:p>
+        </p:txBody>
+      </p:sp>
+      <p:sp>
+        <p:nvSpPr>
+          <p:cNvPr id="4" name="Folienbildplatzhalter 3"/>
+          <p:cNvSpPr>
+            <a:spLocks noGrp="1" noRot="1" noChangeAspect="1"/>
+          </p:cNvSpPr>
+          <p:nvPr>
+            <p:ph type="sldImg" idx="2"/>
+          </p:nvPr>
+        </p:nvSpPr>
+        <p:spPr>
+          <a:xfrm>
+            <a:off x="1371600" y="1143000"/>
+            <a:ext cx="4114800" cy="3086100"/>
+          </a:xfrm>
+          <a:prstGeom prst="rect">
+            <a:avLst/>
+          </a:prstGeom>
+          <a:noFill/>
+          <a:ln w="12700">
+            <a:solidFill>
+              <a:prstClr val="black"/>
+            </a:solidFill>
+          </a:ln>
+        </p:spPr>
+        <p:txBody>
+          <a:bodyPr vert="horz" lIns="91440" tIns="45720" rIns="91440" bIns="45720" rtlCol="0" anchor="ctr"/>
+          <a:lstStyle/>
+          <a:p>
+            <a:endParaRPr lang="de-DE"/>
+          </a:p>
+        </p:txBody>
+      </p:sp>
+      <p:sp>
+        <p:nvSpPr>
+          <p:cNvPr id="5" name="Notizenplatzhalter 4"/>
+          <p:cNvSpPr>
+            <a:spLocks noGrp="1"/>
+          </p:cNvSpPr>
+          <p:nvPr>
+            <p:ph type="body" sz="quarter" idx="3"/>
+          </p:nvPr>
+        </p:nvSpPr>
+        <p:spPr>
+          <a:xfrm>
+            <a:off x="685800" y="4400550"/>
+            <a:ext cx="5486400" cy="3600450"/>
+          </a:xfrm>
+          <a:prstGeom prst="rect">
+            <a:avLst/>
+          </a:prstGeom>
+        </p:spPr>
+        <p:txBody>
+          <a:bodyPr vert="horz" lIns="91440" tIns="45720" rIns="91440" bIns="45720" rtlCol="0"/>
+          <a:lstStyle/>
+          <a:p>
+            <a:pPr lvl="0"/>
+            <a:r>
+              <a:rPr lang="de-DE" smtClean="0"/>
+              <a:t>Textmasterformat bearbeiten</a:t>
+            </a:r>
+          </a:p>
+          <a:p>
+            <a:pPr lvl="1"/>
+            <a:r>
+              <a:rPr lang="de-DE" smtClean="0"/>
+              <a:t>Zweite Ebene</a:t>
+            </a:r>
+          </a:p>
+          <a:p>
+            <a:pPr lvl="2"/>
+            <a:r>
+              <a:rPr lang="de-DE" smtClean="0"/>
+              <a:t>Dritte Ebene</a:t>
+            </a:r>
+          </a:p>
+          <a:p>
+            <a:pPr lvl="3"/>
+            <a:r>
+              <a:rPr lang="de-DE" smtClean="0"/>
+              <a:t>Vierte Ebene</a:t>
+            </a:r>
+          </a:p>
+          <a:p>
+            <a:pPr lvl="4"/>
+            <a:r>
+              <a:rPr lang="de-DE" smtClean="0"/>
+              <a:t>Fünfte Ebene</a:t>
+            </a:r>
+            <a:endParaRPr lang="de-DE"/>
+          </a:p>
+        </p:txBody>
+      </p:sp>
+      <p:sp>
+        <p:nvSpPr>
+          <p:cNvPr id="6" name="Fußzeilenplatzhalter 5"/>
+          <p:cNvSpPr>
+            <a:spLocks noGrp="1"/>
+          </p:cNvSpPr>
+          <p:nvPr>
+            <p:ph type="ftr" sz="quarter" idx="4"/>
+          </p:nvPr>
+        </p:nvSpPr>
+        <p:spPr>
+          <a:xfrm>
+            <a:off x="0" y="8685213"/>
+            <a:ext cx="2971800" cy="458787"/>
+          </a:xfrm>
+          <a:prstGeom prst="rect">
+            <a:avLst/>
+          </a:prstGeom>
+        </p:spPr>
+        <p:txBody>
+          <a:bodyPr vert="horz" lIns="91440" tIns="45720" rIns="91440" bIns="45720" rtlCol="0" anchor="b"/>
+          <a:lstStyle>
+            <a:lvl1pPr algn="l">
+              <a:defRPr sz="1200"/>
+            </a:lvl1pPr>
+          </a:lstStyle>
+          <a:p>
+            <a:endParaRPr lang="de-DE"/>
+          </a:p>
+        </p:txBody>
+      </p:sp>
+      <p:sp>
+        <p:nvSpPr>
+          <p:cNvPr id="7" name="Foliennummernplatzhalter 6"/>
+          <p:cNvSpPr>
+            <a:spLocks noGrp="1"/>
+          </p:cNvSpPr>
+          <p:nvPr>
+            <p:ph type="sldNum" sz="quarter" idx="5"/>
+          </p:nvPr>
+        </p:nvSpPr>
+        <p:spPr>
+          <a:xfrm>
+            <a:off x="3884613" y="8685213"/>
+            <a:ext cx="2971800" cy="458787"/>
+          </a:xfrm>
+          <a:prstGeom prst="rect">
+            <a:avLst/>
+          </a:prstGeom>
+        </p:spPr>
+        <p:txBody>
+          <a:bodyPr vert="horz" lIns="91440" tIns="45720" rIns="91440" bIns="45720" rtlCol="0" anchor="b"/>
+          <a:lstStyle>
+            <a:lvl1pPr algn="r">
+              <a:defRPr sz="1200"/>
+            </a:lvl1pPr>
+          </a:lstStyle>
+          <a:p>
+            <a:fld id="{8BB88BC2-B197-4A17-85BB-EB8624126E2F}" type="slidenum">
+              <a:rPr lang="de-DE" smtClean="0"/>
+              <a:t>‹Nr.›</a:t>
+            </a:fld>
+            <a:endParaRPr lang="de-DE"/>
+          </a:p>
+        </p:txBody>
+      </p:sp>
+    </p:spTree>
+    <p:extLst>
+      <p:ext uri="{BB962C8B-B14F-4D97-AF65-F5344CB8AC3E}">
+        <p14:creationId xmlns:p14="http://schemas.microsoft.com/office/powerpoint/2010/main" val="2305245798"/>
+      </p:ext>
+    </p:extLst>
+  </p:cSld>
+  <p:clrMap bg1="lt1" tx1="dk1" bg2="lt2" tx2="dk2" accent1="accent1" accent2="accent2" accent3="accent3" accent4="accent4" accent5="accent5" accent6="accent6" hlink="hlink" folHlink="folHlink"/>
+  <p:notesStyle>
+    <a:lvl1pPr marL="0" algn="l" defTabSz="914400" rtl="0" eaLnBrk="1" latinLnBrk="0" hangingPunct="1">
+      <a:defRPr sz="1200" kern="1200">
+        <a:solidFill>
+          <a:schemeClr val="tx1"/>
+        </a:solidFill>
+        <a:latin typeface="+mn-lt"/>
+        <a:ea typeface="+mn-ea"/>
+        <a:cs typeface="+mn-cs"/>
+      </a:defRPr>
+    </a:lvl1pPr>
+    <a:lvl2pPr marL="457200" algn="l" defTabSz="914400" rtl="0" eaLnBrk="1" latinLnBrk="0" hangingPunct="1">
+      <a:defRPr sz="1200" kern="1200">
+        <a:solidFill>
+          <a:schemeClr val="tx1"/>
+        </a:solidFill>
+        <a:latin typeface="+mn-lt"/>
+        <a:ea typeface="+mn-ea"/>
+        <a:cs typeface="+mn-cs"/>
+      </a:defRPr>
+    </a:lvl2pPr>
+    <a:lvl3pPr marL="914400" algn="l" defTabSz="914400" rtl="0" eaLnBrk="1" latinLnBrk="0" hangingPunct="1">
+      <a:defRPr sz="1200" kern="1200">
+        <a:solidFill>
+          <a:schemeClr val="tx1"/>
+        </a:solidFill>
+        <a:latin typeface="+mn-lt"/>
+        <a:ea typeface="+mn-ea"/>
+        <a:cs typeface="+mn-cs"/>
+      </a:defRPr>
+    </a:lvl3pPr>
+    <a:lvl4pPr marL="1371600" algn="l" defTabSz="914400" rtl="0" eaLnBrk="1" latinLnBrk="0" hangingPunct="1">
+      <a:defRPr sz="1200" kern="1200">
+        <a:solidFill>
+          <a:schemeClr val="tx1"/>
+        </a:solidFill>
+        <a:latin typeface="+mn-lt"/>
+        <a:ea typeface="+mn-ea"/>
+        <a:cs typeface="+mn-cs"/>
+      </a:defRPr>
+    </a:lvl4pPr>
+    <a:lvl5pPr marL="1828800" algn="l" defTabSz="914400" rtl="0" eaLnBrk="1" latinLnBrk="0" hangingPunct="1">
+      <a:defRPr sz="1200" kern="1200">
+        <a:solidFill>
+          <a:schemeClr val="tx1"/>
+        </a:solidFill>
+        <a:latin typeface="+mn-lt"/>
+        <a:ea typeface="+mn-ea"/>
+        <a:cs typeface="+mn-cs"/>
+      </a:defRPr>
+    </a:lvl5pPr>
+    <a:lvl6pPr marL="2286000" algn="l" defTabSz="914400" rtl="0" eaLnBrk="1" latinLnBrk="0" hangingPunct="1">
+      <a:defRPr sz="1200" kern="1200">
+        <a:solidFill>
+          <a:schemeClr val="tx1"/>
+        </a:solidFill>
+        <a:latin typeface="+mn-lt"/>
+        <a:ea typeface="+mn-ea"/>
+        <a:cs typeface="+mn-cs"/>
+      </a:defRPr>
+    </a:lvl6pPr>
+    <a:lvl7pPr marL="2743200" algn="l" defTabSz="914400" rtl="0" eaLnBrk="1" latinLnBrk="0" hangingPunct="1">
+      <a:defRPr sz="1200" kern="1200">
+        <a:solidFill>
+          <a:schemeClr val="tx1"/>
+        </a:solidFill>
+        <a:latin typeface="+mn-lt"/>
+        <a:ea typeface="+mn-ea"/>
+        <a:cs typeface="+mn-cs"/>
+      </a:defRPr>
+    </a:lvl7pPr>
+    <a:lvl8pPr marL="3200400" algn="l" defTabSz="914400" rtl="0" eaLnBrk="1" latinLnBrk="0" hangingPunct="1">
+      <a:defRPr sz="1200" kern="1200">
+        <a:solidFill>
+          <a:schemeClr val="tx1"/>
+        </a:solidFill>
+        <a:latin typeface="+mn-lt"/>
+        <a:ea typeface="+mn-ea"/>
+        <a:cs typeface="+mn-cs"/>
+      </a:defRPr>
+    </a:lvl8pPr>
+    <a:lvl9pPr marL="3657600" algn="l" defTabSz="914400" rtl="0" eaLnBrk="1" latinLnBrk="0" hangingPunct="1">
+      <a:defRPr sz="1200" kern="1200">
+        <a:solidFill>
+          <a:schemeClr val="tx1"/>
+        </a:solidFill>
+        <a:latin typeface="+mn-lt"/>
+        <a:ea typeface="+mn-ea"/>
+        <a:cs typeface="+mn-cs"/>
+      </a:defRPr>
+    </a:lvl9pPr>
+  </p:notesStyle>
+</p:notesMaster>
+</file>
+
+<file path=ppt/notesSlides/notesSlide1.xml><?xml version="1.0" encoding="utf-8"?>
+<p:notes xmlns:a="http://schemas.openxmlformats.org/drawingml/2006/main" xmlns:r="http://schemas.openxmlformats.org/officeDocument/2006/relationships" xmlns:p="http://schemas.openxmlformats.org/presentationml/2006/main">
+  <p:cSld>
+    <p:spTree>
+      <p:nvGrpSpPr>
+        <p:cNvPr id="1" name=""/>
+        <p:cNvGrpSpPr/>
+        <p:nvPr/>
+      </p:nvGrpSpPr>
+      <p:grpSpPr>
+        <a:xfrm>
+          <a:off x="0" y="0"/>
+          <a:ext cx="0" cy="0"/>
+          <a:chOff x="0" y="0"/>
+          <a:chExt cx="0" cy="0"/>
+        </a:xfrm>
+      </p:grpSpPr>
+      <p:sp>
+        <p:nvSpPr>
+          <p:cNvPr id="2" name="Folienbildplatzhalter 1"/>
+          <p:cNvSpPr>
+            <a:spLocks noGrp="1" noRot="1" noChangeAspect="1"/>
+          </p:cNvSpPr>
+          <p:nvPr>
+            <p:ph type="sldImg"/>
+          </p:nvPr>
+        </p:nvSpPr>
+        <p:spPr/>
+      </p:sp>
+      <p:sp>
+        <p:nvSpPr>
+          <p:cNvPr id="3" name="Notizenplatzhalter 2"/>
+          <p:cNvSpPr>
+            <a:spLocks noGrp="1"/>
+          </p:cNvSpPr>
+          <p:nvPr>
+            <p:ph type="body" idx="1"/>
+          </p:nvPr>
+        </p:nvSpPr>
+        <p:spPr/>
+        <p:txBody>
+          <a:bodyPr/>
+          <a:lstStyle/>
+          <a:p>
+            <a:endParaRPr lang="de-DE" dirty="0"/>
+          </a:p>
+        </p:txBody>
+      </p:sp>
+      <p:sp>
+        <p:nvSpPr>
+          <p:cNvPr id="4" name="Foliennummernplatzhalter 3"/>
+          <p:cNvSpPr>
+            <a:spLocks noGrp="1"/>
+          </p:cNvSpPr>
+          <p:nvPr>
+            <p:ph type="sldNum" sz="quarter" idx="10"/>
+          </p:nvPr>
+        </p:nvSpPr>
+        <p:spPr/>
+        <p:txBody>
+          <a:bodyPr/>
+          <a:lstStyle/>
+          <a:p>
+            <a:fld id="{8BB88BC2-B197-4A17-85BB-EB8624126E2F}" type="slidenum">
+              <a:rPr lang="de-DE" smtClean="0"/>
+              <a:t>5</a:t>
+            </a:fld>
+            <a:endParaRPr lang="de-DE"/>
+          </a:p>
+        </p:txBody>
+      </p:sp>
+    </p:spTree>
+    <p:extLst>
+      <p:ext uri="{BB962C8B-B14F-4D97-AF65-F5344CB8AC3E}">
+        <p14:creationId xmlns:p14="http://schemas.microsoft.com/office/powerpoint/2010/main" val="3517833916"/>
+      </p:ext>
+    </p:extLst>
+  </p:cSld>
+  <p:clrMapOvr>
+    <a:masterClrMapping/>
+  </p:clrMapOvr>
+</p:notes>
 </file>
 
 <file path=ppt/slideLayouts/slideLayout1.xml><?xml version="1.0" encoding="utf-8"?>
@@ -11773,7 +15259,7 @@
           <a:p>
             <a:fld id="{CF2933F3-F04D-48C8-9880-7A8EA4FF7473}" type="datetimeFigureOut">
               <a:rPr lang="de-DE" smtClean="0"/>
-              <a:t>14.12.14</a:t>
+              <a:t>17.12.14</a:t>
             </a:fld>
             <a:endParaRPr lang="de-DE"/>
           </a:p>
@@ -11943,7 +15429,7 @@
           <a:p>
             <a:fld id="{CF2933F3-F04D-48C8-9880-7A8EA4FF7473}" type="datetimeFigureOut">
               <a:rPr lang="de-DE" smtClean="0"/>
-              <a:t>14.12.14</a:t>
+              <a:t>17.12.14</a:t>
             </a:fld>
             <a:endParaRPr lang="de-DE"/>
           </a:p>
@@ -12123,7 +15609,7 @@
           <a:p>
             <a:fld id="{CF2933F3-F04D-48C8-9880-7A8EA4FF7473}" type="datetimeFigureOut">
               <a:rPr lang="de-DE" smtClean="0"/>
-              <a:t>14.12.14</a:t>
+              <a:t>17.12.14</a:t>
             </a:fld>
             <a:endParaRPr lang="de-DE"/>
           </a:p>
@@ -12293,7 +15779,7 @@
           <a:p>
             <a:fld id="{CF2933F3-F04D-48C8-9880-7A8EA4FF7473}" type="datetimeFigureOut">
               <a:rPr lang="de-DE" smtClean="0"/>
-              <a:t>14.12.14</a:t>
+              <a:t>17.12.14</a:t>
             </a:fld>
             <a:endParaRPr lang="de-DE"/>
           </a:p>
@@ -12539,7 +16025,7 @@
           <a:p>
             <a:fld id="{CF2933F3-F04D-48C8-9880-7A8EA4FF7473}" type="datetimeFigureOut">
               <a:rPr lang="de-DE" smtClean="0"/>
-              <a:t>14.12.14</a:t>
+              <a:t>17.12.14</a:t>
             </a:fld>
             <a:endParaRPr lang="de-DE"/>
           </a:p>
@@ -12827,7 +16313,7 @@
           <a:p>
             <a:fld id="{CF2933F3-F04D-48C8-9880-7A8EA4FF7473}" type="datetimeFigureOut">
               <a:rPr lang="de-DE" smtClean="0"/>
-              <a:t>14.12.14</a:t>
+              <a:t>17.12.14</a:t>
             </a:fld>
             <a:endParaRPr lang="de-DE"/>
           </a:p>
@@ -13249,7 +16735,7 @@
           <a:p>
             <a:fld id="{CF2933F3-F04D-48C8-9880-7A8EA4FF7473}" type="datetimeFigureOut">
               <a:rPr lang="de-DE" smtClean="0"/>
-              <a:t>14.12.14</a:t>
+              <a:t>17.12.14</a:t>
             </a:fld>
             <a:endParaRPr lang="de-DE"/>
           </a:p>
@@ -13367,7 +16853,7 @@
           <a:p>
             <a:fld id="{CF2933F3-F04D-48C8-9880-7A8EA4FF7473}" type="datetimeFigureOut">
               <a:rPr lang="de-DE" smtClean="0"/>
-              <a:t>14.12.14</a:t>
+              <a:t>17.12.14</a:t>
             </a:fld>
             <a:endParaRPr lang="de-DE"/>
           </a:p>
@@ -13462,7 +16948,7 @@
           <a:p>
             <a:fld id="{CF2933F3-F04D-48C8-9880-7A8EA4FF7473}" type="datetimeFigureOut">
               <a:rPr lang="de-DE" smtClean="0"/>
-              <a:t>14.12.14</a:t>
+              <a:t>17.12.14</a:t>
             </a:fld>
             <a:endParaRPr lang="de-DE"/>
           </a:p>
@@ -13739,7 +17225,7 @@
           <a:p>
             <a:fld id="{CF2933F3-F04D-48C8-9880-7A8EA4FF7473}" type="datetimeFigureOut">
               <a:rPr lang="de-DE" smtClean="0"/>
-              <a:t>14.12.14</a:t>
+              <a:t>17.12.14</a:t>
             </a:fld>
             <a:endParaRPr lang="de-DE"/>
           </a:p>
@@ -13992,7 +17478,7 @@
           <a:p>
             <a:fld id="{CF2933F3-F04D-48C8-9880-7A8EA4FF7473}" type="datetimeFigureOut">
               <a:rPr lang="de-DE" smtClean="0"/>
-              <a:t>14.12.14</a:t>
+              <a:t>17.12.14</a:t>
             </a:fld>
             <a:endParaRPr lang="de-DE"/>
           </a:p>
@@ -14205,7 +17691,7 @@
           <a:p>
             <a:fld id="{CF2933F3-F04D-48C8-9880-7A8EA4FF7473}" type="datetimeFigureOut">
               <a:rPr lang="de-DE" smtClean="0"/>
-              <a:t>14.12.14</a:t>
+              <a:t>17.12.14</a:t>
             </a:fld>
             <a:endParaRPr lang="de-DE"/>
           </a:p>
@@ -14993,22 +18479,28 @@
       </p:sp>
       <p:pic>
         <p:nvPicPr>
-          <p:cNvPr id="5" name="Grafik 4"/>
+          <p:cNvPr id="3" name="Bild 2" descr="Unbenannt.JPG"/>
           <p:cNvPicPr>
             <a:picLocks noChangeAspect="1"/>
           </p:cNvPicPr>
           <p:nvPr/>
         </p:nvPicPr>
         <p:blipFill>
-          <a:blip r:embed="rId3"/>
+          <a:blip r:embed="rId3">
+            <a:extLst>
+              <a:ext uri="{28A0092B-C50C-407E-A947-70E740481C1C}">
+                <a14:useLocalDpi xmlns:a14="http://schemas.microsoft.com/office/drawing/2010/main" val="0"/>
+              </a:ext>
+            </a:extLst>
+          </a:blip>
           <a:stretch>
             <a:fillRect/>
           </a:stretch>
         </p:blipFill>
         <p:spPr>
           <a:xfrm>
-            <a:off x="755576" y="5809134"/>
-            <a:ext cx="7772400" cy="781050"/>
+            <a:off x="749300" y="1143000"/>
+            <a:ext cx="7639050" cy="4572000"/>
           </a:xfrm>
           <a:prstGeom prst="rect">
             <a:avLst/>
@@ -15017,22 +18509,28 @@
       </p:pic>
       <p:pic>
         <p:nvPicPr>
-          <p:cNvPr id="7" name="Grafik 6"/>
+          <p:cNvPr id="4" name="Bild 3" descr="Unbenann1t.JPG"/>
           <p:cNvPicPr>
             <a:picLocks noChangeAspect="1"/>
           </p:cNvPicPr>
           <p:nvPr/>
         </p:nvPicPr>
         <p:blipFill>
-          <a:blip r:embed="rId4"/>
+          <a:blip r:embed="rId4">
+            <a:extLst>
+              <a:ext uri="{28A0092B-C50C-407E-A947-70E740481C1C}">
+                <a14:useLocalDpi xmlns:a14="http://schemas.microsoft.com/office/drawing/2010/main" val="0"/>
+              </a:ext>
+            </a:extLst>
+          </a:blip>
           <a:stretch>
             <a:fillRect/>
           </a:stretch>
         </p:blipFill>
         <p:spPr>
           <a:xfrm>
-            <a:off x="781050" y="1162050"/>
-            <a:ext cx="7581900" cy="4533900"/>
+            <a:off x="827584" y="5733256"/>
+            <a:ext cx="7467600" cy="609600"/>
           </a:xfrm>
           <a:prstGeom prst="rect">
             <a:avLst/>
@@ -15052,83 +18550,7 @@
   <p:timing>
     <p:tnLst>
       <p:par>
-        <p:cTn xmlns:p14="http://schemas.microsoft.com/office/powerpoint/2010/main" id="1" dur="indefinite" restart="never" nodeType="tmRoot">
-          <p:childTnLst>
-            <p:seq concurrent="1" nextAc="seek">
-              <p:cTn id="2" dur="indefinite" nodeType="mainSeq">
-                <p:childTnLst>
-                  <p:par>
-                    <p:cTn id="3" fill="hold">
-                      <p:stCondLst>
-                        <p:cond delay="indefinite"/>
-                      </p:stCondLst>
-                      <p:childTnLst>
-                        <p:par>
-                          <p:cTn id="4" fill="hold">
-                            <p:stCondLst>
-                              <p:cond delay="0"/>
-                            </p:stCondLst>
-                            <p:childTnLst>
-                              <p:par>
-                                <p:cTn id="5" presetID="10" presetClass="entr" presetSubtype="0" fill="hold" nodeType="clickEffect">
-                                  <p:stCondLst>
-                                    <p:cond delay="0"/>
-                                  </p:stCondLst>
-                                  <p:childTnLst>
-                                    <p:set>
-                                      <p:cBhvr>
-                                        <p:cTn id="6" dur="1" fill="hold">
-                                          <p:stCondLst>
-                                            <p:cond delay="0"/>
-                                          </p:stCondLst>
-                                        </p:cTn>
-                                        <p:tgtEl>
-                                          <p:spTgt spid="5"/>
-                                        </p:tgtEl>
-                                        <p:attrNameLst>
-                                          <p:attrName>style.visibility</p:attrName>
-                                        </p:attrNameLst>
-                                      </p:cBhvr>
-                                      <p:to>
-                                        <p:strVal val="visible"/>
-                                      </p:to>
-                                    </p:set>
-                                    <p:animEffect transition="in" filter="fade">
-                                      <p:cBhvr>
-                                        <p:cTn id="7" dur="500"/>
-                                        <p:tgtEl>
-                                          <p:spTgt spid="5"/>
-                                        </p:tgtEl>
-                                      </p:cBhvr>
-                                    </p:animEffect>
-                                  </p:childTnLst>
-                                </p:cTn>
-                              </p:par>
-                            </p:childTnLst>
-                          </p:cTn>
-                        </p:par>
-                      </p:childTnLst>
-                    </p:cTn>
-                  </p:par>
-                </p:childTnLst>
-              </p:cTn>
-              <p:prevCondLst>
-                <p:cond evt="onPrev" delay="0">
-                  <p:tgtEl>
-                    <p:sldTgt/>
-                  </p:tgtEl>
-                </p:cond>
-              </p:prevCondLst>
-              <p:nextCondLst>
-                <p:cond evt="onNext" delay="0">
-                  <p:tgtEl>
-                    <p:sldTgt/>
-                  </p:tgtEl>
-                </p:cond>
-              </p:nextCondLst>
-            </p:seq>
-          </p:childTnLst>
-        </p:cTn>
+        <p:cTn xmlns:p14="http://schemas.microsoft.com/office/powerpoint/2010/main" id="1" dur="indefinite" restart="never" nodeType="tmRoot"/>
       </p:par>
     </p:tnLst>
   </p:timing>
@@ -15473,7 +18895,7 @@
           <p:nvPr/>
         </p:nvPicPr>
         <p:blipFill>
-          <a:blip r:embed="rId2">
+          <a:blip r:embed="rId3">
             <a:extLst>
               <a:ext uri="{28A0092B-C50C-407E-A947-70E740481C1C}">
                 <a14:useLocalDpi xmlns:a14="http://schemas.microsoft.com/office/drawing/2010/main" val="0"/>
@@ -15547,15 +18969,7 @@
                   <a:schemeClr val="bg1"/>
                 </a:solidFill>
               </a:rPr>
-              <a:t>Datenmodell </a:t>
-            </a:r>
-            <a:r>
-              <a:rPr lang="de-DE" sz="2800" smtClean="0">
-                <a:solidFill>
-                  <a:schemeClr val="bg1"/>
-                </a:solidFill>
-              </a:rPr>
-              <a:t>mit Kernentitäten</a:t>
+              <a:t>Fachliche Systemspezifikation</a:t>
             </a:r>
             <a:endParaRPr lang="de-DE" sz="2800" dirty="0">
               <a:solidFill>
@@ -15565,10 +18979,83 @@
           </a:p>
         </p:txBody>
       </p:sp>
+      <p:graphicFrame>
+        <p:nvGraphicFramePr>
+          <p:cNvPr id="5" name="Diagramm 4"/>
+          <p:cNvGraphicFramePr/>
+          <p:nvPr>
+            <p:extLst>
+              <p:ext uri="{D42A27DB-BD31-4B8C-83A1-F6EECF244321}">
+                <p14:modId xmlns:p14="http://schemas.microsoft.com/office/powerpoint/2010/main" val="2591514044"/>
+              </p:ext>
+            </p:extLst>
+          </p:nvPr>
+        </p:nvGraphicFramePr>
+        <p:xfrm>
+          <a:off x="218739" y="1916832"/>
+          <a:ext cx="8892480" cy="4869160"/>
+        </p:xfrm>
+        <a:graphic>
+          <a:graphicData uri="http://schemas.openxmlformats.org/drawingml/2006/diagram">
+            <dgm:relIds xmlns:dgm="http://schemas.openxmlformats.org/drawingml/2006/diagram" xmlns:r="http://schemas.openxmlformats.org/officeDocument/2006/relationships" r:dm="rId4" r:lo="rId5" r:qs="rId6" r:cs="rId7"/>
+          </a:graphicData>
+        </a:graphic>
+      </p:graphicFrame>
+      <p:sp>
+        <p:nvSpPr>
+          <p:cNvPr id="6" name="Textfeld 5"/>
+          <p:cNvSpPr txBox="1"/>
+          <p:nvPr/>
+        </p:nvSpPr>
+        <p:spPr>
+          <a:xfrm>
+            <a:off x="755576" y="1484784"/>
+            <a:ext cx="7506997" cy="923330"/>
+          </a:xfrm>
+          <a:prstGeom prst="rect">
+            <a:avLst/>
+          </a:prstGeom>
+          <a:noFill/>
+        </p:spPr>
+        <p:txBody>
+          <a:bodyPr wrap="square" rtlCol="0">
+            <a:spAutoFit/>
+          </a:bodyPr>
+          <a:lstStyle/>
+          <a:p>
+            <a:pPr marL="285750" indent="-285750">
+              <a:buFont typeface="Arial" panose="020B0604020202020204" pitchFamily="34" charset="0"/>
+              <a:buChar char="•"/>
+            </a:pPr>
+            <a:r>
+              <a:rPr lang="de-DE" dirty="0" smtClean="0"/>
+              <a:t>Logisches Datenmodell für die gesamte Anwendung</a:t>
+            </a:r>
+          </a:p>
+          <a:p>
+            <a:pPr marL="285750" indent="-285750">
+              <a:buFont typeface="Arial" panose="020B0604020202020204" pitchFamily="34" charset="0"/>
+              <a:buChar char="•"/>
+            </a:pPr>
+            <a:endParaRPr lang="de-DE" dirty="0"/>
+          </a:p>
+          <a:p>
+            <a:pPr marL="285750" indent="-285750">
+              <a:buFont typeface="Arial" panose="020B0604020202020204" pitchFamily="34" charset="0"/>
+              <a:buChar char="•"/>
+            </a:pPr>
+            <a:r>
+              <a:rPr lang="de-DE" dirty="0" smtClean="0"/>
+              <a:t>Komponenten-Diagramm für die gesamte Anwendung</a:t>
+            </a:r>
+            <a:endParaRPr lang="de-DE" dirty="0"/>
+          </a:p>
+        </p:txBody>
+      </p:sp>
     </p:spTree>
     <p:extLst>
       <p:ext uri="{BB962C8B-B14F-4D97-AF65-F5344CB8AC3E}">
-        <p14:creationId xmlns:p14="http://schemas.microsoft.com/office/powerpoint/2010/main" val="618882905"/>
+        <p14:creationId xmlns:p14="http://schemas.microsoft.com/office/powerpoint/2010/main" val="280322276"/>
       </p:ext>
     </p:extLst>
   </p:cSld>
@@ -15685,167 +19172,7 @@
                   <a:schemeClr val="bg1"/>
                 </a:solidFill>
               </a:rPr>
-              <a:t>Fachliches Komponentenmodell</a:t>
-            </a:r>
-            <a:endParaRPr lang="de-DE" sz="2800" dirty="0">
-              <a:solidFill>
-                <a:schemeClr val="bg1"/>
-              </a:solidFill>
-            </a:endParaRPr>
-          </a:p>
-        </p:txBody>
-      </p:sp>
-      <p:pic>
-        <p:nvPicPr>
-          <p:cNvPr id="4" name="Grafik 3"/>
-          <p:cNvPicPr>
-            <a:picLocks noChangeAspect="1"/>
-          </p:cNvPicPr>
-          <p:nvPr/>
-        </p:nvPicPr>
-        <p:blipFill>
-          <a:blip r:embed="rId3">
-            <a:extLst>
-              <a:ext uri="{28A0092B-C50C-407E-A947-70E740481C1C}">
-                <a14:useLocalDpi xmlns:a14="http://schemas.microsoft.com/office/drawing/2010/main" val="0"/>
-              </a:ext>
-            </a:extLst>
-          </a:blip>
-          <a:stretch>
-            <a:fillRect/>
-          </a:stretch>
-        </p:blipFill>
-        <p:spPr>
-          <a:xfrm>
-            <a:off x="971600" y="1124744"/>
-            <a:ext cx="6919490" cy="5457509"/>
-          </a:xfrm>
-          <a:prstGeom prst="rect">
-            <a:avLst/>
-          </a:prstGeom>
-        </p:spPr>
-      </p:pic>
-    </p:spTree>
-    <p:extLst>
-      <p:ext uri="{BB962C8B-B14F-4D97-AF65-F5344CB8AC3E}">
-        <p14:creationId xmlns:p14="http://schemas.microsoft.com/office/powerpoint/2010/main" val="73153386"/>
-      </p:ext>
-    </p:extLst>
-  </p:cSld>
-  <p:clrMapOvr>
-    <a:masterClrMapping/>
-  </p:clrMapOvr>
-  <p:timing>
-    <p:tnLst>
-      <p:par>
-        <p:cTn xmlns:p14="http://schemas.microsoft.com/office/powerpoint/2010/main" id="1" dur="indefinite" restart="never" nodeType="tmRoot"/>
-      </p:par>
-    </p:tnLst>
-  </p:timing>
-</p:sld>
-</file>
-
-<file path=ppt/slides/slide7.xml><?xml version="1.0" encoding="utf-8"?>
-<p:sld xmlns:a="http://schemas.openxmlformats.org/drawingml/2006/main" xmlns:r="http://schemas.openxmlformats.org/officeDocument/2006/relationships" xmlns:p="http://schemas.openxmlformats.org/presentationml/2006/main">
-  <p:cSld>
-    <p:spTree>
-      <p:nvGrpSpPr>
-        <p:cNvPr id="1" name=""/>
-        <p:cNvGrpSpPr/>
-        <p:nvPr/>
-      </p:nvGrpSpPr>
-      <p:grpSpPr>
-        <a:xfrm>
-          <a:off x="0" y="0"/>
-          <a:ext cx="0" cy="0"/>
-          <a:chOff x="0" y="0"/>
-          <a:chExt cx="0" cy="0"/>
-        </a:xfrm>
-      </p:grpSpPr>
-      <p:pic>
-        <p:nvPicPr>
-          <p:cNvPr id="3074" name="Picture 2"/>
-          <p:cNvPicPr>
-            <a:picLocks noChangeAspect="1" noChangeArrowheads="1"/>
-          </p:cNvPicPr>
-          <p:nvPr/>
-        </p:nvPicPr>
-        <p:blipFill>
-          <a:blip r:embed="rId2">
-            <a:extLst>
-              <a:ext uri="{28A0092B-C50C-407E-A947-70E740481C1C}">
-                <a14:useLocalDpi xmlns:a14="http://schemas.microsoft.com/office/drawing/2010/main" val="0"/>
-              </a:ext>
-            </a:extLst>
-          </a:blip>
-          <a:srcRect/>
-          <a:stretch>
-            <a:fillRect/>
-          </a:stretch>
-        </p:blipFill>
-        <p:spPr bwMode="auto">
-          <a:xfrm>
-            <a:off x="1" y="1"/>
-            <a:ext cx="9144000" cy="764703"/>
-          </a:xfrm>
-          <a:prstGeom prst="rect">
-            <a:avLst/>
-          </a:prstGeom>
-          <a:noFill/>
-          <a:ln>
-            <a:noFill/>
-          </a:ln>
-          <a:extLst>
-            <a:ext uri="{909E8E84-426E-40dd-AFC4-6F175D3DCCD1}">
-              <a14:hiddenFill xmlns:a14="http://schemas.microsoft.com/office/drawing/2010/main">
-                <a:solidFill>
-                  <a:schemeClr val="accent1"/>
-                </a:solidFill>
-              </a14:hiddenFill>
-            </a:ext>
-            <a:ext uri="{91240B29-F687-4f45-9708-019B960494DF}">
-              <a14:hiddenLine xmlns:a14="http://schemas.microsoft.com/office/drawing/2010/main" w="9525">
-                <a:solidFill>
-                  <a:schemeClr val="tx1"/>
-                </a:solidFill>
-                <a:miter lim="800000"/>
-                <a:headEnd/>
-                <a:tailEnd/>
-              </a14:hiddenLine>
-            </a:ext>
-          </a:extLst>
-        </p:spPr>
-      </p:pic>
-      <p:sp>
-        <p:nvSpPr>
-          <p:cNvPr id="2" name="Titel 1"/>
-          <p:cNvSpPr>
-            <a:spLocks noGrp="1"/>
-          </p:cNvSpPr>
-          <p:nvPr>
-            <p:ph type="title"/>
-          </p:nvPr>
-        </p:nvSpPr>
-        <p:spPr>
-          <a:xfrm>
-            <a:off x="32973" y="0"/>
-            <a:ext cx="8229600" cy="908720"/>
-          </a:xfrm>
-        </p:spPr>
-        <p:txBody>
-          <a:bodyPr>
-            <a:normAutofit/>
-          </a:bodyPr>
-          <a:lstStyle/>
-          <a:p>
-            <a:pPr algn="l"/>
-            <a:r>
-              <a:rPr lang="de-DE" sz="2800" dirty="0" smtClean="0">
-                <a:solidFill>
-                  <a:schemeClr val="bg1"/>
-                </a:solidFill>
-              </a:rPr>
-              <a:t>Beschreibung der fachlichen Komponenten</a:t>
+              <a:t>Projektstatus</a:t>
             </a:r>
             <a:endParaRPr lang="de-DE" sz="2800" dirty="0">
               <a:solidFill>
@@ -15857,19 +19184,19 @@
       </p:sp>
       <p:graphicFrame>
         <p:nvGraphicFramePr>
-          <p:cNvPr id="5" name="Diagramm 4"/>
+          <p:cNvPr id="3" name="Diagramm 2"/>
           <p:cNvGraphicFramePr/>
           <p:nvPr>
             <p:extLst>
               <p:ext uri="{D42A27DB-BD31-4B8C-83A1-F6EECF244321}">
-                <p14:modId xmlns:p14="http://schemas.microsoft.com/office/powerpoint/2010/main" val="182046024"/>
+                <p14:modId xmlns:p14="http://schemas.microsoft.com/office/powerpoint/2010/main" val="3347748181"/>
               </p:ext>
             </p:extLst>
           </p:nvPr>
         </p:nvGraphicFramePr>
         <p:xfrm>
-          <a:off x="179512" y="1052736"/>
-          <a:ext cx="8892480" cy="4869160"/>
+          <a:off x="1524000" y="1397000"/>
+          <a:ext cx="6096000" cy="4064000"/>
         </p:xfrm>
         <a:graphic>
           <a:graphicData uri="http://schemas.openxmlformats.org/drawingml/2006/diagram">
@@ -15877,133 +19204,54 @@
           </a:graphicData>
         </a:graphic>
       </p:graphicFrame>
-    </p:spTree>
-    <p:extLst>
-      <p:ext uri="{BB962C8B-B14F-4D97-AF65-F5344CB8AC3E}">
-        <p14:creationId xmlns:p14="http://schemas.microsoft.com/office/powerpoint/2010/main" val="280322276"/>
-      </p:ext>
-    </p:extLst>
-  </p:cSld>
-  <p:clrMapOvr>
-    <a:masterClrMapping/>
-  </p:clrMapOvr>
-  <p:timing>
-    <p:tnLst>
-      <p:par>
-        <p:cTn xmlns:p14="http://schemas.microsoft.com/office/powerpoint/2010/main" id="1" dur="indefinite" restart="never" nodeType="tmRoot"/>
-      </p:par>
-    </p:tnLst>
-  </p:timing>
-</p:sld>
-</file>
-
-<file path=ppt/slides/slide8.xml><?xml version="1.0" encoding="utf-8"?>
-<p:sld xmlns:a="http://schemas.openxmlformats.org/drawingml/2006/main" xmlns:r="http://schemas.openxmlformats.org/officeDocument/2006/relationships" xmlns:p="http://schemas.openxmlformats.org/presentationml/2006/main">
-  <p:cSld>
-    <p:spTree>
-      <p:nvGrpSpPr>
-        <p:cNvPr id="1" name=""/>
-        <p:cNvGrpSpPr/>
-        <p:nvPr/>
-      </p:nvGrpSpPr>
-      <p:grpSpPr>
-        <a:xfrm>
-          <a:off x="0" y="0"/>
-          <a:ext cx="0" cy="0"/>
-          <a:chOff x="0" y="0"/>
-          <a:chExt cx="0" cy="0"/>
-        </a:xfrm>
-      </p:grpSpPr>
-      <p:pic>
-        <p:nvPicPr>
-          <p:cNvPr id="3074" name="Picture 2"/>
-          <p:cNvPicPr>
-            <a:picLocks noChangeAspect="1" noChangeArrowheads="1"/>
-          </p:cNvPicPr>
+      <p:sp>
+        <p:nvSpPr>
+          <p:cNvPr id="4" name="Textfeld 3"/>
+          <p:cNvSpPr txBox="1"/>
           <p:nvPr/>
-        </p:nvPicPr>
-        <p:blipFill>
-          <a:blip r:embed="rId2">
-            <a:extLst>
-              <a:ext uri="{28A0092B-C50C-407E-A947-70E740481C1C}">
-                <a14:useLocalDpi xmlns:a14="http://schemas.microsoft.com/office/drawing/2010/main" val="0"/>
-              </a:ext>
-            </a:extLst>
-          </a:blip>
-          <a:srcRect/>
-          <a:stretch>
-            <a:fillRect/>
-          </a:stretch>
-        </p:blipFill>
-        <p:spPr bwMode="auto">
+        </p:nvSpPr>
+        <p:spPr>
           <a:xfrm>
-            <a:off x="1" y="1"/>
-            <a:ext cx="9144000" cy="764703"/>
+            <a:off x="755576" y="4953942"/>
+            <a:ext cx="7506997" cy="923330"/>
           </a:xfrm>
           <a:prstGeom prst="rect">
             <a:avLst/>
           </a:prstGeom>
           <a:noFill/>
-          <a:ln>
-            <a:noFill/>
-          </a:ln>
-          <a:extLst>
-            <a:ext uri="{909E8E84-426E-40dd-AFC4-6F175D3DCCD1}">
-              <a14:hiddenFill xmlns:a14="http://schemas.microsoft.com/office/drawing/2010/main">
-                <a:solidFill>
-                  <a:schemeClr val="accent1"/>
-                </a:solidFill>
-              </a14:hiddenFill>
-            </a:ext>
-            <a:ext uri="{91240B29-F687-4f45-9708-019B960494DF}">
-              <a14:hiddenLine xmlns:a14="http://schemas.microsoft.com/office/drawing/2010/main" w="9525">
-                <a:solidFill>
-                  <a:schemeClr val="tx1"/>
-                </a:solidFill>
-                <a:miter lim="800000"/>
-                <a:headEnd/>
-                <a:tailEnd/>
-              </a14:hiddenLine>
-            </a:ext>
-          </a:extLst>
-        </p:spPr>
-      </p:pic>
-      <p:sp>
-        <p:nvSpPr>
-          <p:cNvPr id="2" name="Titel 1"/>
-          <p:cNvSpPr>
-            <a:spLocks noGrp="1"/>
-          </p:cNvSpPr>
-          <p:nvPr>
-            <p:ph type="title"/>
-          </p:nvPr>
-        </p:nvSpPr>
-        <p:spPr>
-          <a:xfrm>
-            <a:off x="32973" y="0"/>
-            <a:ext cx="8229600" cy="908720"/>
-          </a:xfrm>
         </p:spPr>
         <p:txBody>
-          <a:bodyPr>
-            <a:normAutofit/>
+          <a:bodyPr wrap="square" rtlCol="0">
+            <a:spAutoFit/>
           </a:bodyPr>
           <a:lstStyle/>
           <a:p>
-            <a:pPr algn="l"/>
+            <a:pPr marL="285750" indent="-285750">
+              <a:buFont typeface="Arial" panose="020B0604020202020204" pitchFamily="34" charset="0"/>
+              <a:buChar char="•"/>
+            </a:pPr>
             <a:r>
-              <a:rPr lang="de-DE" sz="2800" dirty="0" smtClean="0">
-                <a:solidFill>
-                  <a:schemeClr val="bg1"/>
-                </a:solidFill>
-              </a:rPr>
-              <a:t>Projektstatus</a:t>
+              <a:rPr lang="de-DE" dirty="0" smtClean="0"/>
+              <a:t>Zeitaufwand der Projektteilnehmer von 60% auf 100% erhöht.</a:t>
             </a:r>
-            <a:endParaRPr lang="de-DE" sz="2800" dirty="0">
-              <a:solidFill>
-                <a:schemeClr val="bg1"/>
-              </a:solidFill>
-            </a:endParaRPr>
+          </a:p>
+          <a:p>
+            <a:pPr marL="285750" indent="-285750">
+              <a:buFont typeface="Arial" panose="020B0604020202020204" pitchFamily="34" charset="0"/>
+              <a:buChar char="•"/>
+            </a:pPr>
+            <a:endParaRPr lang="de-DE" dirty="0" smtClean="0"/>
+          </a:p>
+          <a:p>
+            <a:pPr marL="285750" indent="-285750">
+              <a:buFont typeface="Arial" panose="020B0604020202020204" pitchFamily="34" charset="0"/>
+              <a:buChar char="•"/>
+            </a:pPr>
+            <a:r>
+              <a:rPr lang="de-DE" dirty="0" smtClean="0"/>
+              <a:t>Aktuell ca. zwei Wochen in Verzug. Neuer Abschlusstermin KW 2 in 2015.</a:t>
+            </a:r>
+            <a:endParaRPr lang="de-DE" dirty="0"/>
           </a:p>
         </p:txBody>
       </p:sp>
@@ -16020,14 +19268,93 @@
   <p:timing>
     <p:tnLst>
       <p:par>
-        <p:cTn xmlns:p14="http://schemas.microsoft.com/office/powerpoint/2010/main" id="1" dur="indefinite" restart="never" nodeType="tmRoot"/>
+        <p:cTn xmlns:p14="http://schemas.microsoft.com/office/powerpoint/2010/main" id="1" dur="indefinite" restart="never" nodeType="tmRoot">
+          <p:childTnLst>
+            <p:seq concurrent="1" nextAc="seek">
+              <p:cTn id="2" dur="indefinite" nodeType="mainSeq">
+                <p:childTnLst>
+                  <p:par>
+                    <p:cTn id="3" fill="hold">
+                      <p:stCondLst>
+                        <p:cond delay="indefinite"/>
+                      </p:stCondLst>
+                      <p:childTnLst>
+                        <p:par>
+                          <p:cTn id="4" fill="hold">
+                            <p:stCondLst>
+                              <p:cond delay="0"/>
+                            </p:stCondLst>
+                            <p:childTnLst>
+                              <p:par>
+                                <p:cTn id="5" presetID="10" presetClass="entr" presetSubtype="0" fill="hold" grpId="0" nodeType="clickEffect">
+                                  <p:stCondLst>
+                                    <p:cond delay="0"/>
+                                  </p:stCondLst>
+                                  <p:childTnLst>
+                                    <p:set>
+                                      <p:cBhvr>
+                                        <p:cTn id="6" dur="1" fill="hold">
+                                          <p:stCondLst>
+                                            <p:cond delay="0"/>
+                                          </p:stCondLst>
+                                        </p:cTn>
+                                        <p:tgtEl>
+                                          <p:spTgt spid="4"/>
+                                        </p:tgtEl>
+                                        <p:attrNameLst>
+                                          <p:attrName>style.visibility</p:attrName>
+                                        </p:attrNameLst>
+                                      </p:cBhvr>
+                                      <p:to>
+                                        <p:strVal val="visible"/>
+                                      </p:to>
+                                    </p:set>
+                                    <p:animEffect transition="in" filter="fade">
+                                      <p:cBhvr>
+                                        <p:cTn id="7" dur="500"/>
+                                        <p:tgtEl>
+                                          <p:spTgt spid="4"/>
+                                        </p:tgtEl>
+                                      </p:cBhvr>
+                                    </p:animEffect>
+                                  </p:childTnLst>
+                                </p:cTn>
+                              </p:par>
+                            </p:childTnLst>
+                          </p:cTn>
+                        </p:par>
+                      </p:childTnLst>
+                    </p:cTn>
+                  </p:par>
+                </p:childTnLst>
+              </p:cTn>
+              <p:prevCondLst>
+                <p:cond evt="onPrev" delay="0">
+                  <p:tgtEl>
+                    <p:sldTgt/>
+                  </p:tgtEl>
+                </p:cond>
+              </p:prevCondLst>
+              <p:nextCondLst>
+                <p:cond evt="onNext" delay="0">
+                  <p:tgtEl>
+                    <p:sldTgt/>
+                  </p:tgtEl>
+                </p:cond>
+              </p:nextCondLst>
+            </p:seq>
+          </p:childTnLst>
+        </p:cTn>
       </p:par>
     </p:tnLst>
+    <p:bldLst>
+      <p:bldP spid="4" grpId="0"/>
+    </p:bldLst>
   </p:timing>
 </p:sld>
 </file>
 
-<file path=ppt/slides/slide9.xml><?xml version="1.0" encoding="utf-8"?>
+<file path=ppt/slides/slide7.xml><?xml version="1.0" encoding="utf-8"?>
 <p:sld xmlns:a="http://schemas.openxmlformats.org/drawingml/2006/main" xmlns:r="http://schemas.openxmlformats.org/officeDocument/2006/relationships" xmlns:p="http://schemas.openxmlformats.org/presentationml/2006/main">
   <p:cSld>
     <p:spTree>
@@ -16471,4 +19798,265 @@
   <a:objectDefaults/>
   <a:extraClrSchemeLst/>
 </a:theme>
+</file>
+
+<file path=ppt/theme/theme2.xml><?xml version="1.0" encoding="utf-8"?>
+<a:theme xmlns:a="http://schemas.openxmlformats.org/drawingml/2006/main" name="Office Theme">
+  <a:themeElements>
+    <a:clrScheme name="Office">
+      <a:dk1>
+        <a:sysClr val="windowText" lastClr="000000"/>
+      </a:dk1>
+      <a:lt1>
+        <a:sysClr val="window" lastClr="FFFFFF"/>
+      </a:lt1>
+      <a:dk2>
+        <a:srgbClr val="44546A"/>
+      </a:dk2>
+      <a:lt2>
+        <a:srgbClr val="E7E6E6"/>
+      </a:lt2>
+      <a:accent1>
+        <a:srgbClr val="5B9BD5"/>
+      </a:accent1>
+      <a:accent2>
+        <a:srgbClr val="ED7D31"/>
+      </a:accent2>
+      <a:accent3>
+        <a:srgbClr val="A5A5A5"/>
+      </a:accent3>
+      <a:accent4>
+        <a:srgbClr val="FFC000"/>
+      </a:accent4>
+      <a:accent5>
+        <a:srgbClr val="4472C4"/>
+      </a:accent5>
+      <a:accent6>
+        <a:srgbClr val="70AD47"/>
+      </a:accent6>
+      <a:hlink>
+        <a:srgbClr val="0563C1"/>
+      </a:hlink>
+      <a:folHlink>
+        <a:srgbClr val="954F72"/>
+      </a:folHlink>
+    </a:clrScheme>
+    <a:fontScheme name="Office">
+      <a:majorFont>
+        <a:latin typeface="Calibri Light"/>
+        <a:ea typeface=""/>
+        <a:cs typeface=""/>
+        <a:font script="Jpan" typeface="ＭＳ Ｐゴシック"/>
+        <a:font script="Hang" typeface="맑은 고딕"/>
+        <a:font script="Hans" typeface="宋体"/>
+        <a:font script="Hant" typeface="新細明體"/>
+        <a:font script="Arab" typeface="Times New Roman"/>
+        <a:font script="Hebr" typeface="Times New Roman"/>
+        <a:font script="Thai" typeface="Angsana New"/>
+        <a:font script="Ethi" typeface="Nyala"/>
+        <a:font script="Beng" typeface="Vrinda"/>
+        <a:font script="Gujr" typeface="Shruti"/>
+        <a:font script="Khmr" typeface="MoolBoran"/>
+        <a:font script="Knda" typeface="Tunga"/>
+        <a:font script="Guru" typeface="Raavi"/>
+        <a:font script="Cans" typeface="Euphemia"/>
+        <a:font script="Cher" typeface="Plantagenet Cherokee"/>
+        <a:font script="Yiii" typeface="Microsoft Yi Baiti"/>
+        <a:font script="Tibt" typeface="Microsoft Himalaya"/>
+        <a:font script="Thaa" typeface="MV Boli"/>
+        <a:font script="Deva" typeface="Mangal"/>
+        <a:font script="Telu" typeface="Gautami"/>
+        <a:font script="Taml" typeface="Latha"/>
+        <a:font script="Syrc" typeface="Estrangelo Edessa"/>
+        <a:font script="Orya" typeface="Kalinga"/>
+        <a:font script="Mlym" typeface="Kartika"/>
+        <a:font script="Laoo" typeface="DokChampa"/>
+        <a:font script="Sinh" typeface="Iskoola Pota"/>
+        <a:font script="Mong" typeface="Mongolian Baiti"/>
+        <a:font script="Viet" typeface="Times New Roman"/>
+        <a:font script="Uigh" typeface="Microsoft Uighur"/>
+        <a:font script="Geor" typeface="Sylfaen"/>
+      </a:majorFont>
+      <a:minorFont>
+        <a:latin typeface="Calibri"/>
+        <a:ea typeface=""/>
+        <a:cs typeface=""/>
+        <a:font script="Jpan" typeface="ＭＳ Ｐゴシック"/>
+        <a:font script="Hang" typeface="맑은 고딕"/>
+        <a:font script="Hans" typeface="宋体"/>
+        <a:font script="Hant" typeface="新細明體"/>
+        <a:font script="Arab" typeface="Arial"/>
+        <a:font script="Hebr" typeface="Arial"/>
+        <a:font script="Thai" typeface="Cordia New"/>
+        <a:font script="Ethi" typeface="Nyala"/>
+        <a:font script="Beng" typeface="Vrinda"/>
+        <a:font script="Gujr" typeface="Shruti"/>
+        <a:font script="Khmr" typeface="DaunPenh"/>
+        <a:font script="Knda" typeface="Tunga"/>
+        <a:font script="Guru" typeface="Raavi"/>
+        <a:font script="Cans" typeface="Euphemia"/>
+        <a:font script="Cher" typeface="Plantagenet Cherokee"/>
+        <a:font script="Yiii" typeface="Microsoft Yi Baiti"/>
+        <a:font script="Tibt" typeface="Microsoft Himalaya"/>
+        <a:font script="Thaa" typeface="MV Boli"/>
+        <a:font script="Deva" typeface="Mangal"/>
+        <a:font script="Telu" typeface="Gautami"/>
+        <a:font script="Taml" typeface="Latha"/>
+        <a:font script="Syrc" typeface="Estrangelo Edessa"/>
+        <a:font script="Orya" typeface="Kalinga"/>
+        <a:font script="Mlym" typeface="Kartika"/>
+        <a:font script="Laoo" typeface="DokChampa"/>
+        <a:font script="Sinh" typeface="Iskoola Pota"/>
+        <a:font script="Mong" typeface="Mongolian Baiti"/>
+        <a:font script="Viet" typeface="Arial"/>
+        <a:font script="Uigh" typeface="Microsoft Uighur"/>
+        <a:font script="Geor" typeface="Sylfaen"/>
+      </a:minorFont>
+    </a:fontScheme>
+    <a:fmtScheme name="Office">
+      <a:fillStyleLst>
+        <a:solidFill>
+          <a:schemeClr val="phClr"/>
+        </a:solidFill>
+        <a:gradFill rotWithShape="1">
+          <a:gsLst>
+            <a:gs pos="0">
+              <a:schemeClr val="phClr">
+                <a:lumMod val="110000"/>
+                <a:satMod val="105000"/>
+                <a:tint val="67000"/>
+              </a:schemeClr>
+            </a:gs>
+            <a:gs pos="50000">
+              <a:schemeClr val="phClr">
+                <a:lumMod val="105000"/>
+                <a:satMod val="103000"/>
+                <a:tint val="73000"/>
+              </a:schemeClr>
+            </a:gs>
+            <a:gs pos="100000">
+              <a:schemeClr val="phClr">
+                <a:lumMod val="105000"/>
+                <a:satMod val="109000"/>
+                <a:tint val="81000"/>
+              </a:schemeClr>
+            </a:gs>
+          </a:gsLst>
+          <a:lin ang="5400000" scaled="0"/>
+        </a:gradFill>
+        <a:gradFill rotWithShape="1">
+          <a:gsLst>
+            <a:gs pos="0">
+              <a:schemeClr val="phClr">
+                <a:satMod val="103000"/>
+                <a:lumMod val="102000"/>
+                <a:tint val="94000"/>
+              </a:schemeClr>
+            </a:gs>
+            <a:gs pos="50000">
+              <a:schemeClr val="phClr">
+                <a:satMod val="110000"/>
+                <a:lumMod val="100000"/>
+                <a:shade val="100000"/>
+              </a:schemeClr>
+            </a:gs>
+            <a:gs pos="100000">
+              <a:schemeClr val="phClr">
+                <a:lumMod val="99000"/>
+                <a:satMod val="120000"/>
+                <a:shade val="78000"/>
+              </a:schemeClr>
+            </a:gs>
+          </a:gsLst>
+          <a:lin ang="5400000" scaled="0"/>
+        </a:gradFill>
+      </a:fillStyleLst>
+      <a:lnStyleLst>
+        <a:ln w="6350" cap="flat" cmpd="sng" algn="ctr">
+          <a:solidFill>
+            <a:schemeClr val="phClr"/>
+          </a:solidFill>
+          <a:prstDash val="solid"/>
+          <a:miter lim="800000"/>
+        </a:ln>
+        <a:ln w="12700" cap="flat" cmpd="sng" algn="ctr">
+          <a:solidFill>
+            <a:schemeClr val="phClr"/>
+          </a:solidFill>
+          <a:prstDash val="solid"/>
+          <a:miter lim="800000"/>
+        </a:ln>
+        <a:ln w="19050" cap="flat" cmpd="sng" algn="ctr">
+          <a:solidFill>
+            <a:schemeClr val="phClr"/>
+          </a:solidFill>
+          <a:prstDash val="solid"/>
+          <a:miter lim="800000"/>
+        </a:ln>
+      </a:lnStyleLst>
+      <a:effectStyleLst>
+        <a:effectStyle>
+          <a:effectLst/>
+        </a:effectStyle>
+        <a:effectStyle>
+          <a:effectLst/>
+        </a:effectStyle>
+        <a:effectStyle>
+          <a:effectLst>
+            <a:outerShdw blurRad="57150" dist="19050" dir="5400000" algn="ctr" rotWithShape="0">
+              <a:srgbClr val="000000">
+                <a:alpha val="63000"/>
+              </a:srgbClr>
+            </a:outerShdw>
+          </a:effectLst>
+        </a:effectStyle>
+      </a:effectStyleLst>
+      <a:bgFillStyleLst>
+        <a:solidFill>
+          <a:schemeClr val="phClr"/>
+        </a:solidFill>
+        <a:solidFill>
+          <a:schemeClr val="phClr">
+            <a:tint val="95000"/>
+            <a:satMod val="170000"/>
+          </a:schemeClr>
+        </a:solidFill>
+        <a:gradFill rotWithShape="1">
+          <a:gsLst>
+            <a:gs pos="0">
+              <a:schemeClr val="phClr">
+                <a:tint val="93000"/>
+                <a:satMod val="150000"/>
+                <a:shade val="98000"/>
+                <a:lumMod val="102000"/>
+              </a:schemeClr>
+            </a:gs>
+            <a:gs pos="50000">
+              <a:schemeClr val="phClr">
+                <a:tint val="98000"/>
+                <a:satMod val="130000"/>
+                <a:shade val="90000"/>
+                <a:lumMod val="103000"/>
+              </a:schemeClr>
+            </a:gs>
+            <a:gs pos="100000">
+              <a:schemeClr val="phClr">
+                <a:shade val="63000"/>
+                <a:satMod val="120000"/>
+              </a:schemeClr>
+            </a:gs>
+          </a:gsLst>
+          <a:lin ang="5400000" scaled="0"/>
+        </a:gradFill>
+      </a:bgFillStyleLst>
+    </a:fmtScheme>
+  </a:themeElements>
+  <a:objectDefaults/>
+  <a:extraClrSchemeLst/>
+  <a:extLst>
+    <a:ext uri="{05A4C25C-085E-4340-85A3-A5531E510DB2}">
+      <thm15:themeFamily xmlns:thm15="http://schemas.microsoft.com/office/thememl/2012/main" xmlns="" name="Office Theme" id="{62F939B6-93AF-4DB8-9C6B-D6C7DFDC589F}" vid="{4A3C46E8-61CC-4603-A589-7422A47A8E4A}"/>
+    </a:ext>
+  </a:extLst>
+</a:theme>
 </file>
</xml_diff>